<commit_message>
next step: fc0, fc1
</commit_message>
<xml_diff>
--- a/WeeklyPresentations/update11_06_03.pptx
+++ b/WeeklyPresentations/update11_06_03.pptx
@@ -8,12 +8,18 @@
     <p:sldId id="256" r:id="rId2"/>
     <p:sldId id="263" r:id="rId3"/>
     <p:sldId id="269" r:id="rId4"/>
-    <p:sldId id="270" r:id="rId5"/>
-    <p:sldId id="271" r:id="rId6"/>
-    <p:sldId id="272" r:id="rId7"/>
-    <p:sldId id="268" r:id="rId8"/>
-    <p:sldId id="262" r:id="rId9"/>
-    <p:sldId id="258" r:id="rId10"/>
+    <p:sldId id="273" r:id="rId5"/>
+    <p:sldId id="270" r:id="rId6"/>
+    <p:sldId id="271" r:id="rId7"/>
+    <p:sldId id="272" r:id="rId8"/>
+    <p:sldId id="274" r:id="rId9"/>
+    <p:sldId id="275" r:id="rId10"/>
+    <p:sldId id="276" r:id="rId11"/>
+    <p:sldId id="277" r:id="rId12"/>
+    <p:sldId id="278" r:id="rId13"/>
+    <p:sldId id="279" r:id="rId14"/>
+    <p:sldId id="268" r:id="rId15"/>
+    <p:sldId id="258" r:id="rId16"/>
   </p:sldIdLst>
   <p:sldSz cx="12192000" cy="6858000"/>
   <p:notesSz cx="6858000" cy="9144000"/>
@@ -3435,6 +3441,741 @@
 </p:sld>
 </file>
 
+<file path=ppt/slides/slide10.xml><?xml version="1.0" encoding="utf-8"?>
+<p:sld xmlns:a="http://schemas.openxmlformats.org/drawingml/2006/main" xmlns:r="http://schemas.openxmlformats.org/officeDocument/2006/relationships" xmlns:p="http://schemas.openxmlformats.org/presentationml/2006/main">
+  <p:cSld>
+    <p:spTree>
+      <p:nvGrpSpPr>
+        <p:cNvPr id="1" name=""/>
+        <p:cNvGrpSpPr/>
+        <p:nvPr/>
+      </p:nvGrpSpPr>
+      <p:grpSpPr>
+        <a:xfrm>
+          <a:off x="0" y="0"/>
+          <a:ext cx="0" cy="0"/>
+          <a:chOff x="0" y="0"/>
+          <a:chExt cx="0" cy="0"/>
+        </a:xfrm>
+      </p:grpSpPr>
+      <p:sp>
+        <p:nvSpPr>
+          <p:cNvPr id="2" name="Title 1">
+            <a:extLst>
+              <a:ext uri="{FF2B5EF4-FFF2-40B4-BE49-F238E27FC236}">
+                <a16:creationId xmlns:a16="http://schemas.microsoft.com/office/drawing/2014/main" id="{E07DE7A7-5EF2-4E14-AC8B-C4303072E430}"/>
+              </a:ext>
+            </a:extLst>
+          </p:cNvPr>
+          <p:cNvSpPr>
+            <a:spLocks noGrp="1"/>
+          </p:cNvSpPr>
+          <p:nvPr>
+            <p:ph type="title"/>
+          </p:nvPr>
+        </p:nvSpPr>
+        <p:spPr/>
+        <p:txBody>
+          <a:bodyPr/>
+          <a:lstStyle/>
+          <a:p>
+            <a:r>
+              <a:rPr lang="en-US" altLang="zh-CN" dirty="0"/>
+              <a:t>Epoch 3 (0 is now the largest value)</a:t>
+            </a:r>
+            <a:endParaRPr lang="zh-CN" altLang="en-US" dirty="0"/>
+          </a:p>
+        </p:txBody>
+      </p:sp>
+      <p:pic>
+        <p:nvPicPr>
+          <p:cNvPr id="4" name="Picture 3">
+            <a:extLst>
+              <a:ext uri="{FF2B5EF4-FFF2-40B4-BE49-F238E27FC236}">
+                <a16:creationId xmlns:a16="http://schemas.microsoft.com/office/drawing/2014/main" id="{38569540-D0F5-4AD0-A7DC-C7FDEDCB84F2}"/>
+              </a:ext>
+            </a:extLst>
+          </p:cNvPr>
+          <p:cNvPicPr>
+            <a:picLocks noChangeAspect="1"/>
+          </p:cNvPicPr>
+          <p:nvPr/>
+        </p:nvPicPr>
+        <p:blipFill>
+          <a:blip r:embed="rId2"/>
+          <a:stretch>
+            <a:fillRect/>
+          </a:stretch>
+        </p:blipFill>
+        <p:spPr>
+          <a:xfrm>
+            <a:off x="5972175" y="1933573"/>
+            <a:ext cx="3709987" cy="4282011"/>
+          </a:xfrm>
+          <a:prstGeom prst="rect">
+            <a:avLst/>
+          </a:prstGeom>
+        </p:spPr>
+      </p:pic>
+      <p:pic>
+        <p:nvPicPr>
+          <p:cNvPr id="5" name="Picture 4">
+            <a:extLst>
+              <a:ext uri="{FF2B5EF4-FFF2-40B4-BE49-F238E27FC236}">
+                <a16:creationId xmlns:a16="http://schemas.microsoft.com/office/drawing/2014/main" id="{63CC71CB-AA69-4C72-852C-25F3EE3BCDEA}"/>
+              </a:ext>
+            </a:extLst>
+          </p:cNvPr>
+          <p:cNvPicPr>
+            <a:picLocks noChangeAspect="1"/>
+          </p:cNvPicPr>
+          <p:nvPr/>
+        </p:nvPicPr>
+        <p:blipFill>
+          <a:blip r:embed="rId3"/>
+          <a:stretch>
+            <a:fillRect/>
+          </a:stretch>
+        </p:blipFill>
+        <p:spPr>
+          <a:xfrm>
+            <a:off x="855497" y="1933574"/>
+            <a:ext cx="3956382" cy="4282010"/>
+          </a:xfrm>
+          <a:prstGeom prst="rect">
+            <a:avLst/>
+          </a:prstGeom>
+        </p:spPr>
+      </p:pic>
+    </p:spTree>
+    <p:extLst>
+      <p:ext uri="{BB962C8B-B14F-4D97-AF65-F5344CB8AC3E}">
+        <p14:creationId xmlns:p14="http://schemas.microsoft.com/office/powerpoint/2010/main" val="1126710876"/>
+      </p:ext>
+    </p:extLst>
+  </p:cSld>
+  <p:clrMapOvr>
+    <a:masterClrMapping/>
+  </p:clrMapOvr>
+</p:sld>
+</file>
+
+<file path=ppt/slides/slide11.xml><?xml version="1.0" encoding="utf-8"?>
+<p:sld xmlns:a="http://schemas.openxmlformats.org/drawingml/2006/main" xmlns:r="http://schemas.openxmlformats.org/officeDocument/2006/relationships" xmlns:p="http://schemas.openxmlformats.org/presentationml/2006/main">
+  <p:cSld>
+    <p:spTree>
+      <p:nvGrpSpPr>
+        <p:cNvPr id="1" name=""/>
+        <p:cNvGrpSpPr/>
+        <p:nvPr/>
+      </p:nvGrpSpPr>
+      <p:grpSpPr>
+        <a:xfrm>
+          <a:off x="0" y="0"/>
+          <a:ext cx="0" cy="0"/>
+          <a:chOff x="0" y="0"/>
+          <a:chExt cx="0" cy="0"/>
+        </a:xfrm>
+      </p:grpSpPr>
+      <p:sp>
+        <p:nvSpPr>
+          <p:cNvPr id="2" name="Title 1">
+            <a:extLst>
+              <a:ext uri="{FF2B5EF4-FFF2-40B4-BE49-F238E27FC236}">
+                <a16:creationId xmlns:a16="http://schemas.microsoft.com/office/drawing/2014/main" id="{9A99CA21-B4ED-497F-B2D2-71B7C589E4F8}"/>
+              </a:ext>
+            </a:extLst>
+          </p:cNvPr>
+          <p:cNvSpPr>
+            <a:spLocks noGrp="1"/>
+          </p:cNvSpPr>
+          <p:nvPr>
+            <p:ph type="title"/>
+          </p:nvPr>
+        </p:nvSpPr>
+        <p:spPr/>
+        <p:txBody>
+          <a:bodyPr/>
+          <a:lstStyle/>
+          <a:p>
+            <a:r>
+              <a:rPr lang="en-US" altLang="zh-CN" dirty="0"/>
+              <a:t>Epoch 5 (Skipping epochs now)</a:t>
+            </a:r>
+            <a:br>
+              <a:rPr lang="en-US" altLang="zh-CN" dirty="0"/>
+            </a:br>
+            <a:r>
+              <a:rPr lang="en-US" altLang="zh-CN" dirty="0"/>
+              <a:t>Neuron 0 is now positive</a:t>
+            </a:r>
+            <a:endParaRPr lang="zh-CN" altLang="en-US" dirty="0"/>
+          </a:p>
+        </p:txBody>
+      </p:sp>
+      <p:pic>
+        <p:nvPicPr>
+          <p:cNvPr id="4" name="Picture 3">
+            <a:extLst>
+              <a:ext uri="{FF2B5EF4-FFF2-40B4-BE49-F238E27FC236}">
+                <a16:creationId xmlns:a16="http://schemas.microsoft.com/office/drawing/2014/main" id="{E67AFC55-9E67-44AF-8AA5-FDE5B7139DD2}"/>
+              </a:ext>
+            </a:extLst>
+          </p:cNvPr>
+          <p:cNvPicPr>
+            <a:picLocks noChangeAspect="1"/>
+          </p:cNvPicPr>
+          <p:nvPr/>
+        </p:nvPicPr>
+        <p:blipFill>
+          <a:blip r:embed="rId2"/>
+          <a:stretch>
+            <a:fillRect/>
+          </a:stretch>
+        </p:blipFill>
+        <p:spPr>
+          <a:xfrm>
+            <a:off x="5667374" y="2062162"/>
+            <a:ext cx="3952875" cy="4328561"/>
+          </a:xfrm>
+          <a:prstGeom prst="rect">
+            <a:avLst/>
+          </a:prstGeom>
+        </p:spPr>
+      </p:pic>
+      <p:pic>
+        <p:nvPicPr>
+          <p:cNvPr id="5" name="Picture 4">
+            <a:extLst>
+              <a:ext uri="{FF2B5EF4-FFF2-40B4-BE49-F238E27FC236}">
+                <a16:creationId xmlns:a16="http://schemas.microsoft.com/office/drawing/2014/main" id="{82657D48-7CCE-4369-A794-7E96654923D2}"/>
+              </a:ext>
+            </a:extLst>
+          </p:cNvPr>
+          <p:cNvPicPr>
+            <a:picLocks noChangeAspect="1"/>
+          </p:cNvPicPr>
+          <p:nvPr/>
+        </p:nvPicPr>
+        <p:blipFill>
+          <a:blip r:embed="rId3"/>
+          <a:stretch>
+            <a:fillRect/>
+          </a:stretch>
+        </p:blipFill>
+        <p:spPr>
+          <a:xfrm>
+            <a:off x="923925" y="2062162"/>
+            <a:ext cx="3790950" cy="4375457"/>
+          </a:xfrm>
+          <a:prstGeom prst="rect">
+            <a:avLst/>
+          </a:prstGeom>
+        </p:spPr>
+      </p:pic>
+    </p:spTree>
+    <p:extLst>
+      <p:ext uri="{BB962C8B-B14F-4D97-AF65-F5344CB8AC3E}">
+        <p14:creationId xmlns:p14="http://schemas.microsoft.com/office/powerpoint/2010/main" val="2987967027"/>
+      </p:ext>
+    </p:extLst>
+  </p:cSld>
+  <p:clrMapOvr>
+    <a:masterClrMapping/>
+  </p:clrMapOvr>
+</p:sld>
+</file>
+
+<file path=ppt/slides/slide12.xml><?xml version="1.0" encoding="utf-8"?>
+<p:sld xmlns:a="http://schemas.openxmlformats.org/drawingml/2006/main" xmlns:r="http://schemas.openxmlformats.org/officeDocument/2006/relationships" xmlns:p="http://schemas.openxmlformats.org/presentationml/2006/main">
+  <p:cSld>
+    <p:spTree>
+      <p:nvGrpSpPr>
+        <p:cNvPr id="1" name=""/>
+        <p:cNvGrpSpPr/>
+        <p:nvPr/>
+      </p:nvGrpSpPr>
+      <p:grpSpPr>
+        <a:xfrm>
+          <a:off x="0" y="0"/>
+          <a:ext cx="0" cy="0"/>
+          <a:chOff x="0" y="0"/>
+          <a:chExt cx="0" cy="0"/>
+        </a:xfrm>
+      </p:grpSpPr>
+      <p:sp>
+        <p:nvSpPr>
+          <p:cNvPr id="2" name="Title 1">
+            <a:extLst>
+              <a:ext uri="{FF2B5EF4-FFF2-40B4-BE49-F238E27FC236}">
+                <a16:creationId xmlns:a16="http://schemas.microsoft.com/office/drawing/2014/main" id="{51394D16-C6A6-4875-A366-17B1D87822A8}"/>
+              </a:ext>
+            </a:extLst>
+          </p:cNvPr>
+          <p:cNvSpPr>
+            <a:spLocks noGrp="1"/>
+          </p:cNvSpPr>
+          <p:nvPr>
+            <p:ph type="title"/>
+          </p:nvPr>
+        </p:nvSpPr>
+        <p:spPr/>
+        <p:txBody>
+          <a:bodyPr/>
+          <a:lstStyle/>
+          <a:p>
+            <a:r>
+              <a:rPr lang="en-US" altLang="zh-CN" dirty="0"/>
+              <a:t>Epoch 10</a:t>
+            </a:r>
+            <a:endParaRPr lang="zh-CN" altLang="en-US" dirty="0"/>
+          </a:p>
+        </p:txBody>
+      </p:sp>
+      <p:pic>
+        <p:nvPicPr>
+          <p:cNvPr id="4" name="Picture 3">
+            <a:extLst>
+              <a:ext uri="{FF2B5EF4-FFF2-40B4-BE49-F238E27FC236}">
+                <a16:creationId xmlns:a16="http://schemas.microsoft.com/office/drawing/2014/main" id="{F8E5F8E4-DA25-4291-B8D7-BA4605FEB133}"/>
+              </a:ext>
+            </a:extLst>
+          </p:cNvPr>
+          <p:cNvPicPr>
+            <a:picLocks noChangeAspect="1"/>
+          </p:cNvPicPr>
+          <p:nvPr/>
+        </p:nvPicPr>
+        <p:blipFill>
+          <a:blip r:embed="rId2"/>
+          <a:stretch>
+            <a:fillRect/>
+          </a:stretch>
+        </p:blipFill>
+        <p:spPr>
+          <a:xfrm>
+            <a:off x="6096000" y="2033587"/>
+            <a:ext cx="3752850" cy="4233985"/>
+          </a:xfrm>
+          <a:prstGeom prst="rect">
+            <a:avLst/>
+          </a:prstGeom>
+        </p:spPr>
+      </p:pic>
+      <p:pic>
+        <p:nvPicPr>
+          <p:cNvPr id="5" name="Picture 4">
+            <a:extLst>
+              <a:ext uri="{FF2B5EF4-FFF2-40B4-BE49-F238E27FC236}">
+                <a16:creationId xmlns:a16="http://schemas.microsoft.com/office/drawing/2014/main" id="{604857BE-3B31-4D91-BAD2-31F39C35900A}"/>
+              </a:ext>
+            </a:extLst>
+          </p:cNvPr>
+          <p:cNvPicPr>
+            <a:picLocks noChangeAspect="1"/>
+          </p:cNvPicPr>
+          <p:nvPr/>
+        </p:nvPicPr>
+        <p:blipFill>
+          <a:blip r:embed="rId3"/>
+          <a:stretch>
+            <a:fillRect/>
+          </a:stretch>
+        </p:blipFill>
+        <p:spPr>
+          <a:xfrm>
+            <a:off x="1495424" y="2033587"/>
+            <a:ext cx="3866507" cy="4233985"/>
+          </a:xfrm>
+          <a:prstGeom prst="rect">
+            <a:avLst/>
+          </a:prstGeom>
+        </p:spPr>
+      </p:pic>
+    </p:spTree>
+    <p:extLst>
+      <p:ext uri="{BB962C8B-B14F-4D97-AF65-F5344CB8AC3E}">
+        <p14:creationId xmlns:p14="http://schemas.microsoft.com/office/powerpoint/2010/main" val="3643263494"/>
+      </p:ext>
+    </p:extLst>
+  </p:cSld>
+  <p:clrMapOvr>
+    <a:masterClrMapping/>
+  </p:clrMapOvr>
+</p:sld>
+</file>
+
+<file path=ppt/slides/slide13.xml><?xml version="1.0" encoding="utf-8"?>
+<p:sld xmlns:a="http://schemas.openxmlformats.org/drawingml/2006/main" xmlns:r="http://schemas.openxmlformats.org/officeDocument/2006/relationships" xmlns:p="http://schemas.openxmlformats.org/presentationml/2006/main">
+  <p:cSld>
+    <p:spTree>
+      <p:nvGrpSpPr>
+        <p:cNvPr id="1" name=""/>
+        <p:cNvGrpSpPr/>
+        <p:nvPr/>
+      </p:nvGrpSpPr>
+      <p:grpSpPr>
+        <a:xfrm>
+          <a:off x="0" y="0"/>
+          <a:ext cx="0" cy="0"/>
+          <a:chOff x="0" y="0"/>
+          <a:chExt cx="0" cy="0"/>
+        </a:xfrm>
+      </p:grpSpPr>
+      <p:sp>
+        <p:nvSpPr>
+          <p:cNvPr id="2" name="Title 1">
+            <a:extLst>
+              <a:ext uri="{FF2B5EF4-FFF2-40B4-BE49-F238E27FC236}">
+                <a16:creationId xmlns:a16="http://schemas.microsoft.com/office/drawing/2014/main" id="{FBE18E93-AC30-47FC-A07C-14A39BFC214A}"/>
+              </a:ext>
+            </a:extLst>
+          </p:cNvPr>
+          <p:cNvSpPr>
+            <a:spLocks noGrp="1"/>
+          </p:cNvSpPr>
+          <p:nvPr>
+            <p:ph type="title"/>
+          </p:nvPr>
+        </p:nvSpPr>
+        <p:spPr/>
+        <p:txBody>
+          <a:bodyPr>
+            <a:normAutofit/>
+          </a:bodyPr>
+          <a:lstStyle/>
+          <a:p>
+            <a:r>
+              <a:rPr lang="en-US" altLang="zh-CN" dirty="0"/>
+              <a:t>Eventually… (1.65 </a:t>
+            </a:r>
+            <a:r>
+              <a:rPr lang="en-US" altLang="zh-CN" dirty="0" err="1"/>
+              <a:t>ms</a:t>
+            </a:r>
+            <a:r>
+              <a:rPr lang="en-US" altLang="zh-CN" dirty="0"/>
+              <a:t> according to sim)</a:t>
+            </a:r>
+            <a:br>
+              <a:rPr lang="en-US" altLang="zh-CN" dirty="0"/>
+            </a:br>
+            <a:r>
+              <a:rPr lang="en-US" altLang="zh-CN" dirty="0"/>
+              <a:t>Inadvertently, also tested my saturation check</a:t>
+            </a:r>
+            <a:endParaRPr lang="zh-CN" altLang="en-US" dirty="0"/>
+          </a:p>
+        </p:txBody>
+      </p:sp>
+      <p:pic>
+        <p:nvPicPr>
+          <p:cNvPr id="4" name="Picture 3">
+            <a:extLst>
+              <a:ext uri="{FF2B5EF4-FFF2-40B4-BE49-F238E27FC236}">
+                <a16:creationId xmlns:a16="http://schemas.microsoft.com/office/drawing/2014/main" id="{CFB54D4C-9767-4E56-A081-097928244E08}"/>
+              </a:ext>
+            </a:extLst>
+          </p:cNvPr>
+          <p:cNvPicPr>
+            <a:picLocks noChangeAspect="1"/>
+          </p:cNvPicPr>
+          <p:nvPr/>
+        </p:nvPicPr>
+        <p:blipFill>
+          <a:blip r:embed="rId2"/>
+          <a:stretch>
+            <a:fillRect/>
+          </a:stretch>
+        </p:blipFill>
+        <p:spPr>
+          <a:xfrm>
+            <a:off x="762000" y="2495550"/>
+            <a:ext cx="3081673" cy="3543300"/>
+          </a:xfrm>
+          <a:prstGeom prst="rect">
+            <a:avLst/>
+          </a:prstGeom>
+        </p:spPr>
+      </p:pic>
+      <p:pic>
+        <p:nvPicPr>
+          <p:cNvPr id="6" name="Picture 5">
+            <a:extLst>
+              <a:ext uri="{FF2B5EF4-FFF2-40B4-BE49-F238E27FC236}">
+                <a16:creationId xmlns:a16="http://schemas.microsoft.com/office/drawing/2014/main" id="{1F797CE0-10FB-4BC6-8551-90CC0FD135FB}"/>
+              </a:ext>
+            </a:extLst>
+          </p:cNvPr>
+          <p:cNvPicPr>
+            <a:picLocks noChangeAspect="1"/>
+          </p:cNvPicPr>
+          <p:nvPr/>
+        </p:nvPicPr>
+        <p:blipFill>
+          <a:blip r:embed="rId3"/>
+          <a:stretch>
+            <a:fillRect/>
+          </a:stretch>
+        </p:blipFill>
+        <p:spPr>
+          <a:xfrm>
+            <a:off x="8153400" y="2495550"/>
+            <a:ext cx="3276600" cy="3543300"/>
+          </a:xfrm>
+          <a:prstGeom prst="rect">
+            <a:avLst/>
+          </a:prstGeom>
+        </p:spPr>
+      </p:pic>
+      <p:pic>
+        <p:nvPicPr>
+          <p:cNvPr id="7" name="Picture 6">
+            <a:extLst>
+              <a:ext uri="{FF2B5EF4-FFF2-40B4-BE49-F238E27FC236}">
+                <a16:creationId xmlns:a16="http://schemas.microsoft.com/office/drawing/2014/main" id="{86FEE0AE-B998-4BB5-BEDA-0E00A7C7FBBE}"/>
+              </a:ext>
+            </a:extLst>
+          </p:cNvPr>
+          <p:cNvPicPr>
+            <a:picLocks noChangeAspect="1"/>
+          </p:cNvPicPr>
+          <p:nvPr/>
+        </p:nvPicPr>
+        <p:blipFill>
+          <a:blip r:embed="rId4"/>
+          <a:stretch>
+            <a:fillRect/>
+          </a:stretch>
+        </p:blipFill>
+        <p:spPr>
+          <a:xfrm>
+            <a:off x="4550518" y="2495550"/>
+            <a:ext cx="3090964" cy="3543300"/>
+          </a:xfrm>
+          <a:prstGeom prst="rect">
+            <a:avLst/>
+          </a:prstGeom>
+        </p:spPr>
+      </p:pic>
+    </p:spTree>
+    <p:extLst>
+      <p:ext uri="{BB962C8B-B14F-4D97-AF65-F5344CB8AC3E}">
+        <p14:creationId xmlns:p14="http://schemas.microsoft.com/office/powerpoint/2010/main" val="3509944525"/>
+      </p:ext>
+    </p:extLst>
+  </p:cSld>
+  <p:clrMapOvr>
+    <a:masterClrMapping/>
+  </p:clrMapOvr>
+</p:sld>
+</file>
+
+<file path=ppt/slides/slide14.xml><?xml version="1.0" encoding="utf-8"?>
+<p:sld xmlns:a="http://schemas.openxmlformats.org/drawingml/2006/main" xmlns:r="http://schemas.openxmlformats.org/officeDocument/2006/relationships" xmlns:p="http://schemas.openxmlformats.org/presentationml/2006/main">
+  <p:cSld>
+    <p:spTree>
+      <p:nvGrpSpPr>
+        <p:cNvPr id="1" name=""/>
+        <p:cNvGrpSpPr/>
+        <p:nvPr/>
+      </p:nvGrpSpPr>
+      <p:grpSpPr>
+        <a:xfrm>
+          <a:off x="0" y="0"/>
+          <a:ext cx="0" cy="0"/>
+          <a:chOff x="0" y="0"/>
+          <a:chExt cx="0" cy="0"/>
+        </a:xfrm>
+      </p:grpSpPr>
+      <p:sp>
+        <p:nvSpPr>
+          <p:cNvPr id="2" name="Title 1">
+            <a:extLst>
+              <a:ext uri="{FF2B5EF4-FFF2-40B4-BE49-F238E27FC236}">
+                <a16:creationId xmlns:a16="http://schemas.microsoft.com/office/drawing/2014/main" id="{85687F3E-5189-4275-B1B1-13902E39F554}"/>
+              </a:ext>
+            </a:extLst>
+          </p:cNvPr>
+          <p:cNvSpPr>
+            <a:spLocks noGrp="1"/>
+          </p:cNvSpPr>
+          <p:nvPr>
+            <p:ph type="title"/>
+          </p:nvPr>
+        </p:nvSpPr>
+        <p:spPr/>
+        <p:txBody>
+          <a:bodyPr/>
+          <a:lstStyle/>
+          <a:p>
+            <a:r>
+              <a:rPr lang="en-US" altLang="zh-CN" dirty="0"/>
+              <a:t>Going forward</a:t>
+            </a:r>
+            <a:endParaRPr lang="zh-CN" altLang="en-US" dirty="0"/>
+          </a:p>
+        </p:txBody>
+      </p:sp>
+      <p:sp>
+        <p:nvSpPr>
+          <p:cNvPr id="3" name="Content Placeholder 2">
+            <a:extLst>
+              <a:ext uri="{FF2B5EF4-FFF2-40B4-BE49-F238E27FC236}">
+                <a16:creationId xmlns:a16="http://schemas.microsoft.com/office/drawing/2014/main" id="{6451013B-943F-4562-A2E0-429C7D62CB81}"/>
+              </a:ext>
+            </a:extLst>
+          </p:cNvPr>
+          <p:cNvSpPr>
+            <a:spLocks noGrp="1"/>
+          </p:cNvSpPr>
+          <p:nvPr>
+            <p:ph idx="1"/>
+          </p:nvPr>
+        </p:nvSpPr>
+        <p:spPr/>
+        <p:txBody>
+          <a:bodyPr>
+            <a:normAutofit/>
+          </a:bodyPr>
+          <a:lstStyle/>
+          <a:p>
+            <a:r>
+              <a:rPr lang="en-US" altLang="zh-CN" dirty="0"/>
+              <a:t>Will start writing report</a:t>
+            </a:r>
+          </a:p>
+          <a:p>
+            <a:endParaRPr lang="en-US" altLang="zh-CN" dirty="0"/>
+          </a:p>
+          <a:p>
+            <a:r>
+              <a:rPr lang="en-US" altLang="zh-CN" dirty="0"/>
+              <a:t>Now that training is working, want to define an actual loss function that can be used with labels for the MNIST images. I estimate that I will be able to put about 200 images on the FPGA</a:t>
+            </a:r>
+          </a:p>
+          <a:p>
+            <a:endParaRPr lang="en-US" altLang="zh-CN" dirty="0"/>
+          </a:p>
+          <a:p>
+            <a:r>
+              <a:rPr lang="en-US" altLang="zh-CN" dirty="0"/>
+              <a:t>Ideally, the loss function or signed gradients, although sub-optimal for training, will still be able to realize decent training results, this could allow for a demo</a:t>
+            </a:r>
+          </a:p>
+          <a:p>
+            <a:endParaRPr lang="en-US" altLang="zh-CN" dirty="0"/>
+          </a:p>
+        </p:txBody>
+      </p:sp>
+    </p:spTree>
+    <p:extLst>
+      <p:ext uri="{BB962C8B-B14F-4D97-AF65-F5344CB8AC3E}">
+        <p14:creationId xmlns:p14="http://schemas.microsoft.com/office/powerpoint/2010/main" val="1791042365"/>
+      </p:ext>
+    </p:extLst>
+  </p:cSld>
+  <p:clrMapOvr>
+    <a:masterClrMapping/>
+  </p:clrMapOvr>
+</p:sld>
+</file>
+
+<file path=ppt/slides/slide15.xml><?xml version="1.0" encoding="utf-8"?>
+<p:sld xmlns:a="http://schemas.openxmlformats.org/drawingml/2006/main" xmlns:r="http://schemas.openxmlformats.org/officeDocument/2006/relationships" xmlns:p="http://schemas.openxmlformats.org/presentationml/2006/main">
+  <p:cSld>
+    <p:spTree>
+      <p:nvGrpSpPr>
+        <p:cNvPr id="1" name=""/>
+        <p:cNvGrpSpPr/>
+        <p:nvPr/>
+      </p:nvGrpSpPr>
+      <p:grpSpPr>
+        <a:xfrm>
+          <a:off x="0" y="0"/>
+          <a:ext cx="0" cy="0"/>
+          <a:chOff x="0" y="0"/>
+          <a:chExt cx="0" cy="0"/>
+        </a:xfrm>
+      </p:grpSpPr>
+      <p:sp>
+        <p:nvSpPr>
+          <p:cNvPr id="2" name="Title 1">
+            <a:extLst>
+              <a:ext uri="{FF2B5EF4-FFF2-40B4-BE49-F238E27FC236}">
+                <a16:creationId xmlns:a16="http://schemas.microsoft.com/office/drawing/2014/main" id="{AD26A2D8-5869-4DF3-B9BF-56096FF9AC52}"/>
+              </a:ext>
+            </a:extLst>
+          </p:cNvPr>
+          <p:cNvSpPr>
+            <a:spLocks noGrp="1"/>
+          </p:cNvSpPr>
+          <p:nvPr>
+            <p:ph type="title"/>
+          </p:nvPr>
+        </p:nvSpPr>
+        <p:spPr/>
+        <p:txBody>
+          <a:bodyPr/>
+          <a:lstStyle/>
+          <a:p>
+            <a:r>
+              <a:rPr lang="en-US" dirty="0"/>
+              <a:t>Exam Date</a:t>
+            </a:r>
+          </a:p>
+        </p:txBody>
+      </p:sp>
+      <p:sp>
+        <p:nvSpPr>
+          <p:cNvPr id="3" name="Content Placeholder 2">
+            <a:extLst>
+              <a:ext uri="{FF2B5EF4-FFF2-40B4-BE49-F238E27FC236}">
+                <a16:creationId xmlns:a16="http://schemas.microsoft.com/office/drawing/2014/main" id="{037051C9-5AEE-4626-A93C-EA08C0FEAA0E}"/>
+              </a:ext>
+            </a:extLst>
+          </p:cNvPr>
+          <p:cNvSpPr>
+            <a:spLocks noGrp="1"/>
+          </p:cNvSpPr>
+          <p:nvPr>
+            <p:ph idx="1"/>
+          </p:nvPr>
+        </p:nvSpPr>
+        <p:spPr/>
+        <p:txBody>
+          <a:bodyPr/>
+          <a:lstStyle/>
+          <a:p>
+            <a:r>
+              <a:rPr lang="en-US" dirty="0"/>
+              <a:t>Thesis hand-in is on Friday, June 28, I fly to the US on Wednesday, July 10.</a:t>
+            </a:r>
+          </a:p>
+          <a:p>
+            <a:endParaRPr lang="en-US" dirty="0"/>
+          </a:p>
+          <a:p>
+            <a:r>
+              <a:rPr lang="en-US" dirty="0"/>
+              <a:t>We have tentatively scheduled the exam for July 8, 2019.</a:t>
+            </a:r>
+          </a:p>
+        </p:txBody>
+      </p:sp>
+    </p:spTree>
+    <p:extLst>
+      <p:ext uri="{BB962C8B-B14F-4D97-AF65-F5344CB8AC3E}">
+        <p14:creationId xmlns:p14="http://schemas.microsoft.com/office/powerpoint/2010/main" val="2818833863"/>
+      </p:ext>
+    </p:extLst>
+  </p:cSld>
+  <p:clrMapOvr>
+    <a:masterClrMapping/>
+  </p:clrMapOvr>
+</p:sld>
+</file>
+
 <file path=ppt/slides/slide2.xml><?xml version="1.0" encoding="utf-8"?>
 <p:sld xmlns:a="http://schemas.openxmlformats.org/drawingml/2006/main" xmlns:r="http://schemas.openxmlformats.org/officeDocument/2006/relationships" xmlns:p="http://schemas.openxmlformats.org/presentationml/2006/main">
   <p:cSld>
@@ -3631,7 +4372,7 @@
           <a:p>
             <a:r>
               <a:rPr lang="en-US" altLang="zh-CN" dirty="0"/>
-              <a:t>There are 76,832 gradients for FC0 and 6,664 for FC1… I’ll just randomly choose a few gradients for verification purposes in this ppt</a:t>
+              <a:t>There are 76,832 gradients for FC0 and 6,664 for FC1… I’ll just randomly choose a few gradients for this ppt</a:t>
             </a:r>
             <a:endParaRPr lang="zh-CN" altLang="en-US" dirty="0"/>
           </a:p>
@@ -3672,7 +4413,7 @@
           <p:cNvPr id="2" name="Title 1">
             <a:extLst>
               <a:ext uri="{FF2B5EF4-FFF2-40B4-BE49-F238E27FC236}">
-                <a16:creationId xmlns:a16="http://schemas.microsoft.com/office/drawing/2014/main" id="{FB1A49BE-B983-4A95-85AA-BC47D4A5FD31}"/>
+                <a16:creationId xmlns:a16="http://schemas.microsoft.com/office/drawing/2014/main" id="{0D62E00A-6286-4A9E-8A4B-0EAFA289D414}"/>
               </a:ext>
             </a:extLst>
           </p:cNvPr>
@@ -3683,48 +4424,67 @@
             <p:ph type="title"/>
           </p:nvPr>
         </p:nvSpPr>
-        <p:spPr/>
-        <p:txBody>
-          <a:bodyPr/>
-          <a:lstStyle/>
-          <a:p>
-            <a:r>
-              <a:rPr lang="en-US" altLang="zh-CN" dirty="0"/>
-              <a:t>Update Architecture</a:t>
-            </a:r>
-            <a:endParaRPr lang="zh-CN" altLang="en-US" dirty="0"/>
-          </a:p>
-        </p:txBody>
-      </p:sp>
-      <p:sp>
-        <p:nvSpPr>
-          <p:cNvPr id="3" name="Content Placeholder 2">
-            <a:extLst>
-              <a:ext uri="{FF2B5EF4-FFF2-40B4-BE49-F238E27FC236}">
-                <a16:creationId xmlns:a16="http://schemas.microsoft.com/office/drawing/2014/main" id="{84300096-717B-499B-8CCB-0E36E882FAA0}"/>
-              </a:ext>
-            </a:extLst>
-          </p:cNvPr>
-          <p:cNvSpPr>
-            <a:spLocks noGrp="1"/>
-          </p:cNvSpPr>
-          <p:nvPr>
-            <p:ph idx="1"/>
-          </p:nvPr>
-        </p:nvSpPr>
-        <p:spPr/>
-        <p:txBody>
-          <a:bodyPr/>
-          <a:lstStyle/>
-          <a:p>
-            <a:endParaRPr lang="zh-CN" altLang="en-US"/>
-          </a:p>
-        </p:txBody>
-      </p:sp>
+        <p:spPr>
+          <a:xfrm>
+            <a:off x="452845" y="291101"/>
+            <a:ext cx="12191999" cy="1325563"/>
+          </a:xfrm>
+        </p:spPr>
+        <p:txBody>
+          <a:bodyPr>
+            <a:normAutofit/>
+          </a:bodyPr>
+          <a:lstStyle/>
+          <a:p>
+            <a:r>
+              <a:rPr lang="en-US" altLang="zh-CN" sz="3600" dirty="0"/>
+              <a:t>Layer States </a:t>
+            </a:r>
+            <a:br>
+              <a:rPr lang="en-US" altLang="zh-CN" sz="3600" dirty="0"/>
+            </a:br>
+            <a:r>
+              <a:rPr lang="en-US" altLang="zh-CN" sz="3600" dirty="0"/>
+              <a:t>Currently designed to train constantly over provided input</a:t>
+            </a:r>
+            <a:endParaRPr lang="zh-CN" altLang="en-US" sz="3600" dirty="0"/>
+          </a:p>
+        </p:txBody>
+      </p:sp>
+      <p:pic>
+        <p:nvPicPr>
+          <p:cNvPr id="10" name="Picture 9">
+            <a:extLst>
+              <a:ext uri="{FF2B5EF4-FFF2-40B4-BE49-F238E27FC236}">
+                <a16:creationId xmlns:a16="http://schemas.microsoft.com/office/drawing/2014/main" id="{D27FCDF7-57AC-4BFA-9D5A-6B2A9627AE1F}"/>
+              </a:ext>
+            </a:extLst>
+          </p:cNvPr>
+          <p:cNvPicPr>
+            <a:picLocks noChangeAspect="1"/>
+          </p:cNvPicPr>
+          <p:nvPr/>
+        </p:nvPicPr>
+        <p:blipFill>
+          <a:blip r:embed="rId2"/>
+          <a:stretch>
+            <a:fillRect/>
+          </a:stretch>
+        </p:blipFill>
+        <p:spPr>
+          <a:xfrm>
+            <a:off x="1134291" y="1582465"/>
+            <a:ext cx="9350806" cy="4910410"/>
+          </a:xfrm>
+          <a:prstGeom prst="rect">
+            <a:avLst/>
+          </a:prstGeom>
+        </p:spPr>
+      </p:pic>
     </p:spTree>
     <p:extLst>
       <p:ext uri="{BB962C8B-B14F-4D97-AF65-F5344CB8AC3E}">
-        <p14:creationId xmlns:p14="http://schemas.microsoft.com/office/powerpoint/2010/main" val="1825244501"/>
+        <p14:creationId xmlns:p14="http://schemas.microsoft.com/office/powerpoint/2010/main" val="52551945"/>
       </p:ext>
     </p:extLst>
   </p:cSld>
@@ -3756,7 +4516,7 @@
           <p:cNvPr id="2" name="Title 1">
             <a:extLst>
               <a:ext uri="{FF2B5EF4-FFF2-40B4-BE49-F238E27FC236}">
-                <a16:creationId xmlns:a16="http://schemas.microsoft.com/office/drawing/2014/main" id="{620F2A72-31B1-4948-AC29-7746A328F5E5}"/>
+                <a16:creationId xmlns:a16="http://schemas.microsoft.com/office/drawing/2014/main" id="{FB1A49BE-B983-4A95-85AA-BC47D4A5FD31}"/>
               </a:ext>
             </a:extLst>
           </p:cNvPr>
@@ -3774,7 +4534,7 @@
           <a:p>
             <a:r>
               <a:rPr lang="en-US" altLang="zh-CN" dirty="0"/>
-              <a:t>Simple Functional Test of the Training Cycle</a:t>
+              <a:t>Update Architecture</a:t>
             </a:r>
             <a:endParaRPr lang="zh-CN" altLang="en-US" dirty="0"/>
           </a:p>
@@ -3785,7 +4545,7 @@
           <p:cNvPr id="3" name="Content Placeholder 2">
             <a:extLst>
               <a:ext uri="{FF2B5EF4-FFF2-40B4-BE49-F238E27FC236}">
-                <a16:creationId xmlns:a16="http://schemas.microsoft.com/office/drawing/2014/main" id="{9D836AD8-2C29-465E-9287-92EA975E4F32}"/>
+                <a16:creationId xmlns:a16="http://schemas.microsoft.com/office/drawing/2014/main" id="{84300096-717B-499B-8CCB-0E36E882FAA0}"/>
               </a:ext>
             </a:extLst>
           </p:cNvPr>
@@ -3796,47 +4556,124 @@
             <p:ph idx="1"/>
           </p:nvPr>
         </p:nvSpPr>
-        <p:spPr/>
+        <p:spPr>
+          <a:xfrm>
+            <a:off x="838199" y="1825625"/>
+            <a:ext cx="11005457" cy="4351338"/>
+          </a:xfrm>
+        </p:spPr>
         <p:txBody>
           <a:bodyPr/>
           <a:lstStyle/>
           <a:p>
             <a:r>
               <a:rPr lang="en-US" altLang="zh-CN" dirty="0"/>
-              <a:t>Current input data is still random, but let’s assume it is a ‘0’. Since the loss function is not implemented, we can set the loss gradients to be negative for 0 (if neuron 0’s output increases, loss decreases), and positive for the others</a:t>
+              <a:t>Idea – Iterate a pointer over the BRAM, updating weights as you go</a:t>
+            </a:r>
+          </a:p>
+          <a:p>
+            <a:r>
+              <a:rPr lang="en-US" altLang="zh-CN" dirty="0"/>
+              <a:t>Two cycles for each pointer iteration</a:t>
+            </a:r>
+          </a:p>
+          <a:p>
+            <a:r>
+              <a:rPr lang="en-US" altLang="zh-CN" dirty="0"/>
+              <a:t>Cycle 1</a:t>
             </a:r>
           </a:p>
           <a:p>
             <a:pPr lvl="1"/>
             <a:r>
               <a:rPr lang="en-US" altLang="zh-CN" dirty="0"/>
-              <a:t>This could be actually be used for the training process down the road since it isn’t so far off from what loss functions are doing</a:t>
+              <a:t>Read </a:t>
+            </a:r>
+            <a:r>
+              <a:rPr lang="en-US" altLang="zh-CN" dirty="0" err="1"/>
+              <a:t>weight</a:t>
+            </a:r>
+            <a:r>
+              <a:rPr lang="en-US" altLang="zh-CN" baseline="-25000" dirty="0" err="1"/>
+              <a:t>old</a:t>
+            </a:r>
+            <a:r>
+              <a:rPr lang="en-US" altLang="zh-CN" dirty="0"/>
+              <a:t> from weight BRAM</a:t>
             </a:r>
           </a:p>
           <a:p>
             <a:pPr lvl="1"/>
             <a:r>
               <a:rPr lang="en-US" altLang="zh-CN" dirty="0"/>
-              <a:t>Otherwise, I can implement loss function using sigmoid: </a:t>
-            </a:r>
-            <a:r>
-              <a:rPr lang="el-GR" altLang="zh-CN" dirty="0"/>
-              <a:t>tanh(x)=2σ(2⋅x)−1</a:t>
-            </a:r>
-            <a:endParaRPr lang="en-US" altLang="zh-CN" dirty="0"/>
-          </a:p>
-          <a:p>
-            <a:pPr lvl="2"/>
+              <a:t>Read gradient from weight gradient BRAM</a:t>
+            </a:r>
+          </a:p>
+          <a:p>
             <a:r>
               <a:rPr lang="en-US" altLang="zh-CN" dirty="0"/>
-              <a:t>Tanh is supported with a CORDIC core</a:t>
-            </a:r>
-          </a:p>
-          <a:p>
-            <a:pPr lvl="2"/>
+              <a:t>Cycle 2</a:t>
+            </a:r>
+          </a:p>
+          <a:p>
+            <a:pPr lvl="1"/>
+            <a:r>
+              <a:rPr lang="en-US" altLang="zh-CN" dirty="0" err="1"/>
+              <a:t>weight</a:t>
+            </a:r>
+            <a:r>
+              <a:rPr lang="en-US" altLang="zh-CN" baseline="-25000" dirty="0" err="1"/>
+              <a:t>new</a:t>
+            </a:r>
             <a:r>
               <a:rPr lang="en-US" altLang="zh-CN" dirty="0"/>
-              <a:t>Might just be better to set positive gradients for wrong labels and negative for correct for sake of time </a:t>
+              <a:t> = </a:t>
+            </a:r>
+            <a:r>
+              <a:rPr lang="en-US" altLang="zh-CN" dirty="0" err="1"/>
+              <a:t>weight</a:t>
+            </a:r>
+            <a:r>
+              <a:rPr lang="en-US" altLang="zh-CN" baseline="-25000" dirty="0" err="1"/>
+              <a:t>old</a:t>
+            </a:r>
+            <a:r>
+              <a:rPr lang="en-US" altLang="zh-CN" dirty="0"/>
+              <a:t> and gradient * </a:t>
+            </a:r>
+            <a:r>
+              <a:rPr lang="en-US" altLang="zh-CN" dirty="0" err="1"/>
+              <a:t>learning_rate</a:t>
+            </a:r>
+            <a:r>
+              <a:rPr lang="en-US" altLang="zh-CN" dirty="0"/>
+              <a:t> (0.125 in demo, right shift of 3)</a:t>
+            </a:r>
+          </a:p>
+          <a:p>
+            <a:pPr lvl="1"/>
+            <a:r>
+              <a:rPr lang="en-US" altLang="zh-CN" dirty="0"/>
+              <a:t>Write </a:t>
+            </a:r>
+            <a:r>
+              <a:rPr lang="en-US" altLang="zh-CN" dirty="0" err="1"/>
+              <a:t>weight</a:t>
+            </a:r>
+            <a:r>
+              <a:rPr lang="en-US" altLang="zh-CN" baseline="-25000" dirty="0" err="1"/>
+              <a:t>new</a:t>
+            </a:r>
+            <a:r>
+              <a:rPr lang="en-US" altLang="zh-CN" dirty="0"/>
+              <a:t> to weight BRAM</a:t>
+            </a:r>
+          </a:p>
+          <a:p>
+            <a:pPr lvl="1"/>
+            <a:r>
+              <a:rPr lang="en-US" altLang="zh-CN"/>
+              <a:t>Increment pointer</a:t>
             </a:r>
             <a:endParaRPr lang="zh-CN" altLang="en-US" dirty="0"/>
           </a:p>
@@ -3845,7 +4682,7 @@
     </p:spTree>
     <p:extLst>
       <p:ext uri="{BB962C8B-B14F-4D97-AF65-F5344CB8AC3E}">
-        <p14:creationId xmlns:p14="http://schemas.microsoft.com/office/powerpoint/2010/main" val="3275563590"/>
+        <p14:creationId xmlns:p14="http://schemas.microsoft.com/office/powerpoint/2010/main" val="1825244501"/>
       </p:ext>
     </p:extLst>
   </p:cSld>
@@ -3877,7 +4714,7 @@
           <p:cNvPr id="2" name="Title 1">
             <a:extLst>
               <a:ext uri="{FF2B5EF4-FFF2-40B4-BE49-F238E27FC236}">
-                <a16:creationId xmlns:a16="http://schemas.microsoft.com/office/drawing/2014/main" id="{A793E1C9-5550-458F-8F58-0A110662436F}"/>
+                <a16:creationId xmlns:a16="http://schemas.microsoft.com/office/drawing/2014/main" id="{620F2A72-31B1-4948-AC29-7746A328F5E5}"/>
               </a:ext>
             </a:extLst>
           </p:cNvPr>
@@ -3906,7 +4743,7 @@
           <p:cNvPr id="3" name="Content Placeholder 2">
             <a:extLst>
               <a:ext uri="{FF2B5EF4-FFF2-40B4-BE49-F238E27FC236}">
-                <a16:creationId xmlns:a16="http://schemas.microsoft.com/office/drawing/2014/main" id="{0A49D577-9403-4700-8988-5BAF80FD8816}"/>
+                <a16:creationId xmlns:a16="http://schemas.microsoft.com/office/drawing/2014/main" id="{9D836AD8-2C29-465E-9287-92EA975E4F32}"/>
               </a:ext>
             </a:extLst>
           </p:cNvPr>
@@ -3917,23 +4754,99 @@
             <p:ph idx="1"/>
           </p:nvPr>
         </p:nvSpPr>
-        <p:spPr/>
-        <p:txBody>
-          <a:bodyPr/>
+        <p:spPr>
+          <a:xfrm>
+            <a:off x="365761" y="1825625"/>
+            <a:ext cx="11591108" cy="4351338"/>
+          </a:xfrm>
+        </p:spPr>
+        <p:txBody>
+          <a:bodyPr>
+            <a:normAutofit/>
+          </a:bodyPr>
           <a:lstStyle/>
           <a:p>
             <a:r>
               <a:rPr lang="en-US" altLang="zh-CN" dirty="0"/>
-              <a:t>Initial Output (Hex simulated and Python script verified)</a:t>
+              <a:t>Current input data is still random, but let’s assume it is a ‘0’. Since the loss function is not implemented, we can set the loss gradients to be negative for 0 (if neuron 0’s output increases, loss decreases), and positive for the others</a:t>
+            </a:r>
+          </a:p>
+          <a:p>
+            <a:pPr lvl="1"/>
+            <a:r>
+              <a:rPr lang="en-US" altLang="zh-CN" dirty="0"/>
+              <a:t>This could be actually be used for the training process down the road since it isn’t so far off from what loss functions are doing</a:t>
+            </a:r>
+          </a:p>
+          <a:p>
+            <a:pPr lvl="1"/>
+            <a:r>
+              <a:rPr lang="en-US" altLang="zh-CN" dirty="0"/>
+              <a:t>Otherwise, I can implement loss function using sigmoid: </a:t>
+            </a:r>
+            <a:r>
+              <a:rPr lang="el-GR" altLang="zh-CN" dirty="0"/>
+              <a:t>tanh(x)=2σ(2⋅x)−1</a:t>
+            </a:r>
+            <a:endParaRPr lang="en-US" altLang="zh-CN" dirty="0"/>
+          </a:p>
+          <a:p>
+            <a:pPr lvl="2"/>
+            <a:r>
+              <a:rPr lang="en-US" altLang="zh-CN" dirty="0"/>
+              <a:t>Tanh is supported with a CORDIC core</a:t>
+            </a:r>
+          </a:p>
+          <a:p>
+            <a:pPr lvl="2"/>
+            <a:r>
+              <a:rPr lang="en-US" altLang="zh-CN" dirty="0"/>
+              <a:t>Might just be better to set positive gradients for wrong labels and negative for correct for sake of time </a:t>
+            </a:r>
+          </a:p>
+          <a:p>
+            <a:r>
+              <a:rPr lang="en-US" altLang="zh-CN" dirty="0"/>
+              <a:t>In this test, the update only happens in fc2, extension to fc1 and fc0 should be quick. fc2_gradients[0] = -1, all others are 1</a:t>
             </a:r>
             <a:endParaRPr lang="zh-CN" altLang="en-US" dirty="0"/>
           </a:p>
         </p:txBody>
       </p:sp>
+      <p:pic>
+        <p:nvPicPr>
+          <p:cNvPr id="5" name="Picture 4">
+            <a:extLst>
+              <a:ext uri="{FF2B5EF4-FFF2-40B4-BE49-F238E27FC236}">
+                <a16:creationId xmlns:a16="http://schemas.microsoft.com/office/drawing/2014/main" id="{A3D74EFB-3DAB-4588-83FE-09F2A147BDB1}"/>
+              </a:ext>
+            </a:extLst>
+          </p:cNvPr>
+          <p:cNvPicPr>
+            <a:picLocks noChangeAspect="1"/>
+          </p:cNvPicPr>
+          <p:nvPr/>
+        </p:nvPicPr>
+        <p:blipFill>
+          <a:blip r:embed="rId2"/>
+          <a:stretch>
+            <a:fillRect/>
+          </a:stretch>
+        </p:blipFill>
+        <p:spPr>
+          <a:xfrm>
+            <a:off x="2409825" y="5964237"/>
+            <a:ext cx="8229600" cy="695325"/>
+          </a:xfrm>
+          <a:prstGeom prst="rect">
+            <a:avLst/>
+          </a:prstGeom>
+        </p:spPr>
+      </p:pic>
     </p:spTree>
     <p:extLst>
       <p:ext uri="{BB962C8B-B14F-4D97-AF65-F5344CB8AC3E}">
-        <p14:creationId xmlns:p14="http://schemas.microsoft.com/office/powerpoint/2010/main" val="3979021210"/>
+        <p14:creationId xmlns:p14="http://schemas.microsoft.com/office/powerpoint/2010/main" val="3275563590"/>
       </p:ext>
     </p:extLst>
   </p:cSld>
@@ -3965,7 +4878,7 @@
           <p:cNvPr id="2" name="Title 1">
             <a:extLst>
               <a:ext uri="{FF2B5EF4-FFF2-40B4-BE49-F238E27FC236}">
-                <a16:creationId xmlns:a16="http://schemas.microsoft.com/office/drawing/2014/main" id="{85687F3E-5189-4275-B1B1-13902E39F554}"/>
+                <a16:creationId xmlns:a16="http://schemas.microsoft.com/office/drawing/2014/main" id="{A793E1C9-5550-458F-8F58-0A110662436F}"/>
               </a:ext>
             </a:extLst>
           </p:cNvPr>
@@ -3983,7 +4896,7 @@
           <a:p>
             <a:r>
               <a:rPr lang="en-US" altLang="zh-CN" dirty="0"/>
-              <a:t>Going forward</a:t>
+              <a:t>Simple Functional Test of the Training Cycle</a:t>
             </a:r>
             <a:endParaRPr lang="zh-CN" altLang="en-US" dirty="0"/>
           </a:p>
@@ -3994,7 +4907,7 @@
           <p:cNvPr id="3" name="Content Placeholder 2">
             <a:extLst>
               <a:ext uri="{FF2B5EF4-FFF2-40B4-BE49-F238E27FC236}">
-                <a16:creationId xmlns:a16="http://schemas.microsoft.com/office/drawing/2014/main" id="{6451013B-943F-4562-A2E0-429C7D62CB81}"/>
+                <a16:creationId xmlns:a16="http://schemas.microsoft.com/office/drawing/2014/main" id="{0A49D577-9403-4700-8988-5BAF80FD8816}"/>
               </a:ext>
             </a:extLst>
           </p:cNvPr>
@@ -4005,45 +4918,233 @@
             <p:ph idx="1"/>
           </p:nvPr>
         </p:nvSpPr>
-        <p:spPr/>
-        <p:txBody>
-          <a:bodyPr>
-            <a:normAutofit/>
+        <p:spPr>
+          <a:xfrm>
+            <a:off x="557349" y="1825625"/>
+            <a:ext cx="11491775" cy="4351338"/>
+          </a:xfrm>
+        </p:spPr>
+        <p:txBody>
+          <a:bodyPr/>
+          <a:lstStyle/>
+          <a:p>
+            <a:r>
+              <a:rPr lang="en-US" altLang="zh-CN" dirty="0"/>
+              <a:t>Initial Output (Hex simulated and Python script verified)</a:t>
+            </a:r>
+          </a:p>
+          <a:p>
+            <a:r>
+              <a:rPr lang="en-US" altLang="zh-CN" dirty="0"/>
+              <a:t>Out is totally “wrong”, neuron 0 has the 2nd most negative output</a:t>
+            </a:r>
+          </a:p>
+          <a:p>
+            <a:pPr lvl="1"/>
+            <a:r>
+              <a:rPr lang="en-US" altLang="zh-CN" dirty="0"/>
+              <a:t>Only converted a few hex numbers to decimal because they have been verified before</a:t>
+            </a:r>
+            <a:endParaRPr lang="zh-CN" altLang="en-US" dirty="0"/>
+          </a:p>
+        </p:txBody>
+      </p:sp>
+      <p:pic>
+        <p:nvPicPr>
+          <p:cNvPr id="4" name="Picture 3">
+            <a:extLst>
+              <a:ext uri="{FF2B5EF4-FFF2-40B4-BE49-F238E27FC236}">
+                <a16:creationId xmlns:a16="http://schemas.microsoft.com/office/drawing/2014/main" id="{5694DD34-E20C-410C-B5B3-7C20F0769922}"/>
+              </a:ext>
+            </a:extLst>
+          </p:cNvPr>
+          <p:cNvPicPr>
+            <a:picLocks noChangeAspect="1"/>
+          </p:cNvPicPr>
+          <p:nvPr/>
+        </p:nvPicPr>
+        <p:blipFill>
+          <a:blip r:embed="rId2"/>
+          <a:stretch>
+            <a:fillRect/>
+          </a:stretch>
+        </p:blipFill>
+        <p:spPr>
+          <a:xfrm>
+            <a:off x="6191251" y="3241947"/>
+            <a:ext cx="4467224" cy="3564440"/>
+          </a:xfrm>
+          <a:prstGeom prst="rect">
+            <a:avLst/>
+          </a:prstGeom>
+        </p:spPr>
+      </p:pic>
+      <p:pic>
+        <p:nvPicPr>
+          <p:cNvPr id="5" name="Picture 4">
+            <a:extLst>
+              <a:ext uri="{FF2B5EF4-FFF2-40B4-BE49-F238E27FC236}">
+                <a16:creationId xmlns:a16="http://schemas.microsoft.com/office/drawing/2014/main" id="{129A8C0E-3FF0-43E6-B4DE-6FB6BF7939ED}"/>
+              </a:ext>
+            </a:extLst>
+          </p:cNvPr>
+          <p:cNvPicPr>
+            <a:picLocks noChangeAspect="1"/>
+          </p:cNvPicPr>
+          <p:nvPr/>
+        </p:nvPicPr>
+        <p:blipFill>
+          <a:blip r:embed="rId3"/>
+          <a:stretch>
+            <a:fillRect/>
+          </a:stretch>
+        </p:blipFill>
+        <p:spPr>
+          <a:xfrm>
+            <a:off x="2992742" y="3241947"/>
+            <a:ext cx="3198509" cy="3564440"/>
+          </a:xfrm>
+          <a:prstGeom prst="rect">
+            <a:avLst/>
+          </a:prstGeom>
+        </p:spPr>
+      </p:pic>
+      <p:sp>
+        <p:nvSpPr>
+          <p:cNvPr id="6" name="TextBox 5">
+            <a:extLst>
+              <a:ext uri="{FF2B5EF4-FFF2-40B4-BE49-F238E27FC236}">
+                <a16:creationId xmlns:a16="http://schemas.microsoft.com/office/drawing/2014/main" id="{4E72D799-D71E-4363-BB63-B61787581206}"/>
+              </a:ext>
+            </a:extLst>
+          </p:cNvPr>
+          <p:cNvSpPr txBox="1"/>
+          <p:nvPr/>
+        </p:nvSpPr>
+        <p:spPr>
+          <a:xfrm>
+            <a:off x="4400545" y="4000775"/>
+            <a:ext cx="1114425" cy="400110"/>
+          </a:xfrm>
+          <a:prstGeom prst="rect">
+            <a:avLst/>
+          </a:prstGeom>
+          <a:noFill/>
+        </p:spPr>
+        <p:txBody>
+          <a:bodyPr wrap="square" rtlCol="0">
+            <a:spAutoFit/>
           </a:bodyPr>
           <a:lstStyle/>
           <a:p>
             <a:r>
-              <a:rPr lang="en-US" altLang="zh-CN" dirty="0"/>
-              <a:t>Will start writing report</a:t>
-            </a:r>
-          </a:p>
-          <a:p>
-            <a:endParaRPr lang="en-US" altLang="zh-CN" dirty="0"/>
-          </a:p>
-          <a:p>
-            <a:r>
-              <a:rPr lang="en-US" altLang="zh-CN" dirty="0"/>
-              <a:t>Now that training is working, want to define an actual loss function that can be used with labels for the MNIST images. I estimate that I will be able to put about 200 images on the FPGA</a:t>
-            </a:r>
-          </a:p>
-          <a:p>
-            <a:endParaRPr lang="en-US" altLang="zh-CN" dirty="0"/>
-          </a:p>
-          <a:p>
-            <a:r>
-              <a:rPr lang="en-US" altLang="zh-CN" dirty="0"/>
-              <a:t>Ideally, the loss function or signed gradients, although sub-optimal for training, will still be able to realize decent training results, this could allow for a demo</a:t>
-            </a:r>
-          </a:p>
-          <a:p>
-            <a:endParaRPr lang="en-US" altLang="zh-CN" dirty="0"/>
+              <a:rPr lang="en-US" altLang="zh-CN" sz="2000" dirty="0">
+                <a:solidFill>
+                  <a:schemeClr val="bg1"/>
+                </a:solidFill>
+              </a:rPr>
+              <a:t>-0.26294</a:t>
+            </a:r>
+            <a:endParaRPr lang="zh-CN" altLang="en-US" sz="2000" dirty="0">
+              <a:solidFill>
+                <a:schemeClr val="bg1"/>
+              </a:solidFill>
+            </a:endParaRPr>
+          </a:p>
+        </p:txBody>
+      </p:sp>
+      <p:sp>
+        <p:nvSpPr>
+          <p:cNvPr id="7" name="TextBox 6">
+            <a:extLst>
+              <a:ext uri="{FF2B5EF4-FFF2-40B4-BE49-F238E27FC236}">
+                <a16:creationId xmlns:a16="http://schemas.microsoft.com/office/drawing/2014/main" id="{C0F9CEDA-6B8F-4165-B161-AA8E467FA23B}"/>
+              </a:ext>
+            </a:extLst>
+          </p:cNvPr>
+          <p:cNvSpPr txBox="1"/>
+          <p:nvPr/>
+        </p:nvSpPr>
+        <p:spPr>
+          <a:xfrm>
+            <a:off x="4400546" y="4270502"/>
+            <a:ext cx="1114425" cy="400110"/>
+          </a:xfrm>
+          <a:prstGeom prst="rect">
+            <a:avLst/>
+          </a:prstGeom>
+          <a:noFill/>
+        </p:spPr>
+        <p:txBody>
+          <a:bodyPr wrap="square" rtlCol="0">
+            <a:spAutoFit/>
+          </a:bodyPr>
+          <a:lstStyle/>
+          <a:p>
+            <a:r>
+              <a:rPr lang="en-US" altLang="zh-CN" sz="2000" dirty="0">
+                <a:solidFill>
+                  <a:schemeClr val="bg1"/>
+                </a:solidFill>
+              </a:rPr>
+              <a:t>-0.09814</a:t>
+            </a:r>
+            <a:endParaRPr lang="zh-CN" altLang="en-US" sz="2000" dirty="0">
+              <a:solidFill>
+                <a:schemeClr val="bg1"/>
+              </a:solidFill>
+            </a:endParaRPr>
+          </a:p>
+        </p:txBody>
+      </p:sp>
+      <p:sp>
+        <p:nvSpPr>
+          <p:cNvPr id="9" name="TextBox 8">
+            <a:extLst>
+              <a:ext uri="{FF2B5EF4-FFF2-40B4-BE49-F238E27FC236}">
+                <a16:creationId xmlns:a16="http://schemas.microsoft.com/office/drawing/2014/main" id="{7EF9A8A6-C30F-4AFB-A4FF-C3EA23115F72}"/>
+              </a:ext>
+            </a:extLst>
+          </p:cNvPr>
+          <p:cNvSpPr txBox="1"/>
+          <p:nvPr/>
+        </p:nvSpPr>
+        <p:spPr>
+          <a:xfrm>
+            <a:off x="4478923" y="5075245"/>
+            <a:ext cx="1114425" cy="400110"/>
+          </a:xfrm>
+          <a:prstGeom prst="rect">
+            <a:avLst/>
+          </a:prstGeom>
+          <a:noFill/>
+        </p:spPr>
+        <p:txBody>
+          <a:bodyPr wrap="square" rtlCol="0">
+            <a:spAutoFit/>
+          </a:bodyPr>
+          <a:lstStyle/>
+          <a:p>
+            <a:r>
+              <a:rPr lang="en-US" altLang="zh-CN" sz="2000" dirty="0">
+                <a:solidFill>
+                  <a:schemeClr val="bg1"/>
+                </a:solidFill>
+              </a:rPr>
+              <a:t>0.10620</a:t>
+            </a:r>
+            <a:endParaRPr lang="zh-CN" altLang="en-US" sz="2000" dirty="0">
+              <a:solidFill>
+                <a:schemeClr val="bg1"/>
+              </a:solidFill>
+            </a:endParaRPr>
           </a:p>
         </p:txBody>
       </p:sp>
     </p:spTree>
     <p:extLst>
       <p:ext uri="{BB962C8B-B14F-4D97-AF65-F5344CB8AC3E}">
-        <p14:creationId xmlns:p14="http://schemas.microsoft.com/office/powerpoint/2010/main" val="1791042365"/>
+        <p14:creationId xmlns:p14="http://schemas.microsoft.com/office/powerpoint/2010/main" val="3979021210"/>
       </p:ext>
     </p:extLst>
   </p:cSld>
@@ -4075,7 +5176,7 @@
           <p:cNvPr id="2" name="Title 1">
             <a:extLst>
               <a:ext uri="{FF2B5EF4-FFF2-40B4-BE49-F238E27FC236}">
-                <a16:creationId xmlns:a16="http://schemas.microsoft.com/office/drawing/2014/main" id="{7EE5A697-ED74-4937-90C3-BAAD49C43562}"/>
+                <a16:creationId xmlns:a16="http://schemas.microsoft.com/office/drawing/2014/main" id="{F93C7AB1-8EFB-4066-96DB-14A7E1A346D0}"/>
               </a:ext>
             </a:extLst>
           </p:cNvPr>
@@ -4092,73 +5193,76 @@
           <a:lstStyle/>
           <a:p>
             <a:r>
-              <a:rPr lang="en-US" dirty="0"/>
-              <a:t>Report Writing (Questions)</a:t>
-            </a:r>
-          </a:p>
-        </p:txBody>
-      </p:sp>
-      <p:sp>
-        <p:nvSpPr>
-          <p:cNvPr id="3" name="Content Placeholder 2">
-            <a:extLst>
-              <a:ext uri="{FF2B5EF4-FFF2-40B4-BE49-F238E27FC236}">
-                <a16:creationId xmlns:a16="http://schemas.microsoft.com/office/drawing/2014/main" id="{1C212DA7-6C6E-4274-974D-C61F6265B813}"/>
-              </a:ext>
-            </a:extLst>
-          </p:cNvPr>
-          <p:cNvSpPr>
-            <a:spLocks noGrp="1"/>
-          </p:cNvSpPr>
-          <p:nvPr>
-            <p:ph idx="1"/>
-          </p:nvPr>
-        </p:nvSpPr>
-        <p:spPr/>
-        <p:txBody>
-          <a:bodyPr/>
-          <a:lstStyle/>
-          <a:p>
-            <a:r>
-              <a:rPr lang="en-US" dirty="0"/>
-              <a:t>Should source code go in the appendix in addition to the </a:t>
-            </a:r>
-            <a:r>
-              <a:rPr lang="en-US" dirty="0" err="1"/>
-              <a:t>Github</a:t>
-            </a:r>
-            <a:r>
-              <a:rPr lang="en-US" dirty="0"/>
-              <a:t> repository link? </a:t>
-            </a:r>
-          </a:p>
-          <a:p>
-            <a:endParaRPr lang="en-US" dirty="0"/>
-          </a:p>
-          <a:p>
-            <a:endParaRPr lang="en-US" dirty="0"/>
-          </a:p>
-          <a:p>
-            <a:pPr marL="0" indent="0">
-              <a:buNone/>
-            </a:pPr>
-            <a:endParaRPr lang="en-US" dirty="0"/>
-          </a:p>
-          <a:p>
-            <a:pPr marL="0" indent="0">
-              <a:buNone/>
-            </a:pPr>
-            <a:endParaRPr lang="en-US" dirty="0"/>
-          </a:p>
-          <a:p>
-            <a:endParaRPr lang="en-US" dirty="0"/>
-          </a:p>
-        </p:txBody>
-      </p:sp>
+              <a:rPr lang="en-US" altLang="zh-CN" dirty="0"/>
+              <a:t>Epoch 1</a:t>
+            </a:r>
+            <a:endParaRPr lang="zh-CN" altLang="en-US" dirty="0"/>
+          </a:p>
+        </p:txBody>
+      </p:sp>
+      <p:pic>
+        <p:nvPicPr>
+          <p:cNvPr id="4" name="Picture 3">
+            <a:extLst>
+              <a:ext uri="{FF2B5EF4-FFF2-40B4-BE49-F238E27FC236}">
+                <a16:creationId xmlns:a16="http://schemas.microsoft.com/office/drawing/2014/main" id="{FFFFCCB6-2469-4C1A-A894-DCA4BF0B4255}"/>
+              </a:ext>
+            </a:extLst>
+          </p:cNvPr>
+          <p:cNvPicPr>
+            <a:picLocks noChangeAspect="1"/>
+          </p:cNvPicPr>
+          <p:nvPr/>
+        </p:nvPicPr>
+        <p:blipFill>
+          <a:blip r:embed="rId2"/>
+          <a:stretch>
+            <a:fillRect/>
+          </a:stretch>
+        </p:blipFill>
+        <p:spPr>
+          <a:xfrm>
+            <a:off x="2377441" y="2426162"/>
+            <a:ext cx="3327218" cy="3707874"/>
+          </a:xfrm>
+          <a:prstGeom prst="rect">
+            <a:avLst/>
+          </a:prstGeom>
+        </p:spPr>
+      </p:pic>
+      <p:pic>
+        <p:nvPicPr>
+          <p:cNvPr id="5" name="Picture 4">
+            <a:extLst>
+              <a:ext uri="{FF2B5EF4-FFF2-40B4-BE49-F238E27FC236}">
+                <a16:creationId xmlns:a16="http://schemas.microsoft.com/office/drawing/2014/main" id="{D8044D0E-3C34-4EBF-BEB1-30B9F2527AB6}"/>
+              </a:ext>
+            </a:extLst>
+          </p:cNvPr>
+          <p:cNvPicPr>
+            <a:picLocks noChangeAspect="1"/>
+          </p:cNvPicPr>
+          <p:nvPr/>
+        </p:nvPicPr>
+        <p:blipFill rotWithShape="1">
+          <a:blip r:embed="rId3"/>
+          <a:srcRect t="2632" r="7326" b="1730"/>
+          <a:stretch/>
+        </p:blipFill>
+        <p:spPr>
+          <a:xfrm>
+            <a:off x="6277966" y="2426162"/>
+            <a:ext cx="3240214" cy="3707874"/>
+          </a:xfrm>
+          <a:prstGeom prst="rect">
+            <a:avLst/>
+          </a:prstGeom>
+        </p:spPr>
+      </p:pic>
     </p:spTree>
     <p:extLst>
       <p:ext uri="{BB962C8B-B14F-4D97-AF65-F5344CB8AC3E}">
-        <p14:creationId xmlns:p14="http://schemas.microsoft.com/office/powerpoint/2010/main" val="3958535426"/>
+        <p14:creationId xmlns:p14="http://schemas.microsoft.com/office/powerpoint/2010/main" val="2438716200"/>
       </p:ext>
     </p:extLst>
   </p:cSld>
@@ -4190,7 +5294,7 @@
           <p:cNvPr id="2" name="Title 1">
             <a:extLst>
               <a:ext uri="{FF2B5EF4-FFF2-40B4-BE49-F238E27FC236}">
-                <a16:creationId xmlns:a16="http://schemas.microsoft.com/office/drawing/2014/main" id="{AD26A2D8-5869-4DF3-B9BF-56096FF9AC52}"/>
+                <a16:creationId xmlns:a16="http://schemas.microsoft.com/office/drawing/2014/main" id="{8572F148-BE55-42E3-8764-1DC186E46AF3}"/>
               </a:ext>
             </a:extLst>
           </p:cNvPr>
@@ -4207,53 +5311,77 @@
           <a:lstStyle/>
           <a:p>
             <a:r>
-              <a:rPr lang="en-US" dirty="0"/>
-              <a:t>Exam Date</a:t>
-            </a:r>
-          </a:p>
-        </p:txBody>
-      </p:sp>
-      <p:sp>
-        <p:nvSpPr>
-          <p:cNvPr id="3" name="Content Placeholder 2">
-            <a:extLst>
-              <a:ext uri="{FF2B5EF4-FFF2-40B4-BE49-F238E27FC236}">
-                <a16:creationId xmlns:a16="http://schemas.microsoft.com/office/drawing/2014/main" id="{037051C9-5AEE-4626-A93C-EA08C0FEAA0E}"/>
-              </a:ext>
-            </a:extLst>
-          </p:cNvPr>
-          <p:cNvSpPr>
-            <a:spLocks noGrp="1"/>
-          </p:cNvSpPr>
-          <p:nvPr>
-            <p:ph idx="1"/>
-          </p:nvPr>
-        </p:nvSpPr>
-        <p:spPr/>
-        <p:txBody>
-          <a:bodyPr/>
-          <a:lstStyle/>
-          <a:p>
-            <a:r>
-              <a:rPr lang="en-US" dirty="0"/>
-              <a:t>Thesis hand-in is on Friday, June 28, I fly to the US on Wednesday, July 10.</a:t>
-            </a:r>
-          </a:p>
-          <a:p>
-            <a:endParaRPr lang="en-US" dirty="0"/>
-          </a:p>
-          <a:p>
-            <a:r>
-              <a:rPr lang="en-US" dirty="0"/>
-              <a:t>We have tentatively scheduled the exam for July 8, 2019.</a:t>
-            </a:r>
-          </a:p>
-        </p:txBody>
-      </p:sp>
+              <a:rPr lang="en-US" altLang="zh-CN" dirty="0"/>
+              <a:t>Epoch 2</a:t>
+            </a:r>
+            <a:endParaRPr lang="zh-CN" altLang="en-US" dirty="0"/>
+          </a:p>
+        </p:txBody>
+      </p:sp>
+      <p:pic>
+        <p:nvPicPr>
+          <p:cNvPr id="4" name="Picture 3">
+            <a:extLst>
+              <a:ext uri="{FF2B5EF4-FFF2-40B4-BE49-F238E27FC236}">
+                <a16:creationId xmlns:a16="http://schemas.microsoft.com/office/drawing/2014/main" id="{53D0CF70-A927-4125-A7E7-3118C9CEB9CA}"/>
+              </a:ext>
+            </a:extLst>
+          </p:cNvPr>
+          <p:cNvPicPr>
+            <a:picLocks noChangeAspect="1"/>
+          </p:cNvPicPr>
+          <p:nvPr/>
+        </p:nvPicPr>
+        <p:blipFill>
+          <a:blip r:embed="rId2"/>
+          <a:stretch>
+            <a:fillRect/>
+          </a:stretch>
+        </p:blipFill>
+        <p:spPr>
+          <a:xfrm>
+            <a:off x="1990724" y="2090737"/>
+            <a:ext cx="3724275" cy="4129740"/>
+          </a:xfrm>
+          <a:prstGeom prst="rect">
+            <a:avLst/>
+          </a:prstGeom>
+        </p:spPr>
+      </p:pic>
+      <p:pic>
+        <p:nvPicPr>
+          <p:cNvPr id="5" name="Picture 4">
+            <a:extLst>
+              <a:ext uri="{FF2B5EF4-FFF2-40B4-BE49-F238E27FC236}">
+                <a16:creationId xmlns:a16="http://schemas.microsoft.com/office/drawing/2014/main" id="{08C6259A-70AF-47CC-B67C-4BE57BFD7CA9}"/>
+              </a:ext>
+            </a:extLst>
+          </p:cNvPr>
+          <p:cNvPicPr>
+            <a:picLocks noChangeAspect="1"/>
+          </p:cNvPicPr>
+          <p:nvPr/>
+        </p:nvPicPr>
+        <p:blipFill>
+          <a:blip r:embed="rId3"/>
+          <a:stretch>
+            <a:fillRect/>
+          </a:stretch>
+        </p:blipFill>
+        <p:spPr>
+          <a:xfrm>
+            <a:off x="6715128" y="2090737"/>
+            <a:ext cx="3815691" cy="4129740"/>
+          </a:xfrm>
+          <a:prstGeom prst="rect">
+            <a:avLst/>
+          </a:prstGeom>
+        </p:spPr>
+      </p:pic>
     </p:spTree>
     <p:extLst>
       <p:ext uri="{BB962C8B-B14F-4D97-AF65-F5344CB8AC3E}">
-        <p14:creationId xmlns:p14="http://schemas.microsoft.com/office/powerpoint/2010/main" val="2818833863"/>
+        <p14:creationId xmlns:p14="http://schemas.microsoft.com/office/powerpoint/2010/main" val="697992457"/>
       </p:ext>
     </p:extLst>
   </p:cSld>

</xml_diff>

<commit_message>
update before heading back
</commit_message>
<xml_diff>
--- a/WeeklyPresentations/update11_06_03.pptx
+++ b/WeeklyPresentations/update11_06_03.pptx
@@ -7,19 +7,20 @@
   <p:sldIdLst>
     <p:sldId id="256" r:id="rId2"/>
     <p:sldId id="263" r:id="rId3"/>
-    <p:sldId id="269" r:id="rId4"/>
-    <p:sldId id="273" r:id="rId5"/>
-    <p:sldId id="270" r:id="rId6"/>
-    <p:sldId id="271" r:id="rId7"/>
-    <p:sldId id="272" r:id="rId8"/>
-    <p:sldId id="274" r:id="rId9"/>
-    <p:sldId id="275" r:id="rId10"/>
-    <p:sldId id="276" r:id="rId11"/>
-    <p:sldId id="277" r:id="rId12"/>
-    <p:sldId id="278" r:id="rId13"/>
-    <p:sldId id="279" r:id="rId14"/>
-    <p:sldId id="268" r:id="rId15"/>
-    <p:sldId id="258" r:id="rId16"/>
+    <p:sldId id="280" r:id="rId4"/>
+    <p:sldId id="269" r:id="rId5"/>
+    <p:sldId id="273" r:id="rId6"/>
+    <p:sldId id="270" r:id="rId7"/>
+    <p:sldId id="271" r:id="rId8"/>
+    <p:sldId id="272" r:id="rId9"/>
+    <p:sldId id="274" r:id="rId10"/>
+    <p:sldId id="275" r:id="rId11"/>
+    <p:sldId id="276" r:id="rId12"/>
+    <p:sldId id="277" r:id="rId13"/>
+    <p:sldId id="278" r:id="rId14"/>
+    <p:sldId id="279" r:id="rId15"/>
+    <p:sldId id="268" r:id="rId16"/>
+    <p:sldId id="258" r:id="rId17"/>
   </p:sldIdLst>
   <p:sldSz cx="12192000" cy="6858000"/>
   <p:notesSz cx="6858000" cy="9144000"/>
@@ -3463,6 +3464,125 @@
           <p:cNvPr id="2" name="Title 1">
             <a:extLst>
               <a:ext uri="{FF2B5EF4-FFF2-40B4-BE49-F238E27FC236}">
+                <a16:creationId xmlns:a16="http://schemas.microsoft.com/office/drawing/2014/main" id="{8572F148-BE55-42E3-8764-1DC186E46AF3}"/>
+              </a:ext>
+            </a:extLst>
+          </p:cNvPr>
+          <p:cNvSpPr>
+            <a:spLocks noGrp="1"/>
+          </p:cNvSpPr>
+          <p:nvPr>
+            <p:ph type="title"/>
+          </p:nvPr>
+        </p:nvSpPr>
+        <p:spPr/>
+        <p:txBody>
+          <a:bodyPr/>
+          <a:lstStyle/>
+          <a:p>
+            <a:r>
+              <a:rPr lang="en-US" altLang="zh-CN" dirty="0"/>
+              <a:t>Epoch 2</a:t>
+            </a:r>
+            <a:endParaRPr lang="zh-CN" altLang="en-US" dirty="0"/>
+          </a:p>
+        </p:txBody>
+      </p:sp>
+      <p:pic>
+        <p:nvPicPr>
+          <p:cNvPr id="4" name="Picture 3">
+            <a:extLst>
+              <a:ext uri="{FF2B5EF4-FFF2-40B4-BE49-F238E27FC236}">
+                <a16:creationId xmlns:a16="http://schemas.microsoft.com/office/drawing/2014/main" id="{53D0CF70-A927-4125-A7E7-3118C9CEB9CA}"/>
+              </a:ext>
+            </a:extLst>
+          </p:cNvPr>
+          <p:cNvPicPr>
+            <a:picLocks noChangeAspect="1"/>
+          </p:cNvPicPr>
+          <p:nvPr/>
+        </p:nvPicPr>
+        <p:blipFill>
+          <a:blip r:embed="rId2"/>
+          <a:stretch>
+            <a:fillRect/>
+          </a:stretch>
+        </p:blipFill>
+        <p:spPr>
+          <a:xfrm>
+            <a:off x="1661181" y="2090737"/>
+            <a:ext cx="3724275" cy="4129740"/>
+          </a:xfrm>
+          <a:prstGeom prst="rect">
+            <a:avLst/>
+          </a:prstGeom>
+        </p:spPr>
+      </p:pic>
+      <p:pic>
+        <p:nvPicPr>
+          <p:cNvPr id="5" name="Picture 4">
+            <a:extLst>
+              <a:ext uri="{FF2B5EF4-FFF2-40B4-BE49-F238E27FC236}">
+                <a16:creationId xmlns:a16="http://schemas.microsoft.com/office/drawing/2014/main" id="{08C6259A-70AF-47CC-B67C-4BE57BFD7CA9}"/>
+              </a:ext>
+            </a:extLst>
+          </p:cNvPr>
+          <p:cNvPicPr>
+            <a:picLocks noChangeAspect="1"/>
+          </p:cNvPicPr>
+          <p:nvPr/>
+        </p:nvPicPr>
+        <p:blipFill>
+          <a:blip r:embed="rId3"/>
+          <a:stretch>
+            <a:fillRect/>
+          </a:stretch>
+        </p:blipFill>
+        <p:spPr>
+          <a:xfrm>
+            <a:off x="6236157" y="2090737"/>
+            <a:ext cx="3815691" cy="4129740"/>
+          </a:xfrm>
+          <a:prstGeom prst="rect">
+            <a:avLst/>
+          </a:prstGeom>
+        </p:spPr>
+      </p:pic>
+    </p:spTree>
+    <p:extLst>
+      <p:ext uri="{BB962C8B-B14F-4D97-AF65-F5344CB8AC3E}">
+        <p14:creationId xmlns:p14="http://schemas.microsoft.com/office/powerpoint/2010/main" val="697992457"/>
+      </p:ext>
+    </p:extLst>
+  </p:cSld>
+  <p:clrMapOvr>
+    <a:masterClrMapping/>
+  </p:clrMapOvr>
+</p:sld>
+</file>
+
+<file path=ppt/slides/slide11.xml><?xml version="1.0" encoding="utf-8"?>
+<p:sld xmlns:a="http://schemas.openxmlformats.org/drawingml/2006/main" xmlns:r="http://schemas.openxmlformats.org/officeDocument/2006/relationships" xmlns:p="http://schemas.openxmlformats.org/presentationml/2006/main">
+  <p:cSld>
+    <p:spTree>
+      <p:nvGrpSpPr>
+        <p:cNvPr id="1" name=""/>
+        <p:cNvGrpSpPr/>
+        <p:nvPr/>
+      </p:nvGrpSpPr>
+      <p:grpSpPr>
+        <a:xfrm>
+          <a:off x="0" y="0"/>
+          <a:ext cx="0" cy="0"/>
+          <a:chOff x="0" y="0"/>
+          <a:chExt cx="0" cy="0"/>
+        </a:xfrm>
+      </p:grpSpPr>
+      <p:sp>
+        <p:nvSpPr>
+          <p:cNvPr id="2" name="Title 1">
+            <a:extLst>
+              <a:ext uri="{FF2B5EF4-FFF2-40B4-BE49-F238E27FC236}">
                 <a16:creationId xmlns:a16="http://schemas.microsoft.com/office/drawing/2014/main" id="{E07DE7A7-5EF2-4E14-AC8B-C4303072E430}"/>
               </a:ext>
             </a:extLst>
@@ -3539,7 +3659,7 @@
         </p:blipFill>
         <p:spPr>
           <a:xfrm>
-            <a:off x="855497" y="1933574"/>
+            <a:off x="1421554" y="1933574"/>
             <a:ext cx="3956382" cy="4282010"/>
           </a:xfrm>
           <a:prstGeom prst="rect">
@@ -3560,7 +3680,7 @@
 </p:sld>
 </file>
 
-<file path=ppt/slides/slide11.xml><?xml version="1.0" encoding="utf-8"?>
+<file path=ppt/slides/slide12.xml><?xml version="1.0" encoding="utf-8"?>
 <p:sld xmlns:a="http://schemas.openxmlformats.org/drawingml/2006/main" xmlns:r="http://schemas.openxmlformats.org/officeDocument/2006/relationships" xmlns:p="http://schemas.openxmlformats.org/presentationml/2006/main">
   <p:cSld>
     <p:spTree>
@@ -3686,7 +3806,7 @@
 </p:sld>
 </file>
 
-<file path=ppt/slides/slide12.xml><?xml version="1.0" encoding="utf-8"?>
+<file path=ppt/slides/slide13.xml><?xml version="1.0" encoding="utf-8"?>
 <p:sld xmlns:a="http://schemas.openxmlformats.org/drawingml/2006/main" xmlns:r="http://schemas.openxmlformats.org/officeDocument/2006/relationships" xmlns:p="http://schemas.openxmlformats.org/presentationml/2006/main">
   <p:cSld>
     <p:spTree>
@@ -3805,7 +3925,7 @@
 </p:sld>
 </file>
 
-<file path=ppt/slides/slide13.xml><?xml version="1.0" encoding="utf-8"?>
+<file path=ppt/slides/slide14.xml><?xml version="1.0" encoding="utf-8"?>
 <p:sld xmlns:a="http://schemas.openxmlformats.org/drawingml/2006/main" xmlns:r="http://schemas.openxmlformats.org/officeDocument/2006/relationships" xmlns:p="http://schemas.openxmlformats.org/presentationml/2006/main">
   <p:cSld>
     <p:spTree>
@@ -3971,7 +4091,7 @@
 </p:sld>
 </file>
 
-<file path=ppt/slides/slide14.xml><?xml version="1.0" encoding="utf-8"?>
+<file path=ppt/slides/slide15.xml><?xml version="1.0" encoding="utf-8"?>
 <p:sld xmlns:a="http://schemas.openxmlformats.org/drawingml/2006/main" xmlns:r="http://schemas.openxmlformats.org/officeDocument/2006/relationships" xmlns:p="http://schemas.openxmlformats.org/presentationml/2006/main">
   <p:cSld>
     <p:spTree>
@@ -4081,7 +4201,7 @@
 </p:sld>
 </file>
 
-<file path=ppt/slides/slide15.xml><?xml version="1.0" encoding="utf-8"?>
+<file path=ppt/slides/slide16.xml><?xml version="1.0" encoding="utf-8"?>
 <p:sld xmlns:a="http://schemas.openxmlformats.org/drawingml/2006/main" xmlns:r="http://schemas.openxmlformats.org/officeDocument/2006/relationships" xmlns:p="http://schemas.openxmlformats.org/presentationml/2006/main">
   <p:cSld>
     <p:spTree>
@@ -4325,6 +4445,122 @@
           <p:cNvPr id="2" name="Title 1">
             <a:extLst>
               <a:ext uri="{FF2B5EF4-FFF2-40B4-BE49-F238E27FC236}">
+                <a16:creationId xmlns:a16="http://schemas.microsoft.com/office/drawing/2014/main" id="{7261DD8D-0760-48EF-8491-C46ACB755FA2}"/>
+              </a:ext>
+            </a:extLst>
+          </p:cNvPr>
+          <p:cNvSpPr>
+            <a:spLocks noGrp="1"/>
+          </p:cNvSpPr>
+          <p:nvPr>
+            <p:ph type="title"/>
+          </p:nvPr>
+        </p:nvSpPr>
+        <p:spPr>
+          <a:xfrm>
+            <a:off x="478971" y="365125"/>
+            <a:ext cx="11425645" cy="1325563"/>
+          </a:xfrm>
+        </p:spPr>
+        <p:txBody>
+          <a:bodyPr/>
+          <a:lstStyle/>
+          <a:p>
+            <a:r>
+              <a:rPr lang="en-US" altLang="zh-CN" dirty="0"/>
+              <a:t>Differences in backpropagation for previous layers</a:t>
+            </a:r>
+            <a:endParaRPr lang="zh-CN" altLang="en-US" dirty="0"/>
+          </a:p>
+        </p:txBody>
+      </p:sp>
+      <p:sp>
+        <p:nvSpPr>
+          <p:cNvPr id="3" name="Content Placeholder 2">
+            <a:extLst>
+              <a:ext uri="{FF2B5EF4-FFF2-40B4-BE49-F238E27FC236}">
+                <a16:creationId xmlns:a16="http://schemas.microsoft.com/office/drawing/2014/main" id="{27821E46-1A30-485F-9331-1998CAE6A155}"/>
+              </a:ext>
+            </a:extLst>
+          </p:cNvPr>
+          <p:cNvSpPr>
+            <a:spLocks noGrp="1"/>
+          </p:cNvSpPr>
+          <p:nvPr>
+            <p:ph idx="1"/>
+          </p:nvPr>
+        </p:nvSpPr>
+        <p:spPr/>
+        <p:txBody>
+          <a:bodyPr/>
+          <a:lstStyle/>
+          <a:p>
+            <a:r>
+              <a:rPr lang="en-US" altLang="zh-CN" dirty="0"/>
+              <a:t>Fc0 and fc1 both need to know the input and output activation of the neuron, fc2 only needed the input activations so a bit more data needed to be rerouted to back prop module</a:t>
+            </a:r>
+          </a:p>
+          <a:p>
+            <a:endParaRPr lang="en-US" altLang="zh-CN" dirty="0"/>
+          </a:p>
+          <a:p>
+            <a:r>
+              <a:rPr lang="en-US" altLang="zh-CN" dirty="0"/>
+              <a:t>To backprop neuron gradients for fc0 in fc1, need to sum reduce 16 values in a cycle</a:t>
+            </a:r>
+          </a:p>
+          <a:p>
+            <a:pPr lvl="1"/>
+            <a:r>
+              <a:rPr lang="en-US" altLang="zh-CN" dirty="0"/>
+              <a:t>Added a 5-stage pipelined addition reduction module</a:t>
+            </a:r>
+          </a:p>
+          <a:p>
+            <a:pPr lvl="2"/>
+            <a:r>
+              <a:rPr lang="en-US" altLang="zh-CN" dirty="0"/>
+              <a:t>16 – 8 – 4 – 2 – 1 – Write to output (5 stages)</a:t>
+            </a:r>
+            <a:endParaRPr lang="zh-CN" altLang="en-US" dirty="0"/>
+          </a:p>
+        </p:txBody>
+      </p:sp>
+    </p:spTree>
+    <p:extLst>
+      <p:ext uri="{BB962C8B-B14F-4D97-AF65-F5344CB8AC3E}">
+        <p14:creationId xmlns:p14="http://schemas.microsoft.com/office/powerpoint/2010/main" val="3999089321"/>
+      </p:ext>
+    </p:extLst>
+  </p:cSld>
+  <p:clrMapOvr>
+    <a:masterClrMapping/>
+  </p:clrMapOvr>
+</p:sld>
+</file>
+
+<file path=ppt/slides/slide4.xml><?xml version="1.0" encoding="utf-8"?>
+<p:sld xmlns:a="http://schemas.openxmlformats.org/drawingml/2006/main" xmlns:r="http://schemas.openxmlformats.org/officeDocument/2006/relationships" xmlns:p="http://schemas.openxmlformats.org/presentationml/2006/main">
+  <p:cSld>
+    <p:spTree>
+      <p:nvGrpSpPr>
+        <p:cNvPr id="1" name=""/>
+        <p:cNvGrpSpPr/>
+        <p:nvPr/>
+      </p:nvGrpSpPr>
+      <p:grpSpPr>
+        <a:xfrm>
+          <a:off x="0" y="0"/>
+          <a:ext cx="0" cy="0"/>
+          <a:chOff x="0" y="0"/>
+          <a:chExt cx="0" cy="0"/>
+        </a:xfrm>
+      </p:grpSpPr>
+      <p:sp>
+        <p:nvSpPr>
+          <p:cNvPr id="2" name="Title 1">
+            <a:extLst>
+              <a:ext uri="{FF2B5EF4-FFF2-40B4-BE49-F238E27FC236}">
                 <a16:creationId xmlns:a16="http://schemas.microsoft.com/office/drawing/2014/main" id="{23FA2A75-192F-42AD-BF28-49BEED3E35B9}"/>
               </a:ext>
             </a:extLst>
@@ -4391,7 +4627,7 @@
 </p:sld>
 </file>
 
-<file path=ppt/slides/slide4.xml><?xml version="1.0" encoding="utf-8"?>
+<file path=ppt/slides/slide5.xml><?xml version="1.0" encoding="utf-8"?>
 <p:sld xmlns:a="http://schemas.openxmlformats.org/drawingml/2006/main" xmlns:r="http://schemas.openxmlformats.org/officeDocument/2006/relationships" xmlns:p="http://schemas.openxmlformats.org/presentationml/2006/main">
   <p:cSld>
     <p:spTree>
@@ -4494,7 +4730,7 @@
 </p:sld>
 </file>
 
-<file path=ppt/slides/slide5.xml><?xml version="1.0" encoding="utf-8"?>
+<file path=ppt/slides/slide6.xml><?xml version="1.0" encoding="utf-8"?>
 <p:sld xmlns:a="http://schemas.openxmlformats.org/drawingml/2006/main" xmlns:r="http://schemas.openxmlformats.org/officeDocument/2006/relationships" xmlns:p="http://schemas.openxmlformats.org/presentationml/2006/main">
   <p:cSld>
     <p:spTree>
@@ -4639,7 +4875,7 @@
             </a:r>
             <a:r>
               <a:rPr lang="en-US" altLang="zh-CN" dirty="0"/>
-              <a:t> and gradient * </a:t>
+              <a:t> + gradient * </a:t>
             </a:r>
             <a:r>
               <a:rPr lang="en-US" altLang="zh-CN" dirty="0" err="1"/>
@@ -4672,7 +4908,7 @@
           <a:p>
             <a:pPr lvl="1"/>
             <a:r>
-              <a:rPr lang="en-US" altLang="zh-CN"/>
+              <a:rPr lang="en-US" altLang="zh-CN" dirty="0"/>
               <a:t>Increment pointer</a:t>
             </a:r>
             <a:endParaRPr lang="zh-CN" altLang="en-US" dirty="0"/>
@@ -4692,7 +4928,7 @@
 </p:sld>
 </file>
 
-<file path=ppt/slides/slide6.xml><?xml version="1.0" encoding="utf-8"?>
+<file path=ppt/slides/slide7.xml><?xml version="1.0" encoding="utf-8"?>
 <p:sld xmlns:a="http://schemas.openxmlformats.org/drawingml/2006/main" xmlns:r="http://schemas.openxmlformats.org/officeDocument/2006/relationships" xmlns:p="http://schemas.openxmlformats.org/presentationml/2006/main">
   <p:cSld>
     <p:spTree>
@@ -4856,7 +5092,7 @@
 </p:sld>
 </file>
 
-<file path=ppt/slides/slide7.xml><?xml version="1.0" encoding="utf-8"?>
+<file path=ppt/slides/slide8.xml><?xml version="1.0" encoding="utf-8"?>
 <p:sld xmlns:a="http://schemas.openxmlformats.org/drawingml/2006/main" xmlns:r="http://schemas.openxmlformats.org/officeDocument/2006/relationships" xmlns:p="http://schemas.openxmlformats.org/presentationml/2006/main">
   <p:cSld>
     <p:spTree>
@@ -5145,124 +5381,6 @@
     <p:extLst>
       <p:ext uri="{BB962C8B-B14F-4D97-AF65-F5344CB8AC3E}">
         <p14:creationId xmlns:p14="http://schemas.microsoft.com/office/powerpoint/2010/main" val="3979021210"/>
-      </p:ext>
-    </p:extLst>
-  </p:cSld>
-  <p:clrMapOvr>
-    <a:masterClrMapping/>
-  </p:clrMapOvr>
-</p:sld>
-</file>
-
-<file path=ppt/slides/slide8.xml><?xml version="1.0" encoding="utf-8"?>
-<p:sld xmlns:a="http://schemas.openxmlformats.org/drawingml/2006/main" xmlns:r="http://schemas.openxmlformats.org/officeDocument/2006/relationships" xmlns:p="http://schemas.openxmlformats.org/presentationml/2006/main">
-  <p:cSld>
-    <p:spTree>
-      <p:nvGrpSpPr>
-        <p:cNvPr id="1" name=""/>
-        <p:cNvGrpSpPr/>
-        <p:nvPr/>
-      </p:nvGrpSpPr>
-      <p:grpSpPr>
-        <a:xfrm>
-          <a:off x="0" y="0"/>
-          <a:ext cx="0" cy="0"/>
-          <a:chOff x="0" y="0"/>
-          <a:chExt cx="0" cy="0"/>
-        </a:xfrm>
-      </p:grpSpPr>
-      <p:sp>
-        <p:nvSpPr>
-          <p:cNvPr id="2" name="Title 1">
-            <a:extLst>
-              <a:ext uri="{FF2B5EF4-FFF2-40B4-BE49-F238E27FC236}">
-                <a16:creationId xmlns:a16="http://schemas.microsoft.com/office/drawing/2014/main" id="{F93C7AB1-8EFB-4066-96DB-14A7E1A346D0}"/>
-              </a:ext>
-            </a:extLst>
-          </p:cNvPr>
-          <p:cNvSpPr>
-            <a:spLocks noGrp="1"/>
-          </p:cNvSpPr>
-          <p:nvPr>
-            <p:ph type="title"/>
-          </p:nvPr>
-        </p:nvSpPr>
-        <p:spPr/>
-        <p:txBody>
-          <a:bodyPr/>
-          <a:lstStyle/>
-          <a:p>
-            <a:r>
-              <a:rPr lang="en-US" altLang="zh-CN" dirty="0"/>
-              <a:t>Epoch 1</a:t>
-            </a:r>
-            <a:endParaRPr lang="zh-CN" altLang="en-US" dirty="0"/>
-          </a:p>
-        </p:txBody>
-      </p:sp>
-      <p:pic>
-        <p:nvPicPr>
-          <p:cNvPr id="4" name="Picture 3">
-            <a:extLst>
-              <a:ext uri="{FF2B5EF4-FFF2-40B4-BE49-F238E27FC236}">
-                <a16:creationId xmlns:a16="http://schemas.microsoft.com/office/drawing/2014/main" id="{FFFFCCB6-2469-4C1A-A894-DCA4BF0B4255}"/>
-              </a:ext>
-            </a:extLst>
-          </p:cNvPr>
-          <p:cNvPicPr>
-            <a:picLocks noChangeAspect="1"/>
-          </p:cNvPicPr>
-          <p:nvPr/>
-        </p:nvPicPr>
-        <p:blipFill>
-          <a:blip r:embed="rId2"/>
-          <a:stretch>
-            <a:fillRect/>
-          </a:stretch>
-        </p:blipFill>
-        <p:spPr>
-          <a:xfrm>
-            <a:off x="2377441" y="2426162"/>
-            <a:ext cx="3327218" cy="3707874"/>
-          </a:xfrm>
-          <a:prstGeom prst="rect">
-            <a:avLst/>
-          </a:prstGeom>
-        </p:spPr>
-      </p:pic>
-      <p:pic>
-        <p:nvPicPr>
-          <p:cNvPr id="5" name="Picture 4">
-            <a:extLst>
-              <a:ext uri="{FF2B5EF4-FFF2-40B4-BE49-F238E27FC236}">
-                <a16:creationId xmlns:a16="http://schemas.microsoft.com/office/drawing/2014/main" id="{D8044D0E-3C34-4EBF-BEB1-30B9F2527AB6}"/>
-              </a:ext>
-            </a:extLst>
-          </p:cNvPr>
-          <p:cNvPicPr>
-            <a:picLocks noChangeAspect="1"/>
-          </p:cNvPicPr>
-          <p:nvPr/>
-        </p:nvPicPr>
-        <p:blipFill rotWithShape="1">
-          <a:blip r:embed="rId3"/>
-          <a:srcRect t="2632" r="7326" b="1730"/>
-          <a:stretch/>
-        </p:blipFill>
-        <p:spPr>
-          <a:xfrm>
-            <a:off x="6277966" y="2426162"/>
-            <a:ext cx="3240214" cy="3707874"/>
-          </a:xfrm>
-          <a:prstGeom prst="rect">
-            <a:avLst/>
-          </a:prstGeom>
-        </p:spPr>
-      </p:pic>
-    </p:spTree>
-    <p:extLst>
-      <p:ext uri="{BB962C8B-B14F-4D97-AF65-F5344CB8AC3E}">
-        <p14:creationId xmlns:p14="http://schemas.microsoft.com/office/powerpoint/2010/main" val="2438716200"/>
       </p:ext>
     </p:extLst>
   </p:cSld>
@@ -5294,7 +5412,7 @@
           <p:cNvPr id="2" name="Title 1">
             <a:extLst>
               <a:ext uri="{FF2B5EF4-FFF2-40B4-BE49-F238E27FC236}">
-                <a16:creationId xmlns:a16="http://schemas.microsoft.com/office/drawing/2014/main" id="{8572F148-BE55-42E3-8764-1DC186E46AF3}"/>
+                <a16:creationId xmlns:a16="http://schemas.microsoft.com/office/drawing/2014/main" id="{F93C7AB1-8EFB-4066-96DB-14A7E1A346D0}"/>
               </a:ext>
             </a:extLst>
           </p:cNvPr>
@@ -5312,7 +5430,7 @@
           <a:p>
             <a:r>
               <a:rPr lang="en-US" altLang="zh-CN" dirty="0"/>
-              <a:t>Epoch 2</a:t>
+              <a:t>Epoch 1</a:t>
             </a:r>
             <a:endParaRPr lang="zh-CN" altLang="en-US" dirty="0"/>
           </a:p>
@@ -5323,7 +5441,7 @@
           <p:cNvPr id="4" name="Picture 3">
             <a:extLst>
               <a:ext uri="{FF2B5EF4-FFF2-40B4-BE49-F238E27FC236}">
-                <a16:creationId xmlns:a16="http://schemas.microsoft.com/office/drawing/2014/main" id="{53D0CF70-A927-4125-A7E7-3118C9CEB9CA}"/>
+                <a16:creationId xmlns:a16="http://schemas.microsoft.com/office/drawing/2014/main" id="{FFFFCCB6-2469-4C1A-A894-DCA4BF0B4255}"/>
               </a:ext>
             </a:extLst>
           </p:cNvPr>
@@ -5340,8 +5458,8 @@
         </p:blipFill>
         <p:spPr>
           <a:xfrm>
-            <a:off x="1990724" y="2090737"/>
-            <a:ext cx="3724275" cy="4129740"/>
+            <a:off x="2377441" y="2426162"/>
+            <a:ext cx="3327218" cy="3707874"/>
           </a:xfrm>
           <a:prstGeom prst="rect">
             <a:avLst/>
@@ -5353,7 +5471,7 @@
           <p:cNvPr id="5" name="Picture 4">
             <a:extLst>
               <a:ext uri="{FF2B5EF4-FFF2-40B4-BE49-F238E27FC236}">
-                <a16:creationId xmlns:a16="http://schemas.microsoft.com/office/drawing/2014/main" id="{08C6259A-70AF-47CC-B67C-4BE57BFD7CA9}"/>
+                <a16:creationId xmlns:a16="http://schemas.microsoft.com/office/drawing/2014/main" id="{D8044D0E-3C34-4EBF-BEB1-30B9F2527AB6}"/>
               </a:ext>
             </a:extLst>
           </p:cNvPr>
@@ -5362,16 +5480,15 @@
           </p:cNvPicPr>
           <p:nvPr/>
         </p:nvPicPr>
-        <p:blipFill>
+        <p:blipFill rotWithShape="1">
           <a:blip r:embed="rId3"/>
-          <a:stretch>
-            <a:fillRect/>
-          </a:stretch>
+          <a:srcRect t="2632" r="7326" b="1730"/>
+          <a:stretch/>
         </p:blipFill>
         <p:spPr>
           <a:xfrm>
-            <a:off x="6715128" y="2090737"/>
-            <a:ext cx="3815691" cy="4129740"/>
+            <a:off x="6277966" y="2426162"/>
+            <a:ext cx="3240214" cy="3707874"/>
           </a:xfrm>
           <a:prstGeom prst="rect">
             <a:avLst/>
@@ -5381,7 +5498,7 @@
     </p:spTree>
     <p:extLst>
       <p:ext uri="{BB962C8B-B14F-4D97-AF65-F5344CB8AC3E}">
-        <p14:creationId xmlns:p14="http://schemas.microsoft.com/office/powerpoint/2010/main" val="697992457"/>
+        <p14:creationId xmlns:p14="http://schemas.microsoft.com/office/powerpoint/2010/main" val="2438716200"/>
       </p:ext>
     </p:extLst>
   </p:cSld>

</xml_diff>

<commit_message>
Updates throughout whole fpga are good to go
</commit_message>
<xml_diff>
--- a/WeeklyPresentations/update11_06_03.pptx
+++ b/WeeklyPresentations/update11_06_03.pptx
@@ -9,18 +9,19 @@
     <p:sldId id="263" r:id="rId3"/>
     <p:sldId id="280" r:id="rId4"/>
     <p:sldId id="269" r:id="rId5"/>
-    <p:sldId id="273" r:id="rId6"/>
-    <p:sldId id="270" r:id="rId7"/>
-    <p:sldId id="271" r:id="rId8"/>
-    <p:sldId id="272" r:id="rId9"/>
-    <p:sldId id="274" r:id="rId10"/>
-    <p:sldId id="275" r:id="rId11"/>
-    <p:sldId id="276" r:id="rId12"/>
-    <p:sldId id="277" r:id="rId13"/>
-    <p:sldId id="278" r:id="rId14"/>
-    <p:sldId id="279" r:id="rId15"/>
-    <p:sldId id="268" r:id="rId16"/>
-    <p:sldId id="258" r:id="rId17"/>
+    <p:sldId id="281" r:id="rId6"/>
+    <p:sldId id="273" r:id="rId7"/>
+    <p:sldId id="270" r:id="rId8"/>
+    <p:sldId id="271" r:id="rId9"/>
+    <p:sldId id="272" r:id="rId10"/>
+    <p:sldId id="274" r:id="rId11"/>
+    <p:sldId id="275" r:id="rId12"/>
+    <p:sldId id="276" r:id="rId13"/>
+    <p:sldId id="277" r:id="rId14"/>
+    <p:sldId id="278" r:id="rId15"/>
+    <p:sldId id="279" r:id="rId16"/>
+    <p:sldId id="268" r:id="rId17"/>
+    <p:sldId id="258" r:id="rId18"/>
   </p:sldIdLst>
   <p:sldSz cx="12192000" cy="6858000"/>
   <p:notesSz cx="6858000" cy="9144000"/>
@@ -275,7 +276,7 @@
             <a:fld id="{B61BEF0D-F0BB-DE4B-95CE-6DB70DBA9567}" type="datetimeFigureOut">
               <a:rPr lang="en-US" smtClean="0"/>
               <a:pPr/>
-              <a:t>6/2/2019</a:t>
+              <a:t>6/3/2019</a:t>
             </a:fld>
             <a:endParaRPr lang="en-US" dirty="0"/>
           </a:p>
@@ -475,7 +476,7 @@
             <a:fld id="{B61BEF0D-F0BB-DE4B-95CE-6DB70DBA9567}" type="datetimeFigureOut">
               <a:rPr lang="en-US" smtClean="0"/>
               <a:pPr/>
-              <a:t>6/2/2019</a:t>
+              <a:t>6/3/2019</a:t>
             </a:fld>
             <a:endParaRPr lang="en-US" dirty="0"/>
           </a:p>
@@ -685,7 +686,7 @@
             <a:fld id="{B61BEF0D-F0BB-DE4B-95CE-6DB70DBA9567}" type="datetimeFigureOut">
               <a:rPr lang="en-US" smtClean="0"/>
               <a:pPr/>
-              <a:t>6/2/2019</a:t>
+              <a:t>6/3/2019</a:t>
             </a:fld>
             <a:endParaRPr lang="en-US" dirty="0"/>
           </a:p>
@@ -885,7 +886,7 @@
             <a:fld id="{B61BEF0D-F0BB-DE4B-95CE-6DB70DBA9567}" type="datetimeFigureOut">
               <a:rPr lang="en-US" smtClean="0"/>
               <a:pPr/>
-              <a:t>6/2/2019</a:t>
+              <a:t>6/3/2019</a:t>
             </a:fld>
             <a:endParaRPr lang="en-US" dirty="0"/>
           </a:p>
@@ -1162,7 +1163,7 @@
             <a:fld id="{B61BEF0D-F0BB-DE4B-95CE-6DB70DBA9567}" type="datetimeFigureOut">
               <a:rPr lang="en-US" smtClean="0"/>
               <a:pPr/>
-              <a:t>6/2/2019</a:t>
+              <a:t>6/3/2019</a:t>
             </a:fld>
             <a:endParaRPr lang="en-US" dirty="0"/>
           </a:p>
@@ -1429,7 +1430,7 @@
             <a:fld id="{B61BEF0D-F0BB-DE4B-95CE-6DB70DBA9567}" type="datetimeFigureOut">
               <a:rPr lang="en-US" smtClean="0"/>
               <a:pPr/>
-              <a:t>6/2/2019</a:t>
+              <a:t>6/3/2019</a:t>
             </a:fld>
             <a:endParaRPr lang="en-US" dirty="0"/>
           </a:p>
@@ -1843,7 +1844,7 @@
             <a:fld id="{B61BEF0D-F0BB-DE4B-95CE-6DB70DBA9567}" type="datetimeFigureOut">
               <a:rPr lang="en-US" smtClean="0"/>
               <a:pPr/>
-              <a:t>6/2/2019</a:t>
+              <a:t>6/3/2019</a:t>
             </a:fld>
             <a:endParaRPr lang="en-US" dirty="0"/>
           </a:p>
@@ -1986,7 +1987,7 @@
             <a:fld id="{B61BEF0D-F0BB-DE4B-95CE-6DB70DBA9567}" type="datetimeFigureOut">
               <a:rPr lang="en-US" smtClean="0"/>
               <a:pPr/>
-              <a:t>6/2/2019</a:t>
+              <a:t>6/3/2019</a:t>
             </a:fld>
             <a:endParaRPr lang="en-US" dirty="0"/>
           </a:p>
@@ -2101,7 +2102,7 @@
             <a:fld id="{B61BEF0D-F0BB-DE4B-95CE-6DB70DBA9567}" type="datetimeFigureOut">
               <a:rPr lang="en-US" smtClean="0"/>
               <a:pPr/>
-              <a:t>6/2/2019</a:t>
+              <a:t>6/3/2019</a:t>
             </a:fld>
             <a:endParaRPr lang="en-US" dirty="0"/>
           </a:p>
@@ -2414,7 +2415,7 @@
             <a:fld id="{B61BEF0D-F0BB-DE4B-95CE-6DB70DBA9567}" type="datetimeFigureOut">
               <a:rPr lang="en-US" smtClean="0"/>
               <a:pPr/>
-              <a:t>6/2/2019</a:t>
+              <a:t>6/3/2019</a:t>
             </a:fld>
             <a:endParaRPr lang="en-US" dirty="0"/>
           </a:p>
@@ -2704,7 +2705,7 @@
             <a:fld id="{B61BEF0D-F0BB-DE4B-95CE-6DB70DBA9567}" type="datetimeFigureOut">
               <a:rPr lang="en-US" smtClean="0"/>
               <a:pPr/>
-              <a:t>6/2/2019</a:t>
+              <a:t>6/3/2019</a:t>
             </a:fld>
             <a:endParaRPr lang="en-US" dirty="0"/>
           </a:p>
@@ -2947,7 +2948,7 @@
             <a:fld id="{B61BEF0D-F0BB-DE4B-95CE-6DB70DBA9567}" type="datetimeFigureOut">
               <a:rPr lang="en-US" smtClean="0"/>
               <a:pPr/>
-              <a:t>6/2/2019</a:t>
+              <a:t>6/3/2019</a:t>
             </a:fld>
             <a:endParaRPr lang="en-US" dirty="0"/>
           </a:p>
@@ -3464,6 +3465,124 @@
           <p:cNvPr id="2" name="Title 1">
             <a:extLst>
               <a:ext uri="{FF2B5EF4-FFF2-40B4-BE49-F238E27FC236}">
+                <a16:creationId xmlns:a16="http://schemas.microsoft.com/office/drawing/2014/main" id="{F93C7AB1-8EFB-4066-96DB-14A7E1A346D0}"/>
+              </a:ext>
+            </a:extLst>
+          </p:cNvPr>
+          <p:cNvSpPr>
+            <a:spLocks noGrp="1"/>
+          </p:cNvSpPr>
+          <p:nvPr>
+            <p:ph type="title"/>
+          </p:nvPr>
+        </p:nvSpPr>
+        <p:spPr/>
+        <p:txBody>
+          <a:bodyPr/>
+          <a:lstStyle/>
+          <a:p>
+            <a:r>
+              <a:rPr lang="en-US" altLang="zh-CN" dirty="0"/>
+              <a:t>Epoch 1</a:t>
+            </a:r>
+            <a:endParaRPr lang="zh-CN" altLang="en-US" dirty="0"/>
+          </a:p>
+        </p:txBody>
+      </p:sp>
+      <p:pic>
+        <p:nvPicPr>
+          <p:cNvPr id="4" name="Picture 3">
+            <a:extLst>
+              <a:ext uri="{FF2B5EF4-FFF2-40B4-BE49-F238E27FC236}">
+                <a16:creationId xmlns:a16="http://schemas.microsoft.com/office/drawing/2014/main" id="{FFFFCCB6-2469-4C1A-A894-DCA4BF0B4255}"/>
+              </a:ext>
+            </a:extLst>
+          </p:cNvPr>
+          <p:cNvPicPr>
+            <a:picLocks noChangeAspect="1"/>
+          </p:cNvPicPr>
+          <p:nvPr/>
+        </p:nvPicPr>
+        <p:blipFill>
+          <a:blip r:embed="rId2"/>
+          <a:stretch>
+            <a:fillRect/>
+          </a:stretch>
+        </p:blipFill>
+        <p:spPr>
+          <a:xfrm>
+            <a:off x="2377441" y="2426162"/>
+            <a:ext cx="3327218" cy="3707874"/>
+          </a:xfrm>
+          <a:prstGeom prst="rect">
+            <a:avLst/>
+          </a:prstGeom>
+        </p:spPr>
+      </p:pic>
+      <p:pic>
+        <p:nvPicPr>
+          <p:cNvPr id="5" name="Picture 4">
+            <a:extLst>
+              <a:ext uri="{FF2B5EF4-FFF2-40B4-BE49-F238E27FC236}">
+                <a16:creationId xmlns:a16="http://schemas.microsoft.com/office/drawing/2014/main" id="{D8044D0E-3C34-4EBF-BEB1-30B9F2527AB6}"/>
+              </a:ext>
+            </a:extLst>
+          </p:cNvPr>
+          <p:cNvPicPr>
+            <a:picLocks noChangeAspect="1"/>
+          </p:cNvPicPr>
+          <p:nvPr/>
+        </p:nvPicPr>
+        <p:blipFill rotWithShape="1">
+          <a:blip r:embed="rId3"/>
+          <a:srcRect t="2632" r="7326" b="1730"/>
+          <a:stretch/>
+        </p:blipFill>
+        <p:spPr>
+          <a:xfrm>
+            <a:off x="6277966" y="2426162"/>
+            <a:ext cx="3240214" cy="3707874"/>
+          </a:xfrm>
+          <a:prstGeom prst="rect">
+            <a:avLst/>
+          </a:prstGeom>
+        </p:spPr>
+      </p:pic>
+    </p:spTree>
+    <p:extLst>
+      <p:ext uri="{BB962C8B-B14F-4D97-AF65-F5344CB8AC3E}">
+        <p14:creationId xmlns:p14="http://schemas.microsoft.com/office/powerpoint/2010/main" val="2438716200"/>
+      </p:ext>
+    </p:extLst>
+  </p:cSld>
+  <p:clrMapOvr>
+    <a:masterClrMapping/>
+  </p:clrMapOvr>
+</p:sld>
+</file>
+
+<file path=ppt/slides/slide11.xml><?xml version="1.0" encoding="utf-8"?>
+<p:sld xmlns:a="http://schemas.openxmlformats.org/drawingml/2006/main" xmlns:r="http://schemas.openxmlformats.org/officeDocument/2006/relationships" xmlns:p="http://schemas.openxmlformats.org/presentationml/2006/main">
+  <p:cSld>
+    <p:spTree>
+      <p:nvGrpSpPr>
+        <p:cNvPr id="1" name=""/>
+        <p:cNvGrpSpPr/>
+        <p:nvPr/>
+      </p:nvGrpSpPr>
+      <p:grpSpPr>
+        <a:xfrm>
+          <a:off x="0" y="0"/>
+          <a:ext cx="0" cy="0"/>
+          <a:chOff x="0" y="0"/>
+          <a:chExt cx="0" cy="0"/>
+        </a:xfrm>
+      </p:grpSpPr>
+      <p:sp>
+        <p:nvSpPr>
+          <p:cNvPr id="2" name="Title 1">
+            <a:extLst>
+              <a:ext uri="{FF2B5EF4-FFF2-40B4-BE49-F238E27FC236}">
                 <a16:creationId xmlns:a16="http://schemas.microsoft.com/office/drawing/2014/main" id="{8572F148-BE55-42E3-8764-1DC186E46AF3}"/>
               </a:ext>
             </a:extLst>
@@ -3561,7 +3680,7 @@
 </p:sld>
 </file>
 
-<file path=ppt/slides/slide11.xml><?xml version="1.0" encoding="utf-8"?>
+<file path=ppt/slides/slide12.xml><?xml version="1.0" encoding="utf-8"?>
 <p:sld xmlns:a="http://schemas.openxmlformats.org/drawingml/2006/main" xmlns:r="http://schemas.openxmlformats.org/officeDocument/2006/relationships" xmlns:p="http://schemas.openxmlformats.org/presentationml/2006/main">
   <p:cSld>
     <p:spTree>
@@ -3680,7 +3799,7 @@
 </p:sld>
 </file>
 
-<file path=ppt/slides/slide12.xml><?xml version="1.0" encoding="utf-8"?>
+<file path=ppt/slides/slide13.xml><?xml version="1.0" encoding="utf-8"?>
 <p:sld xmlns:a="http://schemas.openxmlformats.org/drawingml/2006/main" xmlns:r="http://schemas.openxmlformats.org/officeDocument/2006/relationships" xmlns:p="http://schemas.openxmlformats.org/presentationml/2006/main">
   <p:cSld>
     <p:spTree>
@@ -3806,7 +3925,7 @@
 </p:sld>
 </file>
 
-<file path=ppt/slides/slide13.xml><?xml version="1.0" encoding="utf-8"?>
+<file path=ppt/slides/slide14.xml><?xml version="1.0" encoding="utf-8"?>
 <p:sld xmlns:a="http://schemas.openxmlformats.org/drawingml/2006/main" xmlns:r="http://schemas.openxmlformats.org/officeDocument/2006/relationships" xmlns:p="http://schemas.openxmlformats.org/presentationml/2006/main">
   <p:cSld>
     <p:spTree>
@@ -3925,7 +4044,7 @@
 </p:sld>
 </file>
 
-<file path=ppt/slides/slide14.xml><?xml version="1.0" encoding="utf-8"?>
+<file path=ppt/slides/slide15.xml><?xml version="1.0" encoding="utf-8"?>
 <p:sld xmlns:a="http://schemas.openxmlformats.org/drawingml/2006/main" xmlns:r="http://schemas.openxmlformats.org/officeDocument/2006/relationships" xmlns:p="http://schemas.openxmlformats.org/presentationml/2006/main">
   <p:cSld>
     <p:spTree>
@@ -4091,7 +4210,7 @@
 </p:sld>
 </file>
 
-<file path=ppt/slides/slide15.xml><?xml version="1.0" encoding="utf-8"?>
+<file path=ppt/slides/slide16.xml><?xml version="1.0" encoding="utf-8"?>
 <p:sld xmlns:a="http://schemas.openxmlformats.org/drawingml/2006/main" xmlns:r="http://schemas.openxmlformats.org/officeDocument/2006/relationships" xmlns:p="http://schemas.openxmlformats.org/presentationml/2006/main">
   <p:cSld>
     <p:spTree>
@@ -4156,13 +4275,13 @@
         <p:spPr/>
         <p:txBody>
           <a:bodyPr>
-            <a:normAutofit/>
+            <a:normAutofit fontScale="85000" lnSpcReduction="20000"/>
           </a:bodyPr>
           <a:lstStyle/>
           <a:p>
             <a:r>
               <a:rPr lang="en-US" altLang="zh-CN" dirty="0"/>
-              <a:t>Will start writing report</a:t>
+              <a:t>Report writing</a:t>
             </a:r>
           </a:p>
           <a:p>
@@ -4171,7 +4290,16 @@
           <a:p>
             <a:r>
               <a:rPr lang="en-US" altLang="zh-CN" dirty="0"/>
-              <a:t>Now that training is working, want to define an actual loss function that can be used with labels for the MNIST images. I estimate that I will be able to put about 200 images on the FPGA</a:t>
+              <a:t>Now that training is working, want to define an actual loss function (or just constant gradients based on label) that can be used with labels for the MNIST images. I estimate that I will be able to put about 100-200 images on the FPGA in BRAM</a:t>
+            </a:r>
+          </a:p>
+          <a:p>
+            <a:endParaRPr lang="en-US" altLang="zh-CN" dirty="0"/>
+          </a:p>
+          <a:p>
+            <a:r>
+              <a:rPr lang="en-US" altLang="zh-CN" dirty="0"/>
+              <a:t>The backward pass logic has increased resource usage and has resulted in some negative slack, if I have the time I will try to fix this</a:t>
             </a:r>
           </a:p>
           <a:p>
@@ -4201,7 +4329,7 @@
 </p:sld>
 </file>
 
-<file path=ppt/slides/slide16.xml><?xml version="1.0" encoding="utf-8"?>
+<file path=ppt/slides/slide17.xml><?xml version="1.0" encoding="utf-8"?>
 <p:sld xmlns:a="http://schemas.openxmlformats.org/drawingml/2006/main" xmlns:r="http://schemas.openxmlformats.org/officeDocument/2006/relationships" xmlns:p="http://schemas.openxmlformats.org/presentationml/2006/main">
   <p:cSld>
     <p:spTree>
@@ -4374,7 +4502,7 @@
           <a:p>
             <a:r>
               <a:rPr lang="en-US" altLang="zh-CN" dirty="0"/>
-              <a:t>Implemented and verified weight update phase</a:t>
+              <a:t>Implemented and verified weight update phase for all layers</a:t>
             </a:r>
           </a:p>
           <a:p>
@@ -4601,14 +4729,363 @@
             <p:ph idx="1"/>
           </p:nvPr>
         </p:nvSpPr>
-        <p:spPr/>
-        <p:txBody>
-          <a:bodyPr/>
-          <a:lstStyle/>
-          <a:p>
+        <p:spPr>
+          <a:xfrm>
+            <a:off x="838200" y="1326004"/>
+            <a:ext cx="10515600" cy="983563"/>
+          </a:xfrm>
+        </p:spPr>
+        <p:txBody>
+          <a:bodyPr>
+            <a:normAutofit/>
+          </a:bodyPr>
+          <a:lstStyle/>
+          <a:p>
+            <a:r>
+              <a:rPr lang="en-US" altLang="zh-CN" sz="2000" dirty="0"/>
+              <a:t>There are 76,832 gradients for FC0 and 6,664 for FC1… I’ll just randomly choose a few gradients for this ppt. I do have all 80,000+ gradients available if other gradients want to be checked</a:t>
+            </a:r>
+            <a:endParaRPr lang="zh-CN" altLang="en-US" sz="2000" dirty="0"/>
+          </a:p>
+        </p:txBody>
+      </p:sp>
+      <p:pic>
+        <p:nvPicPr>
+          <p:cNvPr id="4" name="Picture 3">
+            <a:extLst>
+              <a:ext uri="{FF2B5EF4-FFF2-40B4-BE49-F238E27FC236}">
+                <a16:creationId xmlns:a16="http://schemas.microsoft.com/office/drawing/2014/main" id="{0D5BA80E-9201-499B-84FF-490EFC63CF86}"/>
+              </a:ext>
+            </a:extLst>
+          </p:cNvPr>
+          <p:cNvPicPr>
+            <a:picLocks noChangeAspect="1"/>
+          </p:cNvPicPr>
+          <p:nvPr/>
+        </p:nvPicPr>
+        <p:blipFill>
+          <a:blip r:embed="rId2"/>
+          <a:stretch>
+            <a:fillRect/>
+          </a:stretch>
+        </p:blipFill>
+        <p:spPr>
+          <a:xfrm>
+            <a:off x="2408818" y="2653405"/>
+            <a:ext cx="2693026" cy="4204595"/>
+          </a:xfrm>
+          <a:prstGeom prst="rect">
+            <a:avLst/>
+          </a:prstGeom>
+        </p:spPr>
+      </p:pic>
+      <p:pic>
+        <p:nvPicPr>
+          <p:cNvPr id="5" name="Picture 4">
+            <a:extLst>
+              <a:ext uri="{FF2B5EF4-FFF2-40B4-BE49-F238E27FC236}">
+                <a16:creationId xmlns:a16="http://schemas.microsoft.com/office/drawing/2014/main" id="{AD71E2D7-B0EB-4516-ADE0-311FD0513C98}"/>
+              </a:ext>
+            </a:extLst>
+          </p:cNvPr>
+          <p:cNvPicPr>
+            <a:picLocks noChangeAspect="1"/>
+          </p:cNvPicPr>
+          <p:nvPr/>
+        </p:nvPicPr>
+        <p:blipFill>
+          <a:blip r:embed="rId3"/>
+          <a:stretch>
+            <a:fillRect/>
+          </a:stretch>
+        </p:blipFill>
+        <p:spPr>
+          <a:xfrm>
+            <a:off x="663535" y="2658115"/>
+            <a:ext cx="1570618" cy="4199886"/>
+          </a:xfrm>
+          <a:prstGeom prst="rect">
+            <a:avLst/>
+          </a:prstGeom>
+        </p:spPr>
+      </p:pic>
+      <p:sp>
+        <p:nvSpPr>
+          <p:cNvPr id="6" name="TextBox 5">
+            <a:extLst>
+              <a:ext uri="{FF2B5EF4-FFF2-40B4-BE49-F238E27FC236}">
+                <a16:creationId xmlns:a16="http://schemas.microsoft.com/office/drawing/2014/main" id="{C5BABC2A-F99A-4433-8A01-29A4C7231F47}"/>
+              </a:ext>
+            </a:extLst>
+          </p:cNvPr>
+          <p:cNvSpPr txBox="1"/>
+          <p:nvPr/>
+        </p:nvSpPr>
+        <p:spPr>
+          <a:xfrm>
+            <a:off x="539695" y="1986401"/>
+            <a:ext cx="4485151" cy="646331"/>
+          </a:xfrm>
+          <a:prstGeom prst="rect">
+            <a:avLst/>
+          </a:prstGeom>
+          <a:noFill/>
+        </p:spPr>
+        <p:txBody>
+          <a:bodyPr wrap="square" rtlCol="0">
+            <a:spAutoFit/>
+          </a:bodyPr>
+          <a:lstStyle/>
+          <a:p>
+            <a:pPr algn="ctr"/>
             <a:r>
               <a:rPr lang="en-US" altLang="zh-CN" dirty="0"/>
-              <a:t>There are 76,832 gradients for FC0 and 6,664 for FC1… I’ll just randomly choose a few gradients for this ppt</a:t>
+              <a:t>weight</a:t>
+            </a:r>
+            <a:r>
+              <a:rPr lang="en-US" altLang="zh-CN" baseline="-25000" dirty="0"/>
+              <a:t>234</a:t>
+            </a:r>
+            <a:r>
+              <a:rPr lang="en-US" altLang="zh-CN" dirty="0"/>
+              <a:t>  for neurons 0-22 in layer 0. Signs all align, value checked for neuron 0, 14, 22</a:t>
+            </a:r>
+            <a:endParaRPr lang="zh-CN" altLang="en-US" dirty="0"/>
+          </a:p>
+        </p:txBody>
+      </p:sp>
+      <p:sp>
+        <p:nvSpPr>
+          <p:cNvPr id="7" name="TextBox 6">
+            <a:extLst>
+              <a:ext uri="{FF2B5EF4-FFF2-40B4-BE49-F238E27FC236}">
+                <a16:creationId xmlns:a16="http://schemas.microsoft.com/office/drawing/2014/main" id="{3F563550-F3D3-4620-927A-7B0A738A28E2}"/>
+              </a:ext>
+            </a:extLst>
+          </p:cNvPr>
+          <p:cNvSpPr txBox="1"/>
+          <p:nvPr/>
+        </p:nvSpPr>
+        <p:spPr>
+          <a:xfrm>
+            <a:off x="1370467" y="2781206"/>
+            <a:ext cx="785309" cy="276999"/>
+          </a:xfrm>
+          <a:prstGeom prst="rect">
+            <a:avLst/>
+          </a:prstGeom>
+          <a:noFill/>
+        </p:spPr>
+        <p:txBody>
+          <a:bodyPr wrap="square" rtlCol="0">
+            <a:spAutoFit/>
+          </a:bodyPr>
+          <a:lstStyle/>
+          <a:p>
+            <a:r>
+              <a:rPr lang="en-US" altLang="zh-CN" sz="1200" dirty="0">
+                <a:solidFill>
+                  <a:schemeClr val="bg1"/>
+                </a:solidFill>
+              </a:rPr>
+              <a:t>0.0219</a:t>
+            </a:r>
+            <a:endParaRPr lang="zh-CN" altLang="en-US" sz="1200" dirty="0">
+              <a:solidFill>
+                <a:schemeClr val="bg1"/>
+              </a:solidFill>
+            </a:endParaRPr>
+          </a:p>
+        </p:txBody>
+      </p:sp>
+      <p:sp>
+        <p:nvSpPr>
+          <p:cNvPr id="8" name="TextBox 7">
+            <a:extLst>
+              <a:ext uri="{FF2B5EF4-FFF2-40B4-BE49-F238E27FC236}">
+                <a16:creationId xmlns:a16="http://schemas.microsoft.com/office/drawing/2014/main" id="{211AB3CD-2492-4D9D-8078-2EE4DDB1A173}"/>
+              </a:ext>
+            </a:extLst>
+          </p:cNvPr>
+          <p:cNvSpPr txBox="1"/>
+          <p:nvPr/>
+        </p:nvSpPr>
+        <p:spPr>
+          <a:xfrm>
+            <a:off x="1370466" y="6611858"/>
+            <a:ext cx="785309" cy="276999"/>
+          </a:xfrm>
+          <a:prstGeom prst="rect">
+            <a:avLst/>
+          </a:prstGeom>
+          <a:noFill/>
+        </p:spPr>
+        <p:txBody>
+          <a:bodyPr wrap="square" rtlCol="0">
+            <a:spAutoFit/>
+          </a:bodyPr>
+          <a:lstStyle/>
+          <a:p>
+            <a:r>
+              <a:rPr lang="en-US" altLang="zh-CN" sz="1200" dirty="0">
+                <a:solidFill>
+                  <a:schemeClr val="bg1"/>
+                </a:solidFill>
+              </a:rPr>
+              <a:t>0.03601</a:t>
+            </a:r>
+            <a:endParaRPr lang="zh-CN" altLang="en-US" sz="1200" dirty="0">
+              <a:solidFill>
+                <a:schemeClr val="bg1"/>
+              </a:solidFill>
+            </a:endParaRPr>
+          </a:p>
+        </p:txBody>
+      </p:sp>
+      <p:sp>
+        <p:nvSpPr>
+          <p:cNvPr id="9" name="TextBox 8">
+            <a:extLst>
+              <a:ext uri="{FF2B5EF4-FFF2-40B4-BE49-F238E27FC236}">
+                <a16:creationId xmlns:a16="http://schemas.microsoft.com/office/drawing/2014/main" id="{8DA61214-22CC-4C4E-A98F-48E30293802E}"/>
+              </a:ext>
+            </a:extLst>
+          </p:cNvPr>
+          <p:cNvSpPr txBox="1"/>
+          <p:nvPr/>
+        </p:nvSpPr>
+        <p:spPr>
+          <a:xfrm>
+            <a:off x="1349098" y="5235632"/>
+            <a:ext cx="785309" cy="276999"/>
+          </a:xfrm>
+          <a:prstGeom prst="rect">
+            <a:avLst/>
+          </a:prstGeom>
+          <a:noFill/>
+        </p:spPr>
+        <p:txBody>
+          <a:bodyPr wrap="square" rtlCol="0">
+            <a:spAutoFit/>
+          </a:bodyPr>
+          <a:lstStyle/>
+          <a:p>
+            <a:r>
+              <a:rPr lang="en-US" altLang="zh-CN" sz="1200" dirty="0">
+                <a:solidFill>
+                  <a:schemeClr val="bg1"/>
+                </a:solidFill>
+              </a:rPr>
+              <a:t>-0.06104</a:t>
+            </a:r>
+            <a:endParaRPr lang="zh-CN" altLang="en-US" sz="1200" dirty="0">
+              <a:solidFill>
+                <a:schemeClr val="bg1"/>
+              </a:solidFill>
+            </a:endParaRPr>
+          </a:p>
+        </p:txBody>
+      </p:sp>
+      <p:pic>
+        <p:nvPicPr>
+          <p:cNvPr id="10" name="Picture 9">
+            <a:extLst>
+              <a:ext uri="{FF2B5EF4-FFF2-40B4-BE49-F238E27FC236}">
+                <a16:creationId xmlns:a16="http://schemas.microsoft.com/office/drawing/2014/main" id="{F109641E-CBB1-4704-AEB9-E65A5C2E5FD5}"/>
+              </a:ext>
+            </a:extLst>
+          </p:cNvPr>
+          <p:cNvPicPr>
+            <a:picLocks noChangeAspect="1"/>
+          </p:cNvPicPr>
+          <p:nvPr/>
+        </p:nvPicPr>
+        <p:blipFill>
+          <a:blip r:embed="rId4"/>
+          <a:stretch>
+            <a:fillRect/>
+          </a:stretch>
+        </p:blipFill>
+        <p:spPr>
+          <a:xfrm>
+            <a:off x="6196833" y="3716660"/>
+            <a:ext cx="2331036" cy="2638425"/>
+          </a:xfrm>
+          <a:prstGeom prst="rect">
+            <a:avLst/>
+          </a:prstGeom>
+        </p:spPr>
+      </p:pic>
+      <p:pic>
+        <p:nvPicPr>
+          <p:cNvPr id="11" name="Picture 10">
+            <a:extLst>
+              <a:ext uri="{FF2B5EF4-FFF2-40B4-BE49-F238E27FC236}">
+                <a16:creationId xmlns:a16="http://schemas.microsoft.com/office/drawing/2014/main" id="{80E0DFBF-0073-410B-8ADE-65D2E66EF432}"/>
+              </a:ext>
+            </a:extLst>
+          </p:cNvPr>
+          <p:cNvPicPr>
+            <a:picLocks noChangeAspect="1"/>
+          </p:cNvPicPr>
+          <p:nvPr/>
+        </p:nvPicPr>
+        <p:blipFill>
+          <a:blip r:embed="rId5"/>
+          <a:stretch>
+            <a:fillRect/>
+          </a:stretch>
+        </p:blipFill>
+        <p:spPr>
+          <a:xfrm>
+            <a:off x="8527869" y="3716660"/>
+            <a:ext cx="3295650" cy="2638425"/>
+          </a:xfrm>
+          <a:prstGeom prst="rect">
+            <a:avLst/>
+          </a:prstGeom>
+        </p:spPr>
+      </p:pic>
+      <p:sp>
+        <p:nvSpPr>
+          <p:cNvPr id="12" name="TextBox 11">
+            <a:extLst>
+              <a:ext uri="{FF2B5EF4-FFF2-40B4-BE49-F238E27FC236}">
+                <a16:creationId xmlns:a16="http://schemas.microsoft.com/office/drawing/2014/main" id="{659650C8-6E40-4EB4-8ABF-24323C6FECCA}"/>
+              </a:ext>
+            </a:extLst>
+          </p:cNvPr>
+          <p:cNvSpPr txBox="1"/>
+          <p:nvPr/>
+        </p:nvSpPr>
+        <p:spPr>
+          <a:xfrm>
+            <a:off x="6648759" y="2956674"/>
+            <a:ext cx="4485151" cy="369332"/>
+          </a:xfrm>
+          <a:prstGeom prst="rect">
+            <a:avLst/>
+          </a:prstGeom>
+          <a:noFill/>
+        </p:spPr>
+        <p:txBody>
+          <a:bodyPr wrap="square" rtlCol="0">
+            <a:spAutoFit/>
+          </a:bodyPr>
+          <a:lstStyle/>
+          <a:p>
+            <a:pPr algn="ctr"/>
+            <a:r>
+              <a:rPr lang="en-US" altLang="zh-CN" dirty="0"/>
+              <a:t>weight</a:t>
+            </a:r>
+            <a:r>
+              <a:rPr lang="en-US" altLang="zh-CN" baseline="-25000" dirty="0"/>
+              <a:t>84</a:t>
+            </a:r>
+            <a:r>
+              <a:rPr lang="en-US" altLang="zh-CN" dirty="0"/>
+              <a:t>  for neurons 0-7 in layer 1</a:t>
             </a:r>
             <a:endParaRPr lang="zh-CN" altLang="en-US" dirty="0"/>
           </a:p>
@@ -4628,6 +5105,177 @@
 </file>
 
 <file path=ppt/slides/slide5.xml><?xml version="1.0" encoding="utf-8"?>
+<p:sld xmlns:a="http://schemas.openxmlformats.org/drawingml/2006/main" xmlns:r="http://schemas.openxmlformats.org/officeDocument/2006/relationships" xmlns:p="http://schemas.openxmlformats.org/presentationml/2006/main">
+  <p:cSld>
+    <p:spTree>
+      <p:nvGrpSpPr>
+        <p:cNvPr id="1" name=""/>
+        <p:cNvGrpSpPr/>
+        <p:nvPr/>
+      </p:nvGrpSpPr>
+      <p:grpSpPr>
+        <a:xfrm>
+          <a:off x="0" y="0"/>
+          <a:ext cx="0" cy="0"/>
+          <a:chOff x="0" y="0"/>
+          <a:chExt cx="0" cy="0"/>
+        </a:xfrm>
+      </p:grpSpPr>
+      <p:sp>
+        <p:nvSpPr>
+          <p:cNvPr id="2" name="Title 1">
+            <a:extLst>
+              <a:ext uri="{FF2B5EF4-FFF2-40B4-BE49-F238E27FC236}">
+                <a16:creationId xmlns:a16="http://schemas.microsoft.com/office/drawing/2014/main" id="{90193C8E-320E-498F-9B1E-A8994F13DB11}"/>
+              </a:ext>
+            </a:extLst>
+          </p:cNvPr>
+          <p:cNvSpPr>
+            <a:spLocks noGrp="1"/>
+          </p:cNvSpPr>
+          <p:nvPr>
+            <p:ph type="title"/>
+          </p:nvPr>
+        </p:nvSpPr>
+        <p:spPr/>
+        <p:txBody>
+          <a:bodyPr/>
+          <a:lstStyle/>
+          <a:p>
+            <a:r>
+              <a:rPr lang="en-US" altLang="zh-CN" dirty="0"/>
+              <a:t>Vanishing Gradient Problem</a:t>
+            </a:r>
+            <a:endParaRPr lang="zh-CN" altLang="en-US" dirty="0"/>
+          </a:p>
+        </p:txBody>
+      </p:sp>
+      <p:sp>
+        <p:nvSpPr>
+          <p:cNvPr id="3" name="Content Placeholder 2">
+            <a:extLst>
+              <a:ext uri="{FF2B5EF4-FFF2-40B4-BE49-F238E27FC236}">
+                <a16:creationId xmlns:a16="http://schemas.microsoft.com/office/drawing/2014/main" id="{9A1C0BC2-EE5D-45A7-9CC2-FE6EE95FBA13}"/>
+              </a:ext>
+            </a:extLst>
+          </p:cNvPr>
+          <p:cNvSpPr>
+            <a:spLocks noGrp="1"/>
+          </p:cNvSpPr>
+          <p:nvPr>
+            <p:ph idx="1"/>
+          </p:nvPr>
+        </p:nvSpPr>
+        <p:spPr>
+          <a:xfrm>
+            <a:off x="838200" y="1825624"/>
+            <a:ext cx="7286897" cy="4792889"/>
+          </a:xfrm>
+        </p:spPr>
+        <p:txBody>
+          <a:bodyPr>
+            <a:normAutofit/>
+          </a:bodyPr>
+          <a:lstStyle/>
+          <a:p>
+            <a:r>
+              <a:rPr lang="en-US" altLang="zh-CN" dirty="0"/>
+              <a:t>Add one propagates through the layers, the gradients of the weights becomes less and less. See the gradients for weight</a:t>
+            </a:r>
+            <a:r>
+              <a:rPr lang="en-US" altLang="zh-CN" baseline="-25000" dirty="0"/>
+              <a:t>438</a:t>
+            </a:r>
+            <a:r>
+              <a:rPr lang="en-US" altLang="zh-CN" dirty="0"/>
+              <a:t> of layer 0 neurons on the right</a:t>
+            </a:r>
+          </a:p>
+          <a:p>
+            <a:endParaRPr lang="en-US" altLang="zh-CN" dirty="0"/>
+          </a:p>
+          <a:p>
+            <a:r>
+              <a:rPr lang="en-US" altLang="zh-CN" dirty="0"/>
+              <a:t>Current learning rate is 0.125, which is quite high, 3 right bit shifts. For some of the gradients, this means that the change to the actual weight will be 0 in the update phase</a:t>
+            </a:r>
+            <a:endParaRPr lang="zh-CN" altLang="en-US" dirty="0"/>
+          </a:p>
+        </p:txBody>
+      </p:sp>
+      <p:pic>
+        <p:nvPicPr>
+          <p:cNvPr id="4" name="Picture 3">
+            <a:extLst>
+              <a:ext uri="{FF2B5EF4-FFF2-40B4-BE49-F238E27FC236}">
+                <a16:creationId xmlns:a16="http://schemas.microsoft.com/office/drawing/2014/main" id="{42AA64AF-D237-416B-A348-FD06EA18C0BD}"/>
+              </a:ext>
+            </a:extLst>
+          </p:cNvPr>
+          <p:cNvPicPr>
+            <a:picLocks noChangeAspect="1"/>
+          </p:cNvPicPr>
+          <p:nvPr/>
+        </p:nvPicPr>
+        <p:blipFill rotWithShape="1">
+          <a:blip r:embed="rId2"/>
+          <a:srcRect t="2794"/>
+          <a:stretch/>
+        </p:blipFill>
+        <p:spPr>
+          <a:xfrm>
+            <a:off x="8259450" y="2185"/>
+            <a:ext cx="1465853" cy="6855816"/>
+          </a:xfrm>
+          <a:prstGeom prst="rect">
+            <a:avLst/>
+          </a:prstGeom>
+        </p:spPr>
+      </p:pic>
+      <p:pic>
+        <p:nvPicPr>
+          <p:cNvPr id="5" name="Picture 4">
+            <a:extLst>
+              <a:ext uri="{FF2B5EF4-FFF2-40B4-BE49-F238E27FC236}">
+                <a16:creationId xmlns:a16="http://schemas.microsoft.com/office/drawing/2014/main" id="{80C06A89-9D64-4C00-B62D-F2A4D49CF053}"/>
+              </a:ext>
+            </a:extLst>
+          </p:cNvPr>
+          <p:cNvPicPr>
+            <a:picLocks noChangeAspect="1"/>
+          </p:cNvPicPr>
+          <p:nvPr/>
+        </p:nvPicPr>
+        <p:blipFill>
+          <a:blip r:embed="rId3"/>
+          <a:stretch>
+            <a:fillRect/>
+          </a:stretch>
+        </p:blipFill>
+        <p:spPr>
+          <a:xfrm>
+            <a:off x="9725303" y="0"/>
+            <a:ext cx="2197545" cy="6858000"/>
+          </a:xfrm>
+          <a:prstGeom prst="rect">
+            <a:avLst/>
+          </a:prstGeom>
+        </p:spPr>
+      </p:pic>
+    </p:spTree>
+    <p:extLst>
+      <p:ext uri="{BB962C8B-B14F-4D97-AF65-F5344CB8AC3E}">
+        <p14:creationId xmlns:p14="http://schemas.microsoft.com/office/powerpoint/2010/main" val="2617136517"/>
+      </p:ext>
+    </p:extLst>
+  </p:cSld>
+  <p:clrMapOvr>
+    <a:masterClrMapping/>
+  </p:clrMapOvr>
+</p:sld>
+</file>
+
+<file path=ppt/slides/slide6.xml><?xml version="1.0" encoding="utf-8"?>
 <p:sld xmlns:a="http://schemas.openxmlformats.org/drawingml/2006/main" xmlns:r="http://schemas.openxmlformats.org/officeDocument/2006/relationships" xmlns:p="http://schemas.openxmlformats.org/presentationml/2006/main">
   <p:cSld>
     <p:spTree>
@@ -4730,7 +5378,7 @@
 </p:sld>
 </file>
 
-<file path=ppt/slides/slide6.xml><?xml version="1.0" encoding="utf-8"?>
+<file path=ppt/slides/slide7.xml><?xml version="1.0" encoding="utf-8"?>
 <p:sld xmlns:a="http://schemas.openxmlformats.org/drawingml/2006/main" xmlns:r="http://schemas.openxmlformats.org/officeDocument/2006/relationships" xmlns:p="http://schemas.openxmlformats.org/presentationml/2006/main">
   <p:cSld>
     <p:spTree>
@@ -4928,7 +5576,7 @@
 </p:sld>
 </file>
 
-<file path=ppt/slides/slide7.xml><?xml version="1.0" encoding="utf-8"?>
+<file path=ppt/slides/slide8.xml><?xml version="1.0" encoding="utf-8"?>
 <p:sld xmlns:a="http://schemas.openxmlformats.org/drawingml/2006/main" xmlns:r="http://schemas.openxmlformats.org/officeDocument/2006/relationships" xmlns:p="http://schemas.openxmlformats.org/presentationml/2006/main">
   <p:cSld>
     <p:spTree>
@@ -5092,7 +5740,7 @@
 </p:sld>
 </file>
 
-<file path=ppt/slides/slide8.xml><?xml version="1.0" encoding="utf-8"?>
+<file path=ppt/slides/slide9.xml><?xml version="1.0" encoding="utf-8"?>
 <p:sld xmlns:a="http://schemas.openxmlformats.org/drawingml/2006/main" xmlns:r="http://schemas.openxmlformats.org/officeDocument/2006/relationships" xmlns:p="http://schemas.openxmlformats.org/presentationml/2006/main">
   <p:cSld>
     <p:spTree>
@@ -5381,124 +6029,6 @@
     <p:extLst>
       <p:ext uri="{BB962C8B-B14F-4D97-AF65-F5344CB8AC3E}">
         <p14:creationId xmlns:p14="http://schemas.microsoft.com/office/powerpoint/2010/main" val="3979021210"/>
-      </p:ext>
-    </p:extLst>
-  </p:cSld>
-  <p:clrMapOvr>
-    <a:masterClrMapping/>
-  </p:clrMapOvr>
-</p:sld>
-</file>
-
-<file path=ppt/slides/slide9.xml><?xml version="1.0" encoding="utf-8"?>
-<p:sld xmlns:a="http://schemas.openxmlformats.org/drawingml/2006/main" xmlns:r="http://schemas.openxmlformats.org/officeDocument/2006/relationships" xmlns:p="http://schemas.openxmlformats.org/presentationml/2006/main">
-  <p:cSld>
-    <p:spTree>
-      <p:nvGrpSpPr>
-        <p:cNvPr id="1" name=""/>
-        <p:cNvGrpSpPr/>
-        <p:nvPr/>
-      </p:nvGrpSpPr>
-      <p:grpSpPr>
-        <a:xfrm>
-          <a:off x="0" y="0"/>
-          <a:ext cx="0" cy="0"/>
-          <a:chOff x="0" y="0"/>
-          <a:chExt cx="0" cy="0"/>
-        </a:xfrm>
-      </p:grpSpPr>
-      <p:sp>
-        <p:nvSpPr>
-          <p:cNvPr id="2" name="Title 1">
-            <a:extLst>
-              <a:ext uri="{FF2B5EF4-FFF2-40B4-BE49-F238E27FC236}">
-                <a16:creationId xmlns:a16="http://schemas.microsoft.com/office/drawing/2014/main" id="{F93C7AB1-8EFB-4066-96DB-14A7E1A346D0}"/>
-              </a:ext>
-            </a:extLst>
-          </p:cNvPr>
-          <p:cNvSpPr>
-            <a:spLocks noGrp="1"/>
-          </p:cNvSpPr>
-          <p:nvPr>
-            <p:ph type="title"/>
-          </p:nvPr>
-        </p:nvSpPr>
-        <p:spPr/>
-        <p:txBody>
-          <a:bodyPr/>
-          <a:lstStyle/>
-          <a:p>
-            <a:r>
-              <a:rPr lang="en-US" altLang="zh-CN" dirty="0"/>
-              <a:t>Epoch 1</a:t>
-            </a:r>
-            <a:endParaRPr lang="zh-CN" altLang="en-US" dirty="0"/>
-          </a:p>
-        </p:txBody>
-      </p:sp>
-      <p:pic>
-        <p:nvPicPr>
-          <p:cNvPr id="4" name="Picture 3">
-            <a:extLst>
-              <a:ext uri="{FF2B5EF4-FFF2-40B4-BE49-F238E27FC236}">
-                <a16:creationId xmlns:a16="http://schemas.microsoft.com/office/drawing/2014/main" id="{FFFFCCB6-2469-4C1A-A894-DCA4BF0B4255}"/>
-              </a:ext>
-            </a:extLst>
-          </p:cNvPr>
-          <p:cNvPicPr>
-            <a:picLocks noChangeAspect="1"/>
-          </p:cNvPicPr>
-          <p:nvPr/>
-        </p:nvPicPr>
-        <p:blipFill>
-          <a:blip r:embed="rId2"/>
-          <a:stretch>
-            <a:fillRect/>
-          </a:stretch>
-        </p:blipFill>
-        <p:spPr>
-          <a:xfrm>
-            <a:off x="2377441" y="2426162"/>
-            <a:ext cx="3327218" cy="3707874"/>
-          </a:xfrm>
-          <a:prstGeom prst="rect">
-            <a:avLst/>
-          </a:prstGeom>
-        </p:spPr>
-      </p:pic>
-      <p:pic>
-        <p:nvPicPr>
-          <p:cNvPr id="5" name="Picture 4">
-            <a:extLst>
-              <a:ext uri="{FF2B5EF4-FFF2-40B4-BE49-F238E27FC236}">
-                <a16:creationId xmlns:a16="http://schemas.microsoft.com/office/drawing/2014/main" id="{D8044D0E-3C34-4EBF-BEB1-30B9F2527AB6}"/>
-              </a:ext>
-            </a:extLst>
-          </p:cNvPr>
-          <p:cNvPicPr>
-            <a:picLocks noChangeAspect="1"/>
-          </p:cNvPicPr>
-          <p:nvPr/>
-        </p:nvPicPr>
-        <p:blipFill rotWithShape="1">
-          <a:blip r:embed="rId3"/>
-          <a:srcRect t="2632" r="7326" b="1730"/>
-          <a:stretch/>
-        </p:blipFill>
-        <p:spPr>
-          <a:xfrm>
-            <a:off x="6277966" y="2426162"/>
-            <a:ext cx="3240214" cy="3707874"/>
-          </a:xfrm>
-          <a:prstGeom prst="rect">
-            <a:avLst/>
-          </a:prstGeom>
-        </p:spPr>
-      </p:pic>
-    </p:spTree>
-    <p:extLst>
-      <p:ext uri="{BB962C8B-B14F-4D97-AF65-F5344CB8AC3E}">
-        <p14:creationId xmlns:p14="http://schemas.microsoft.com/office/powerpoint/2010/main" val="2438716200"/>
       </p:ext>
     </p:extLst>
   </p:cSld>

</xml_diff>

<commit_message>
Version that trains pushed
</commit_message>
<xml_diff>
--- a/WeeklyPresentations/update11_06_03.pptx
+++ b/WeeklyPresentations/update11_06_03.pptx
@@ -17,11 +17,12 @@
     <p:sldId id="274" r:id="rId11"/>
     <p:sldId id="275" r:id="rId12"/>
     <p:sldId id="276" r:id="rId13"/>
-    <p:sldId id="277" r:id="rId14"/>
-    <p:sldId id="278" r:id="rId15"/>
-    <p:sldId id="279" r:id="rId16"/>
-    <p:sldId id="268" r:id="rId17"/>
-    <p:sldId id="258" r:id="rId18"/>
+    <p:sldId id="282" r:id="rId14"/>
+    <p:sldId id="277" r:id="rId15"/>
+    <p:sldId id="278" r:id="rId16"/>
+    <p:sldId id="279" r:id="rId17"/>
+    <p:sldId id="268" r:id="rId18"/>
+    <p:sldId id="258" r:id="rId19"/>
   </p:sldIdLst>
   <p:sldSz cx="12192000" cy="6858000"/>
   <p:notesSz cx="6858000" cy="9144000"/>
@@ -3491,10 +3492,10 @@
       </p:sp>
       <p:pic>
         <p:nvPicPr>
-          <p:cNvPr id="4" name="Picture 3">
-            <a:extLst>
-              <a:ext uri="{FF2B5EF4-FFF2-40B4-BE49-F238E27FC236}">
-                <a16:creationId xmlns:a16="http://schemas.microsoft.com/office/drawing/2014/main" id="{FFFFCCB6-2469-4C1A-A894-DCA4BF0B4255}"/>
+          <p:cNvPr id="3" name="Picture 2">
+            <a:extLst>
+              <a:ext uri="{FF2B5EF4-FFF2-40B4-BE49-F238E27FC236}">
+                <a16:creationId xmlns:a16="http://schemas.microsoft.com/office/drawing/2014/main" id="{07E98030-E11E-44DE-9D1E-1B11701AAFB3}"/>
               </a:ext>
             </a:extLst>
           </p:cNvPr>
@@ -3511,20 +3512,56 @@
         </p:blipFill>
         <p:spPr>
           <a:xfrm>
-            <a:off x="2377441" y="2426162"/>
-            <a:ext cx="3327218" cy="3707874"/>
+            <a:off x="5890531" y="2426162"/>
+            <a:ext cx="3175091" cy="3708956"/>
           </a:xfrm>
           <a:prstGeom prst="rect">
             <a:avLst/>
           </a:prstGeom>
         </p:spPr>
       </p:pic>
+      <p:sp>
+        <p:nvSpPr>
+          <p:cNvPr id="7" name="TextBox 6">
+            <a:extLst>
+              <a:ext uri="{FF2B5EF4-FFF2-40B4-BE49-F238E27FC236}">
+                <a16:creationId xmlns:a16="http://schemas.microsoft.com/office/drawing/2014/main" id="{5E1F07EA-68C2-464B-B976-BB9803CEA2E2}"/>
+              </a:ext>
+            </a:extLst>
+          </p:cNvPr>
+          <p:cNvSpPr txBox="1"/>
+          <p:nvPr/>
+        </p:nvSpPr>
+        <p:spPr>
+          <a:xfrm>
+            <a:off x="3234688" y="1873759"/>
+            <a:ext cx="5311685" cy="369332"/>
+          </a:xfrm>
+          <a:prstGeom prst="rect">
+            <a:avLst/>
+          </a:prstGeom>
+          <a:noFill/>
+        </p:spPr>
+        <p:txBody>
+          <a:bodyPr wrap="square" rtlCol="0">
+            <a:spAutoFit/>
+          </a:bodyPr>
+          <a:lstStyle/>
+          <a:p>
+            <a:r>
+              <a:rPr lang="en-US" altLang="zh-CN" dirty="0"/>
+              <a:t>Observation: 1 training cycle takes 3141 cycles</a:t>
+            </a:r>
+            <a:endParaRPr lang="zh-CN" altLang="en-US" dirty="0"/>
+          </a:p>
+        </p:txBody>
+      </p:sp>
       <p:pic>
         <p:nvPicPr>
-          <p:cNvPr id="5" name="Picture 4">
-            <a:extLst>
-              <a:ext uri="{FF2B5EF4-FFF2-40B4-BE49-F238E27FC236}">
-                <a16:creationId xmlns:a16="http://schemas.microsoft.com/office/drawing/2014/main" id="{D8044D0E-3C34-4EBF-BEB1-30B9F2527AB6}"/>
+          <p:cNvPr id="8" name="Picture 7">
+            <a:extLst>
+              <a:ext uri="{FF2B5EF4-FFF2-40B4-BE49-F238E27FC236}">
+                <a16:creationId xmlns:a16="http://schemas.microsoft.com/office/drawing/2014/main" id="{32B75760-BDAE-43AC-B373-B85E73592919}"/>
               </a:ext>
             </a:extLst>
           </p:cNvPr>
@@ -3533,15 +3570,16 @@
           </p:cNvPicPr>
           <p:nvPr/>
         </p:nvPicPr>
-        <p:blipFill rotWithShape="1">
+        <p:blipFill>
           <a:blip r:embed="rId3"/>
-          <a:srcRect t="2632" r="7326" b="1730"/>
-          <a:stretch/>
+          <a:stretch>
+            <a:fillRect/>
+          </a:stretch>
         </p:blipFill>
         <p:spPr>
           <a:xfrm>
-            <a:off x="6277966" y="2426162"/>
-            <a:ext cx="3240214" cy="3707874"/>
+            <a:off x="2379137" y="2426162"/>
+            <a:ext cx="3205098" cy="3708956"/>
           </a:xfrm>
           <a:prstGeom prst="rect">
             <a:avLst/>
@@ -3609,10 +3647,10 @@
       </p:sp>
       <p:pic>
         <p:nvPicPr>
-          <p:cNvPr id="4" name="Picture 3">
-            <a:extLst>
-              <a:ext uri="{FF2B5EF4-FFF2-40B4-BE49-F238E27FC236}">
-                <a16:creationId xmlns:a16="http://schemas.microsoft.com/office/drawing/2014/main" id="{53D0CF70-A927-4125-A7E7-3118C9CEB9CA}"/>
+          <p:cNvPr id="3" name="Picture 2">
+            <a:extLst>
+              <a:ext uri="{FF2B5EF4-FFF2-40B4-BE49-F238E27FC236}">
+                <a16:creationId xmlns:a16="http://schemas.microsoft.com/office/drawing/2014/main" id="{91F59C34-8B3C-4000-B94C-869FC16EF8B5}"/>
               </a:ext>
             </a:extLst>
           </p:cNvPr>
@@ -3629,8 +3667,8 @@
         </p:blipFill>
         <p:spPr>
           <a:xfrm>
-            <a:off x="1661181" y="2090737"/>
-            <a:ext cx="3724275" cy="4129740"/>
+            <a:off x="5406798" y="2410777"/>
+            <a:ext cx="3175091" cy="3706604"/>
           </a:xfrm>
           <a:prstGeom prst="rect">
             <a:avLst/>
@@ -3639,10 +3677,10 @@
       </p:pic>
       <p:pic>
         <p:nvPicPr>
-          <p:cNvPr id="5" name="Picture 4">
-            <a:extLst>
-              <a:ext uri="{FF2B5EF4-FFF2-40B4-BE49-F238E27FC236}">
-                <a16:creationId xmlns:a16="http://schemas.microsoft.com/office/drawing/2014/main" id="{08C6259A-70AF-47CC-B67C-4BE57BFD7CA9}"/>
+          <p:cNvPr id="6" name="Picture 5">
+            <a:extLst>
+              <a:ext uri="{FF2B5EF4-FFF2-40B4-BE49-F238E27FC236}">
+                <a16:creationId xmlns:a16="http://schemas.microsoft.com/office/drawing/2014/main" id="{A6B3FA8A-B601-40AA-AAA6-C7B4CC7D8BC3}"/>
               </a:ext>
             </a:extLst>
           </p:cNvPr>
@@ -3659,14 +3697,50 @@
         </p:blipFill>
         <p:spPr>
           <a:xfrm>
-            <a:off x="6236157" y="2090737"/>
-            <a:ext cx="3815691" cy="4129740"/>
+            <a:off x="1954256" y="2410777"/>
+            <a:ext cx="3175091" cy="3708956"/>
           </a:xfrm>
           <a:prstGeom prst="rect">
             <a:avLst/>
           </a:prstGeom>
         </p:spPr>
       </p:pic>
+      <p:sp>
+        <p:nvSpPr>
+          <p:cNvPr id="7" name="TextBox 6">
+            <a:extLst>
+              <a:ext uri="{FF2B5EF4-FFF2-40B4-BE49-F238E27FC236}">
+                <a16:creationId xmlns:a16="http://schemas.microsoft.com/office/drawing/2014/main" id="{D77809A3-9D87-4060-A521-DE49463187DF}"/>
+              </a:ext>
+            </a:extLst>
+          </p:cNvPr>
+          <p:cNvSpPr txBox="1"/>
+          <p:nvPr/>
+        </p:nvSpPr>
+        <p:spPr>
+          <a:xfrm>
+            <a:off x="2342605" y="1488672"/>
+            <a:ext cx="6331131" cy="923330"/>
+          </a:xfrm>
+          <a:prstGeom prst="rect">
+            <a:avLst/>
+          </a:prstGeom>
+          <a:noFill/>
+        </p:spPr>
+        <p:txBody>
+          <a:bodyPr wrap="square" rtlCol="0">
+            <a:spAutoFit/>
+          </a:bodyPr>
+          <a:lstStyle/>
+          <a:p>
+            <a:r>
+              <a:rPr lang="en-US" altLang="zh-CN" dirty="0"/>
+              <a:t>After 2 epochs, neuron 0 is now the maximum output, also, many of the other neurons are now the lowest possible value, 0x8000. Note, the learning rate is rather high.</a:t>
+            </a:r>
+            <a:endParaRPr lang="zh-CN" altLang="en-US" dirty="0"/>
+          </a:p>
+        </p:txBody>
+      </p:sp>
     </p:spTree>
     <p:extLst>
       <p:ext uri="{BB962C8B-B14F-4D97-AF65-F5344CB8AC3E}">
@@ -3720,7 +3794,7 @@
           <a:p>
             <a:r>
               <a:rPr lang="en-US" altLang="zh-CN" dirty="0"/>
-              <a:t>Epoch 3 (0 is now the largest value)</a:t>
+              <a:t>Epoch 3</a:t>
             </a:r>
             <a:endParaRPr lang="zh-CN" altLang="en-US" dirty="0"/>
           </a:p>
@@ -3728,10 +3802,10 @@
       </p:sp>
       <p:pic>
         <p:nvPicPr>
-          <p:cNvPr id="4" name="Picture 3">
-            <a:extLst>
-              <a:ext uri="{FF2B5EF4-FFF2-40B4-BE49-F238E27FC236}">
-                <a16:creationId xmlns:a16="http://schemas.microsoft.com/office/drawing/2014/main" id="{38569540-D0F5-4AD0-A7DC-C7FDEDCB84F2}"/>
+          <p:cNvPr id="3" name="Picture 2">
+            <a:extLst>
+              <a:ext uri="{FF2B5EF4-FFF2-40B4-BE49-F238E27FC236}">
+                <a16:creationId xmlns:a16="http://schemas.microsoft.com/office/drawing/2014/main" id="{B946D12A-05EA-4795-8B57-5A273961B6F6}"/>
               </a:ext>
             </a:extLst>
           </p:cNvPr>
@@ -3748,8 +3822,8 @@
         </p:blipFill>
         <p:spPr>
           <a:xfrm>
-            <a:off x="5972175" y="1933573"/>
-            <a:ext cx="3709987" cy="4282011"/>
+            <a:off x="5048793" y="2367235"/>
+            <a:ext cx="3381103" cy="3705125"/>
           </a:xfrm>
           <a:prstGeom prst="rect">
             <a:avLst/>
@@ -3758,10 +3832,10 @@
       </p:pic>
       <p:pic>
         <p:nvPicPr>
-          <p:cNvPr id="5" name="Picture 4">
-            <a:extLst>
-              <a:ext uri="{FF2B5EF4-FFF2-40B4-BE49-F238E27FC236}">
-                <a16:creationId xmlns:a16="http://schemas.microsoft.com/office/drawing/2014/main" id="{63CC71CB-AA69-4C72-852C-25F3EE3BCDEA}"/>
+          <p:cNvPr id="6" name="Picture 5">
+            <a:extLst>
+              <a:ext uri="{FF2B5EF4-FFF2-40B4-BE49-F238E27FC236}">
+                <a16:creationId xmlns:a16="http://schemas.microsoft.com/office/drawing/2014/main" id="{CA63B850-D79C-49BA-8A92-0C0345F5513C}"/>
               </a:ext>
             </a:extLst>
           </p:cNvPr>
@@ -3778,8 +3852,8 @@
         </p:blipFill>
         <p:spPr>
           <a:xfrm>
-            <a:off x="1421554" y="1933574"/>
-            <a:ext cx="3956382" cy="4282010"/>
+            <a:off x="1609861" y="2367235"/>
+            <a:ext cx="3175091" cy="3706604"/>
           </a:xfrm>
           <a:prstGeom prst="rect">
             <a:avLst/>
@@ -3821,7 +3895,7 @@
           <p:cNvPr id="2" name="Title 1">
             <a:extLst>
               <a:ext uri="{FF2B5EF4-FFF2-40B4-BE49-F238E27FC236}">
-                <a16:creationId xmlns:a16="http://schemas.microsoft.com/office/drawing/2014/main" id="{9A99CA21-B4ED-497F-B2D2-71B7C589E4F8}"/>
+                <a16:creationId xmlns:a16="http://schemas.microsoft.com/office/drawing/2014/main" id="{69069298-AA39-4BA9-B5C0-CC17E508CF67}"/>
               </a:ext>
             </a:extLst>
           </p:cNvPr>
@@ -3839,14 +3913,7 @@
           <a:p>
             <a:r>
               <a:rPr lang="en-US" altLang="zh-CN" dirty="0"/>
-              <a:t>Epoch 5 (Skipping epochs now)</a:t>
-            </a:r>
-            <a:br>
-              <a:rPr lang="en-US" altLang="zh-CN" dirty="0"/>
-            </a:br>
-            <a:r>
-              <a:rPr lang="en-US" altLang="zh-CN" dirty="0"/>
-              <a:t>Neuron 0 is now positive</a:t>
+              <a:t>Epoch 6</a:t>
             </a:r>
             <a:endParaRPr lang="zh-CN" altLang="en-US" dirty="0"/>
           </a:p>
@@ -3857,7 +3924,7 @@
           <p:cNvPr id="4" name="Picture 3">
             <a:extLst>
               <a:ext uri="{FF2B5EF4-FFF2-40B4-BE49-F238E27FC236}">
-                <a16:creationId xmlns:a16="http://schemas.microsoft.com/office/drawing/2014/main" id="{E67AFC55-9E67-44AF-8AA5-FDE5B7139DD2}"/>
+                <a16:creationId xmlns:a16="http://schemas.microsoft.com/office/drawing/2014/main" id="{32448E52-AF05-4864-B1C5-9419A8452AE4}"/>
               </a:ext>
             </a:extLst>
           </p:cNvPr>
@@ -3874,8 +3941,8 @@
         </p:blipFill>
         <p:spPr>
           <a:xfrm>
-            <a:off x="5667374" y="2062162"/>
-            <a:ext cx="3952875" cy="4328561"/>
+            <a:off x="5423263" y="2559639"/>
+            <a:ext cx="3314513" cy="3632154"/>
           </a:xfrm>
           <a:prstGeom prst="rect">
             <a:avLst/>
@@ -3887,7 +3954,7 @@
           <p:cNvPr id="5" name="Picture 4">
             <a:extLst>
               <a:ext uri="{FF2B5EF4-FFF2-40B4-BE49-F238E27FC236}">
-                <a16:creationId xmlns:a16="http://schemas.microsoft.com/office/drawing/2014/main" id="{82657D48-7CCE-4369-A794-7E96654923D2}"/>
+                <a16:creationId xmlns:a16="http://schemas.microsoft.com/office/drawing/2014/main" id="{1A61688A-2ECD-42E8-8024-845CF835F6DA}"/>
               </a:ext>
             </a:extLst>
           </p:cNvPr>
@@ -3904,18 +3971,54 @@
         </p:blipFill>
         <p:spPr>
           <a:xfrm>
-            <a:off x="923925" y="2062162"/>
-            <a:ext cx="3790950" cy="4375457"/>
+            <a:off x="1687285" y="2559639"/>
+            <a:ext cx="3381103" cy="3705125"/>
           </a:xfrm>
           <a:prstGeom prst="rect">
             <a:avLst/>
           </a:prstGeom>
         </p:spPr>
       </p:pic>
+      <p:sp>
+        <p:nvSpPr>
+          <p:cNvPr id="6" name="TextBox 5">
+            <a:extLst>
+              <a:ext uri="{FF2B5EF4-FFF2-40B4-BE49-F238E27FC236}">
+                <a16:creationId xmlns:a16="http://schemas.microsoft.com/office/drawing/2014/main" id="{A904F1D1-34CA-4220-A357-21433D79D61B}"/>
+              </a:ext>
+            </a:extLst>
+          </p:cNvPr>
+          <p:cNvSpPr txBox="1"/>
+          <p:nvPr/>
+        </p:nvSpPr>
+        <p:spPr>
+          <a:xfrm>
+            <a:off x="1992085" y="1532215"/>
+            <a:ext cx="6862355" cy="923330"/>
+          </a:xfrm>
+          <a:prstGeom prst="rect">
+            <a:avLst/>
+          </a:prstGeom>
+          <a:noFill/>
+        </p:spPr>
+        <p:txBody>
+          <a:bodyPr wrap="square" rtlCol="0">
+            <a:spAutoFit/>
+          </a:bodyPr>
+          <a:lstStyle/>
+          <a:p>
+            <a:r>
+              <a:rPr lang="en-US" altLang="zh-CN" dirty="0"/>
+              <a:t>After 6 epochs, neuron 0 is now the highest possible number, and all the other neurons are the lowest possible number. This training simulation also inadvertently tested my saturation checking.</a:t>
+            </a:r>
+            <a:endParaRPr lang="zh-CN" altLang="en-US" dirty="0"/>
+          </a:p>
+        </p:txBody>
+      </p:sp>
     </p:spTree>
     <p:extLst>
       <p:ext uri="{BB962C8B-B14F-4D97-AF65-F5344CB8AC3E}">
-        <p14:creationId xmlns:p14="http://schemas.microsoft.com/office/powerpoint/2010/main" val="2987967027"/>
+        <p14:creationId xmlns:p14="http://schemas.microsoft.com/office/powerpoint/2010/main" val="335060312"/>
       </p:ext>
     </p:extLst>
   </p:cSld>
@@ -3947,7 +4050,7 @@
           <p:cNvPr id="2" name="Title 1">
             <a:extLst>
               <a:ext uri="{FF2B5EF4-FFF2-40B4-BE49-F238E27FC236}">
-                <a16:creationId xmlns:a16="http://schemas.microsoft.com/office/drawing/2014/main" id="{51394D16-C6A6-4875-A366-17B1D87822A8}"/>
+                <a16:creationId xmlns:a16="http://schemas.microsoft.com/office/drawing/2014/main" id="{9A99CA21-B4ED-497F-B2D2-71B7C589E4F8}"/>
               </a:ext>
             </a:extLst>
           </p:cNvPr>
@@ -3965,76 +4068,23 @@
           <a:p>
             <a:r>
               <a:rPr lang="en-US" altLang="zh-CN" dirty="0"/>
-              <a:t>Epoch 10</a:t>
+              <a:t>Epoch 5 (Skipping epochs now)</a:t>
+            </a:r>
+            <a:br>
+              <a:rPr lang="en-US" altLang="zh-CN" dirty="0"/>
+            </a:br>
+            <a:r>
+              <a:rPr lang="en-US" altLang="zh-CN" dirty="0"/>
+              <a:t>Neuron 0 is now positive</a:t>
             </a:r>
             <a:endParaRPr lang="zh-CN" altLang="en-US" dirty="0"/>
           </a:p>
         </p:txBody>
       </p:sp>
-      <p:pic>
-        <p:nvPicPr>
-          <p:cNvPr id="4" name="Picture 3">
-            <a:extLst>
-              <a:ext uri="{FF2B5EF4-FFF2-40B4-BE49-F238E27FC236}">
-                <a16:creationId xmlns:a16="http://schemas.microsoft.com/office/drawing/2014/main" id="{F8E5F8E4-DA25-4291-B8D7-BA4605FEB133}"/>
-              </a:ext>
-            </a:extLst>
-          </p:cNvPr>
-          <p:cNvPicPr>
-            <a:picLocks noChangeAspect="1"/>
-          </p:cNvPicPr>
-          <p:nvPr/>
-        </p:nvPicPr>
-        <p:blipFill>
-          <a:blip r:embed="rId2"/>
-          <a:stretch>
-            <a:fillRect/>
-          </a:stretch>
-        </p:blipFill>
-        <p:spPr>
-          <a:xfrm>
-            <a:off x="6096000" y="2033587"/>
-            <a:ext cx="3752850" cy="4233985"/>
-          </a:xfrm>
-          <a:prstGeom prst="rect">
-            <a:avLst/>
-          </a:prstGeom>
-        </p:spPr>
-      </p:pic>
-      <p:pic>
-        <p:nvPicPr>
-          <p:cNvPr id="5" name="Picture 4">
-            <a:extLst>
-              <a:ext uri="{FF2B5EF4-FFF2-40B4-BE49-F238E27FC236}">
-                <a16:creationId xmlns:a16="http://schemas.microsoft.com/office/drawing/2014/main" id="{604857BE-3B31-4D91-BAD2-31F39C35900A}"/>
-              </a:ext>
-            </a:extLst>
-          </p:cNvPr>
-          <p:cNvPicPr>
-            <a:picLocks noChangeAspect="1"/>
-          </p:cNvPicPr>
-          <p:nvPr/>
-        </p:nvPicPr>
-        <p:blipFill>
-          <a:blip r:embed="rId3"/>
-          <a:stretch>
-            <a:fillRect/>
-          </a:stretch>
-        </p:blipFill>
-        <p:spPr>
-          <a:xfrm>
-            <a:off x="1495424" y="2033587"/>
-            <a:ext cx="3866507" cy="4233985"/>
-          </a:xfrm>
-          <a:prstGeom prst="rect">
-            <a:avLst/>
-          </a:prstGeom>
-        </p:spPr>
-      </p:pic>
     </p:spTree>
     <p:extLst>
       <p:ext uri="{BB962C8B-B14F-4D97-AF65-F5344CB8AC3E}">
-        <p14:creationId xmlns:p14="http://schemas.microsoft.com/office/powerpoint/2010/main" val="3643263494"/>
+        <p14:creationId xmlns:p14="http://schemas.microsoft.com/office/powerpoint/2010/main" val="2987967027"/>
       </p:ext>
     </p:extLst>
   </p:cSld>
@@ -4066,7 +4116,7 @@
           <p:cNvPr id="2" name="Title 1">
             <a:extLst>
               <a:ext uri="{FF2B5EF4-FFF2-40B4-BE49-F238E27FC236}">
-                <a16:creationId xmlns:a16="http://schemas.microsoft.com/office/drawing/2014/main" id="{FBE18E93-AC30-47FC-A07C-14A39BFC214A}"/>
+                <a16:creationId xmlns:a16="http://schemas.microsoft.com/office/drawing/2014/main" id="{51394D16-C6A6-4875-A366-17B1D87822A8}"/>
               </a:ext>
             </a:extLst>
           </p:cNvPr>
@@ -4079,128 +4129,21 @@
         </p:nvSpPr>
         <p:spPr/>
         <p:txBody>
-          <a:bodyPr>
-            <a:normAutofit/>
-          </a:bodyPr>
-          <a:lstStyle/>
-          <a:p>
-            <a:r>
-              <a:rPr lang="en-US" altLang="zh-CN" dirty="0"/>
-              <a:t>Eventually… (1.65 </a:t>
-            </a:r>
-            <a:r>
-              <a:rPr lang="en-US" altLang="zh-CN" dirty="0" err="1"/>
-              <a:t>ms</a:t>
-            </a:r>
-            <a:r>
-              <a:rPr lang="en-US" altLang="zh-CN" dirty="0"/>
-              <a:t> according to sim)</a:t>
-            </a:r>
-            <a:br>
-              <a:rPr lang="en-US" altLang="zh-CN" dirty="0"/>
-            </a:br>
-            <a:r>
-              <a:rPr lang="en-US" altLang="zh-CN" dirty="0"/>
-              <a:t>Inadvertently, also tested my saturation check</a:t>
+          <a:bodyPr/>
+          <a:lstStyle/>
+          <a:p>
+            <a:r>
+              <a:rPr lang="en-US" altLang="zh-CN" dirty="0"/>
+              <a:t>Epoch 10</a:t>
             </a:r>
             <a:endParaRPr lang="zh-CN" altLang="en-US" dirty="0"/>
           </a:p>
         </p:txBody>
       </p:sp>
-      <p:pic>
-        <p:nvPicPr>
-          <p:cNvPr id="4" name="Picture 3">
-            <a:extLst>
-              <a:ext uri="{FF2B5EF4-FFF2-40B4-BE49-F238E27FC236}">
-                <a16:creationId xmlns:a16="http://schemas.microsoft.com/office/drawing/2014/main" id="{CFB54D4C-9767-4E56-A081-097928244E08}"/>
-              </a:ext>
-            </a:extLst>
-          </p:cNvPr>
-          <p:cNvPicPr>
-            <a:picLocks noChangeAspect="1"/>
-          </p:cNvPicPr>
-          <p:nvPr/>
-        </p:nvPicPr>
-        <p:blipFill>
-          <a:blip r:embed="rId2"/>
-          <a:stretch>
-            <a:fillRect/>
-          </a:stretch>
-        </p:blipFill>
-        <p:spPr>
-          <a:xfrm>
-            <a:off x="762000" y="2495550"/>
-            <a:ext cx="3081673" cy="3543300"/>
-          </a:xfrm>
-          <a:prstGeom prst="rect">
-            <a:avLst/>
-          </a:prstGeom>
-        </p:spPr>
-      </p:pic>
-      <p:pic>
-        <p:nvPicPr>
-          <p:cNvPr id="6" name="Picture 5">
-            <a:extLst>
-              <a:ext uri="{FF2B5EF4-FFF2-40B4-BE49-F238E27FC236}">
-                <a16:creationId xmlns:a16="http://schemas.microsoft.com/office/drawing/2014/main" id="{1F797CE0-10FB-4BC6-8551-90CC0FD135FB}"/>
-              </a:ext>
-            </a:extLst>
-          </p:cNvPr>
-          <p:cNvPicPr>
-            <a:picLocks noChangeAspect="1"/>
-          </p:cNvPicPr>
-          <p:nvPr/>
-        </p:nvPicPr>
-        <p:blipFill>
-          <a:blip r:embed="rId3"/>
-          <a:stretch>
-            <a:fillRect/>
-          </a:stretch>
-        </p:blipFill>
-        <p:spPr>
-          <a:xfrm>
-            <a:off x="8153400" y="2495550"/>
-            <a:ext cx="3276600" cy="3543300"/>
-          </a:xfrm>
-          <a:prstGeom prst="rect">
-            <a:avLst/>
-          </a:prstGeom>
-        </p:spPr>
-      </p:pic>
-      <p:pic>
-        <p:nvPicPr>
-          <p:cNvPr id="7" name="Picture 6">
-            <a:extLst>
-              <a:ext uri="{FF2B5EF4-FFF2-40B4-BE49-F238E27FC236}">
-                <a16:creationId xmlns:a16="http://schemas.microsoft.com/office/drawing/2014/main" id="{86FEE0AE-B998-4BB5-BEDA-0E00A7C7FBBE}"/>
-              </a:ext>
-            </a:extLst>
-          </p:cNvPr>
-          <p:cNvPicPr>
-            <a:picLocks noChangeAspect="1"/>
-          </p:cNvPicPr>
-          <p:nvPr/>
-        </p:nvPicPr>
-        <p:blipFill>
-          <a:blip r:embed="rId4"/>
-          <a:stretch>
-            <a:fillRect/>
-          </a:stretch>
-        </p:blipFill>
-        <p:spPr>
-          <a:xfrm>
-            <a:off x="4550518" y="2495550"/>
-            <a:ext cx="3090964" cy="3543300"/>
-          </a:xfrm>
-          <a:prstGeom prst="rect">
-            <a:avLst/>
-          </a:prstGeom>
-        </p:spPr>
-      </p:pic>
     </p:spTree>
     <p:extLst>
       <p:ext uri="{BB962C8B-B14F-4D97-AF65-F5344CB8AC3E}">
-        <p14:creationId xmlns:p14="http://schemas.microsoft.com/office/powerpoint/2010/main" val="3509944525"/>
+        <p14:creationId xmlns:p14="http://schemas.microsoft.com/office/powerpoint/2010/main" val="3643263494"/>
       </p:ext>
     </p:extLst>
   </p:cSld>
@@ -4232,6 +4175,79 @@
           <p:cNvPr id="2" name="Title 1">
             <a:extLst>
               <a:ext uri="{FF2B5EF4-FFF2-40B4-BE49-F238E27FC236}">
+                <a16:creationId xmlns:a16="http://schemas.microsoft.com/office/drawing/2014/main" id="{FBE18E93-AC30-47FC-A07C-14A39BFC214A}"/>
+              </a:ext>
+            </a:extLst>
+          </p:cNvPr>
+          <p:cNvSpPr>
+            <a:spLocks noGrp="1"/>
+          </p:cNvSpPr>
+          <p:nvPr>
+            <p:ph type="title"/>
+          </p:nvPr>
+        </p:nvSpPr>
+        <p:spPr>
+          <a:xfrm>
+            <a:off x="838200" y="365125"/>
+            <a:ext cx="10515600" cy="1325563"/>
+          </a:xfrm>
+        </p:spPr>
+        <p:txBody>
+          <a:bodyPr>
+            <a:normAutofit/>
+          </a:bodyPr>
+          <a:lstStyle/>
+          <a:p>
+            <a:r>
+              <a:rPr lang="en-US" altLang="zh-CN" dirty="0"/>
+              <a:t>E</a:t>
+            </a:r>
+            <a:br>
+              <a:rPr lang="en-US" altLang="zh-CN" dirty="0"/>
+            </a:br>
+            <a:r>
+              <a:rPr lang="en-US" altLang="zh-CN" dirty="0"/>
+              <a:t>Inadvertently, also tested my saturation check</a:t>
+            </a:r>
+            <a:endParaRPr lang="zh-CN" altLang="en-US" dirty="0"/>
+          </a:p>
+        </p:txBody>
+      </p:sp>
+    </p:spTree>
+    <p:extLst>
+      <p:ext uri="{BB962C8B-B14F-4D97-AF65-F5344CB8AC3E}">
+        <p14:creationId xmlns:p14="http://schemas.microsoft.com/office/powerpoint/2010/main" val="3509944525"/>
+      </p:ext>
+    </p:extLst>
+  </p:cSld>
+  <p:clrMapOvr>
+    <a:masterClrMapping/>
+  </p:clrMapOvr>
+</p:sld>
+</file>
+
+<file path=ppt/slides/slide17.xml><?xml version="1.0" encoding="utf-8"?>
+<p:sld xmlns:a="http://schemas.openxmlformats.org/drawingml/2006/main" xmlns:r="http://schemas.openxmlformats.org/officeDocument/2006/relationships" xmlns:p="http://schemas.openxmlformats.org/presentationml/2006/main">
+  <p:cSld>
+    <p:spTree>
+      <p:nvGrpSpPr>
+        <p:cNvPr id="1" name=""/>
+        <p:cNvGrpSpPr/>
+        <p:nvPr/>
+      </p:nvGrpSpPr>
+      <p:grpSpPr>
+        <a:xfrm>
+          <a:off x="0" y="0"/>
+          <a:ext cx="0" cy="0"/>
+          <a:chOff x="0" y="0"/>
+          <a:chExt cx="0" cy="0"/>
+        </a:xfrm>
+      </p:grpSpPr>
+      <p:sp>
+        <p:nvSpPr>
+          <p:cNvPr id="2" name="Title 1">
+            <a:extLst>
+              <a:ext uri="{FF2B5EF4-FFF2-40B4-BE49-F238E27FC236}">
                 <a16:creationId xmlns:a16="http://schemas.microsoft.com/office/drawing/2014/main" id="{85687F3E-5189-4275-B1B1-13902E39F554}"/>
               </a:ext>
             </a:extLst>
@@ -4329,7 +4345,7 @@
 </p:sld>
 </file>
 
-<file path=ppt/slides/slide17.xml><?xml version="1.0" encoding="utf-8"?>
+<file path=ppt/slides/slide18.xml><?xml version="1.0" encoding="utf-8"?>
 <p:sld xmlns:a="http://schemas.openxmlformats.org/drawingml/2006/main" xmlns:r="http://schemas.openxmlformats.org/officeDocument/2006/relationships" xmlns:p="http://schemas.openxmlformats.org/presentationml/2006/main">
   <p:cSld>
     <p:spTree>
@@ -5688,13 +5704,6 @@
               <a:t>Might just be better to set positive gradients for wrong labels and negative for correct for sake of time </a:t>
             </a:r>
           </a:p>
-          <a:p>
-            <a:r>
-              <a:rPr lang="en-US" altLang="zh-CN" dirty="0"/>
-              <a:t>In this test, the update only happens in fc2, extension to fc1 and fc0 should be quick. fc2_gradients[0] = -1, all others are 1</a:t>
-            </a:r>
-            <a:endParaRPr lang="zh-CN" altLang="en-US" dirty="0"/>
-          </a:p>
         </p:txBody>
       </p:sp>
       <p:pic>
@@ -5719,8 +5728,8 @@
         </p:blipFill>
         <p:spPr>
           <a:xfrm>
-            <a:off x="2409825" y="5964237"/>
-            <a:ext cx="8229600" cy="695325"/>
+            <a:off x="1033872" y="5506991"/>
+            <a:ext cx="9526594" cy="804909"/>
           </a:xfrm>
           <a:prstGeom prst="rect">
             <a:avLst/>

</xml_diff>

<commit_message>
Added resource usage and timing to presentation
</commit_message>
<xml_diff>
--- a/WeeklyPresentations/update11_06_03.pptx
+++ b/WeeklyPresentations/update11_06_03.pptx
@@ -18,8 +18,10 @@
     <p:sldId id="275" r:id="rId12"/>
     <p:sldId id="276" r:id="rId13"/>
     <p:sldId id="282" r:id="rId14"/>
-    <p:sldId id="268" r:id="rId15"/>
-    <p:sldId id="258" r:id="rId16"/>
+    <p:sldId id="283" r:id="rId15"/>
+    <p:sldId id="284" r:id="rId16"/>
+    <p:sldId id="268" r:id="rId17"/>
+    <p:sldId id="258" r:id="rId18"/>
   </p:sldIdLst>
   <p:sldSz cx="12192000" cy="6858000"/>
   <p:notesSz cx="6858000" cy="9144000"/>
@@ -4047,6 +4049,351 @@
           <p:cNvPr id="2" name="Title 1">
             <a:extLst>
               <a:ext uri="{FF2B5EF4-FFF2-40B4-BE49-F238E27FC236}">
+                <a16:creationId xmlns:a16="http://schemas.microsoft.com/office/drawing/2014/main" id="{B23898EF-631E-478A-B539-BF5377CA184A}"/>
+              </a:ext>
+            </a:extLst>
+          </p:cNvPr>
+          <p:cNvSpPr>
+            <a:spLocks noGrp="1"/>
+          </p:cNvSpPr>
+          <p:nvPr>
+            <p:ph type="title"/>
+          </p:nvPr>
+        </p:nvSpPr>
+        <p:spPr/>
+        <p:txBody>
+          <a:bodyPr/>
+          <a:lstStyle/>
+          <a:p>
+            <a:r>
+              <a:rPr lang="en-US" altLang="zh-CN" dirty="0"/>
+              <a:t>Resource Usage</a:t>
+            </a:r>
+            <a:endParaRPr lang="zh-CN" altLang="en-US" dirty="0"/>
+          </a:p>
+        </p:txBody>
+      </p:sp>
+      <p:pic>
+        <p:nvPicPr>
+          <p:cNvPr id="4" name="Picture 3">
+            <a:extLst>
+              <a:ext uri="{FF2B5EF4-FFF2-40B4-BE49-F238E27FC236}">
+                <a16:creationId xmlns:a16="http://schemas.microsoft.com/office/drawing/2014/main" id="{C21DF40E-1969-4B5D-8363-8B5175598017}"/>
+              </a:ext>
+            </a:extLst>
+          </p:cNvPr>
+          <p:cNvPicPr>
+            <a:picLocks noChangeAspect="1"/>
+          </p:cNvPicPr>
+          <p:nvPr/>
+        </p:nvPicPr>
+        <p:blipFill>
+          <a:blip r:embed="rId2"/>
+          <a:stretch>
+            <a:fillRect/>
+          </a:stretch>
+        </p:blipFill>
+        <p:spPr>
+          <a:xfrm>
+            <a:off x="611505" y="2755582"/>
+            <a:ext cx="5238750" cy="2809875"/>
+          </a:xfrm>
+          <a:prstGeom prst="rect">
+            <a:avLst/>
+          </a:prstGeom>
+        </p:spPr>
+      </p:pic>
+      <p:pic>
+        <p:nvPicPr>
+          <p:cNvPr id="6" name="Picture 5" descr="A screenshot of a social media post&#10;&#10;Description automatically generated">
+            <a:extLst>
+              <a:ext uri="{FF2B5EF4-FFF2-40B4-BE49-F238E27FC236}">
+                <a16:creationId xmlns:a16="http://schemas.microsoft.com/office/drawing/2014/main" id="{544D493E-EBA5-4F8E-A0AB-2E062BE46709}"/>
+              </a:ext>
+            </a:extLst>
+          </p:cNvPr>
+          <p:cNvPicPr>
+            <a:picLocks noChangeAspect="1"/>
+          </p:cNvPicPr>
+          <p:nvPr/>
+        </p:nvPicPr>
+        <p:blipFill>
+          <a:blip r:embed="rId3"/>
+          <a:stretch>
+            <a:fillRect/>
+          </a:stretch>
+        </p:blipFill>
+        <p:spPr>
+          <a:xfrm>
+            <a:off x="6341747" y="2985797"/>
+            <a:ext cx="5106113" cy="2210108"/>
+          </a:xfrm>
+          <a:prstGeom prst="rect">
+            <a:avLst/>
+          </a:prstGeom>
+        </p:spPr>
+      </p:pic>
+      <p:sp>
+        <p:nvSpPr>
+          <p:cNvPr id="7" name="TextBox 6">
+            <a:extLst>
+              <a:ext uri="{FF2B5EF4-FFF2-40B4-BE49-F238E27FC236}">
+                <a16:creationId xmlns:a16="http://schemas.microsoft.com/office/drawing/2014/main" id="{B24E967E-D50B-4B42-A79A-5795366CC2A6}"/>
+              </a:ext>
+            </a:extLst>
+          </p:cNvPr>
+          <p:cNvSpPr txBox="1"/>
+          <p:nvPr/>
+        </p:nvSpPr>
+        <p:spPr>
+          <a:xfrm>
+            <a:off x="1454331" y="2316480"/>
+            <a:ext cx="3553097" cy="369332"/>
+          </a:xfrm>
+          <a:prstGeom prst="rect">
+            <a:avLst/>
+          </a:prstGeom>
+          <a:noFill/>
+        </p:spPr>
+        <p:txBody>
+          <a:bodyPr wrap="square" rtlCol="0">
+            <a:spAutoFit/>
+          </a:bodyPr>
+          <a:lstStyle/>
+          <a:p>
+            <a:pPr algn="ctr"/>
+            <a:r>
+              <a:rPr lang="en-US" altLang="zh-CN" dirty="0"/>
+              <a:t>With weight gradient BRAM</a:t>
+            </a:r>
+            <a:endParaRPr lang="zh-CN" altLang="en-US" dirty="0"/>
+          </a:p>
+        </p:txBody>
+      </p:sp>
+      <p:sp>
+        <p:nvSpPr>
+          <p:cNvPr id="8" name="Rectangle 7">
+            <a:extLst>
+              <a:ext uri="{FF2B5EF4-FFF2-40B4-BE49-F238E27FC236}">
+                <a16:creationId xmlns:a16="http://schemas.microsoft.com/office/drawing/2014/main" id="{46034498-C669-4002-B148-C569B7E83498}"/>
+              </a:ext>
+            </a:extLst>
+          </p:cNvPr>
+          <p:cNvSpPr/>
+          <p:nvPr/>
+        </p:nvSpPr>
+        <p:spPr>
+          <a:xfrm>
+            <a:off x="6835395" y="2316480"/>
+            <a:ext cx="4118821" cy="369332"/>
+          </a:xfrm>
+          <a:prstGeom prst="rect">
+            <a:avLst/>
+          </a:prstGeom>
+        </p:spPr>
+        <p:txBody>
+          <a:bodyPr wrap="none">
+            <a:spAutoFit/>
+          </a:bodyPr>
+          <a:lstStyle/>
+          <a:p>
+            <a:pPr algn="ctr"/>
+            <a:r>
+              <a:rPr lang="en-US" altLang="zh-CN" dirty="0"/>
+              <a:t>Last week: without weight gradient BRAM</a:t>
+            </a:r>
+            <a:endParaRPr lang="zh-CN" altLang="en-US" dirty="0"/>
+          </a:p>
+        </p:txBody>
+      </p:sp>
+    </p:spTree>
+    <p:extLst>
+      <p:ext uri="{BB962C8B-B14F-4D97-AF65-F5344CB8AC3E}">
+        <p14:creationId xmlns:p14="http://schemas.microsoft.com/office/powerpoint/2010/main" val="3842427324"/>
+      </p:ext>
+    </p:extLst>
+  </p:cSld>
+  <p:clrMapOvr>
+    <a:masterClrMapping/>
+  </p:clrMapOvr>
+</p:sld>
+</file>
+
+<file path=ppt/slides/slide15.xml><?xml version="1.0" encoding="utf-8"?>
+<p:sld xmlns:a="http://schemas.openxmlformats.org/drawingml/2006/main" xmlns:r="http://schemas.openxmlformats.org/officeDocument/2006/relationships" xmlns:p="http://schemas.openxmlformats.org/presentationml/2006/main">
+  <p:cSld>
+    <p:spTree>
+      <p:nvGrpSpPr>
+        <p:cNvPr id="1" name=""/>
+        <p:cNvGrpSpPr/>
+        <p:nvPr/>
+      </p:nvGrpSpPr>
+      <p:grpSpPr>
+        <a:xfrm>
+          <a:off x="0" y="0"/>
+          <a:ext cx="0" cy="0"/>
+          <a:chOff x="0" y="0"/>
+          <a:chExt cx="0" cy="0"/>
+        </a:xfrm>
+      </p:grpSpPr>
+      <p:sp>
+        <p:nvSpPr>
+          <p:cNvPr id="2" name="Title 1">
+            <a:extLst>
+              <a:ext uri="{FF2B5EF4-FFF2-40B4-BE49-F238E27FC236}">
+                <a16:creationId xmlns:a16="http://schemas.microsoft.com/office/drawing/2014/main" id="{31E9DC67-489F-41AA-A2DF-7E0D2019A031}"/>
+              </a:ext>
+            </a:extLst>
+          </p:cNvPr>
+          <p:cNvSpPr>
+            <a:spLocks noGrp="1"/>
+          </p:cNvSpPr>
+          <p:nvPr>
+            <p:ph type="title"/>
+          </p:nvPr>
+        </p:nvSpPr>
+        <p:spPr/>
+        <p:txBody>
+          <a:bodyPr/>
+          <a:lstStyle/>
+          <a:p>
+            <a:r>
+              <a:rPr lang="en-US" altLang="zh-CN" dirty="0"/>
+              <a:t>Timing</a:t>
+            </a:r>
+            <a:endParaRPr lang="zh-CN" altLang="en-US" dirty="0"/>
+          </a:p>
+        </p:txBody>
+      </p:sp>
+      <p:sp>
+        <p:nvSpPr>
+          <p:cNvPr id="3" name="Content Placeholder 2">
+            <a:extLst>
+              <a:ext uri="{FF2B5EF4-FFF2-40B4-BE49-F238E27FC236}">
+                <a16:creationId xmlns:a16="http://schemas.microsoft.com/office/drawing/2014/main" id="{395FE7E2-D696-45A1-9FDF-8B561D911BF0}"/>
+              </a:ext>
+            </a:extLst>
+          </p:cNvPr>
+          <p:cNvSpPr>
+            <a:spLocks noGrp="1"/>
+          </p:cNvSpPr>
+          <p:nvPr>
+            <p:ph idx="1"/>
+          </p:nvPr>
+        </p:nvSpPr>
+        <p:spPr/>
+        <p:txBody>
+          <a:bodyPr/>
+          <a:lstStyle/>
+          <a:p>
+            <a:r>
+              <a:rPr lang="en-US" altLang="zh-CN" dirty="0"/>
+              <a:t>Previously non-violating regions are now causing slack violations, I believe it is due to the density of resource usage, 7.148 ns on routing.</a:t>
+            </a:r>
+          </a:p>
+          <a:p>
+            <a:endParaRPr lang="en-US" altLang="zh-CN" dirty="0"/>
+          </a:p>
+          <a:p>
+            <a:endParaRPr lang="zh-CN" altLang="en-US" dirty="0"/>
+          </a:p>
+        </p:txBody>
+      </p:sp>
+      <p:pic>
+        <p:nvPicPr>
+          <p:cNvPr id="5" name="Picture 4">
+            <a:extLst>
+              <a:ext uri="{FF2B5EF4-FFF2-40B4-BE49-F238E27FC236}">
+                <a16:creationId xmlns:a16="http://schemas.microsoft.com/office/drawing/2014/main" id="{3F3D9337-F502-4B79-9701-83B4DE78555A}"/>
+              </a:ext>
+            </a:extLst>
+          </p:cNvPr>
+          <p:cNvPicPr>
+            <a:picLocks noChangeAspect="1"/>
+          </p:cNvPicPr>
+          <p:nvPr/>
+        </p:nvPicPr>
+        <p:blipFill>
+          <a:blip r:embed="rId2"/>
+          <a:stretch>
+            <a:fillRect/>
+          </a:stretch>
+        </p:blipFill>
+        <p:spPr>
+          <a:xfrm>
+            <a:off x="1602241" y="3434556"/>
+            <a:ext cx="7419975" cy="1133475"/>
+          </a:xfrm>
+          <a:prstGeom prst="rect">
+            <a:avLst/>
+          </a:prstGeom>
+        </p:spPr>
+      </p:pic>
+      <p:pic>
+        <p:nvPicPr>
+          <p:cNvPr id="6" name="Picture 5">
+            <a:extLst>
+              <a:ext uri="{FF2B5EF4-FFF2-40B4-BE49-F238E27FC236}">
+                <a16:creationId xmlns:a16="http://schemas.microsoft.com/office/drawing/2014/main" id="{0DACC3D4-C1B4-491B-8D86-7C840BE4E95F}"/>
+              </a:ext>
+            </a:extLst>
+          </p:cNvPr>
+          <p:cNvPicPr>
+            <a:picLocks noChangeAspect="1"/>
+          </p:cNvPicPr>
+          <p:nvPr/>
+        </p:nvPicPr>
+        <p:blipFill>
+          <a:blip r:embed="rId3"/>
+          <a:stretch>
+            <a:fillRect/>
+          </a:stretch>
+        </p:blipFill>
+        <p:spPr>
+          <a:xfrm>
+            <a:off x="1602241" y="4544467"/>
+            <a:ext cx="8324850" cy="228600"/>
+          </a:xfrm>
+          <a:prstGeom prst="rect">
+            <a:avLst/>
+          </a:prstGeom>
+        </p:spPr>
+      </p:pic>
+    </p:spTree>
+    <p:extLst>
+      <p:ext uri="{BB962C8B-B14F-4D97-AF65-F5344CB8AC3E}">
+        <p14:creationId xmlns:p14="http://schemas.microsoft.com/office/powerpoint/2010/main" val="1925129553"/>
+      </p:ext>
+    </p:extLst>
+  </p:cSld>
+  <p:clrMapOvr>
+    <a:masterClrMapping/>
+  </p:clrMapOvr>
+</p:sld>
+</file>
+
+<file path=ppt/slides/slide16.xml><?xml version="1.0" encoding="utf-8"?>
+<p:sld xmlns:a="http://schemas.openxmlformats.org/drawingml/2006/main" xmlns:r="http://schemas.openxmlformats.org/officeDocument/2006/relationships" xmlns:p="http://schemas.openxmlformats.org/presentationml/2006/main">
+  <p:cSld>
+    <p:spTree>
+      <p:nvGrpSpPr>
+        <p:cNvPr id="1" name=""/>
+        <p:cNvGrpSpPr/>
+        <p:nvPr/>
+      </p:nvGrpSpPr>
+      <p:grpSpPr>
+        <a:xfrm>
+          <a:off x="0" y="0"/>
+          <a:ext cx="0" cy="0"/>
+          <a:chOff x="0" y="0"/>
+          <a:chExt cx="0" cy="0"/>
+        </a:xfrm>
+      </p:grpSpPr>
+      <p:sp>
+        <p:nvSpPr>
+          <p:cNvPr id="2" name="Title 1">
+            <a:extLst>
+              <a:ext uri="{FF2B5EF4-FFF2-40B4-BE49-F238E27FC236}">
                 <a16:creationId xmlns:a16="http://schemas.microsoft.com/office/drawing/2014/main" id="{85687F3E-5189-4275-B1B1-13902E39F554}"/>
               </a:ext>
             </a:extLst>
@@ -4144,7 +4491,7 @@
 </p:sld>
 </file>
 
-<file path=ppt/slides/slide15.xml><?xml version="1.0" encoding="utf-8"?>
+<file path=ppt/slides/slide17.xml><?xml version="1.0" encoding="utf-8"?>
 <p:sld xmlns:a="http://schemas.openxmlformats.org/drawingml/2006/main" xmlns:r="http://schemas.openxmlformats.org/officeDocument/2006/relationships" xmlns:p="http://schemas.openxmlformats.org/presentationml/2006/main">
   <p:cSld>
     <p:spTree>

</xml_diff>

<commit_message>
Added some debugging help for software model to analyze max and mins of gradients and activations
</commit_message>
<xml_diff>
--- a/WeeklyPresentations/update11_06_03.pptx
+++ b/WeeklyPresentations/update11_06_03.pptx
@@ -4292,6 +4292,12 @@
             </a:r>
           </a:p>
           <a:p>
+            <a:r>
+              <a:rPr lang="en-US" altLang="zh-CN" dirty="0"/>
+              <a:t>Haven’t looked into it at all yet though to be honest, would need to investigate, I see it involves the fc1_state register, so it may have been a problem linked to states</a:t>
+            </a:r>
+          </a:p>
+          <a:p>
             <a:endParaRPr lang="en-US" altLang="zh-CN" dirty="0"/>
           </a:p>
           <a:p>
@@ -4321,7 +4327,7 @@
         </p:blipFill>
         <p:spPr>
           <a:xfrm>
-            <a:off x="1602241" y="3434556"/>
+            <a:off x="1602241" y="4279383"/>
             <a:ext cx="7419975" cy="1133475"/>
           </a:xfrm>
           <a:prstGeom prst="rect">
@@ -4351,7 +4357,7 @@
         </p:blipFill>
         <p:spPr>
           <a:xfrm>
-            <a:off x="1602241" y="4544467"/>
+            <a:off x="1602241" y="5389294"/>
             <a:ext cx="8324850" cy="228600"/>
           </a:xfrm>
           <a:prstGeom prst="rect">

</xml_diff>